<commit_message>
corregido analisis binaria xd
</commit_message>
<xml_diff>
--- a/Practica2/AnalisisCotas.pptx
+++ b/Practica2/AnalisisCotas.pptx
@@ -3551,14 +3551,14 @@
           <a:p>
             <a:pPr algn="ctr"/>
             <a:r>
-              <a:rPr lang="es-MX" sz="2000" b="1" dirty="0">
+              <a:rPr lang="es-MX" b="1" dirty="0">
                 <a:solidFill>
                   <a:schemeClr val="tx1"/>
                 </a:solidFill>
                 <a:latin typeface="Arial" panose="020B0604020202020204" pitchFamily="34" charset="0"/>
                 <a:cs typeface="Arial" panose="020B0604020202020204" pitchFamily="34" charset="0"/>
               </a:rPr>
-              <a:t>Peor caso: Dato en la última posición. Se repite n veces</a:t>
+              <a:t>Peor caso: El dato no esta en el arreglo y se recorre completo. Se repite n veces</a:t>
             </a:r>
           </a:p>
         </p:txBody>
@@ -5576,7 +5576,7 @@
                     <a:latin typeface="Arial" panose="020B0604020202020204" pitchFamily="34" charset="0"/>
                     <a:cs typeface="Arial" panose="020B0604020202020204" pitchFamily="34" charset="0"/>
                   </a:rPr>
-                  <a:t>Con un árbol binario completamente lleno, tendrá 2^(n-1) elementos. El orden de complejidad será ideal de </a:t>
+                  <a:t>Con un árbol binario completamente lleno, tendrá 2^(n-1) elementos. El orden de complejidad ideal será de </a:t>
                 </a:r>
               </a:p>
               <a:p>

</xml_diff>

<commit_message>
análisis de búsqueda lineal
</commit_message>
<xml_diff>
--- a/Practica2/AnalisisCotas.pptx
+++ b/Practica2/AnalisisCotas.pptx
@@ -5,8 +5,9 @@
     <p:sldMasterId id="2147483648" r:id="rId1"/>
   </p:sldMasterIdLst>
   <p:sldIdLst>
-    <p:sldId id="270" r:id="rId2"/>
-    <p:sldId id="271" r:id="rId3"/>
+    <p:sldId id="272" r:id="rId2"/>
+    <p:sldId id="270" r:id="rId3"/>
+    <p:sldId id="271" r:id="rId4"/>
   </p:sldIdLst>
   <p:sldSz cx="12192000" cy="6858000"/>
   <p:notesSz cx="6858000" cy="9144000"/>
@@ -3350,10 +3351,10 @@
       </p:grpSpPr>
       <p:pic>
         <p:nvPicPr>
-          <p:cNvPr id="9" name="Imagen 8">
-            <a:extLst>
-              <a:ext uri="{FF2B5EF4-FFF2-40B4-BE49-F238E27FC236}">
-                <a16:creationId xmlns:a16="http://schemas.microsoft.com/office/drawing/2014/main" id="{E0962085-F2E4-4AB2-BC6C-B4844A6641D9}"/>
+          <p:cNvPr id="10" name="Imagen 9" descr="Herramienta Recortes">
+            <a:extLst>
+              <a:ext uri="{FF2B5EF4-FFF2-40B4-BE49-F238E27FC236}">
+                <a16:creationId xmlns:a16="http://schemas.microsoft.com/office/drawing/2014/main" id="{E64446A1-058B-473D-AD1E-9C78BE625B72}"/>
               </a:ext>
             </a:extLst>
           </p:cNvPr>
@@ -3362,7 +3363,7 @@
           </p:cNvPicPr>
           <p:nvPr/>
         </p:nvPicPr>
-        <p:blipFill>
+        <p:blipFill rotWithShape="1">
           <a:blip r:embed="rId2">
             <a:extLst>
               <a:ext uri="{28A0092B-C50C-407E-A947-70E740481C1C}">
@@ -3370,14 +3371,13 @@
               </a:ext>
             </a:extLst>
           </a:blip>
-          <a:stretch>
-            <a:fillRect/>
-          </a:stretch>
+          <a:srcRect l="13682" t="30067" r="25388" b="16995"/>
+          <a:stretch/>
         </p:blipFill>
         <p:spPr>
           <a:xfrm>
-            <a:off x="197657" y="286419"/>
-            <a:ext cx="9070226" cy="6018261"/>
+            <a:off x="942680" y="901771"/>
+            <a:ext cx="5957739" cy="5054451"/>
           </a:xfrm>
           <a:prstGeom prst="rect">
             <a:avLst/>
@@ -3386,10 +3386,10 @@
       </p:pic>
       <p:sp>
         <p:nvSpPr>
-          <p:cNvPr id="19" name="Rectángulo 18">
-            <a:extLst>
-              <a:ext uri="{FF2B5EF4-FFF2-40B4-BE49-F238E27FC236}">
-                <a16:creationId xmlns:a16="http://schemas.microsoft.com/office/drawing/2014/main" id="{ABEA8F89-BD06-4B68-878E-C5F05F8477B8}"/>
+          <p:cNvPr id="14" name="Cerrar llave 13">
+            <a:extLst>
+              <a:ext uri="{FF2B5EF4-FFF2-40B4-BE49-F238E27FC236}">
+                <a16:creationId xmlns:a16="http://schemas.microsoft.com/office/drawing/2014/main" id="{25B15CDC-8C33-466B-8ADB-31272AE60BD2}"/>
               </a:ext>
             </a:extLst>
           </p:cNvPr>
@@ -3398,7 +3398,229 @@
         </p:nvSpPr>
         <p:spPr>
           <a:xfrm>
-            <a:off x="5778713" y="2393586"/>
+            <a:off x="9187443" y="2658141"/>
+            <a:ext cx="584461" cy="1891465"/>
+          </a:xfrm>
+          <a:prstGeom prst="rightBrace">
+            <a:avLst/>
+          </a:prstGeom>
+          <a:ln w="38100"/>
+        </p:spPr>
+        <p:style>
+          <a:lnRef idx="1">
+            <a:schemeClr val="dk1"/>
+          </a:lnRef>
+          <a:fillRef idx="0">
+            <a:schemeClr val="dk1"/>
+          </a:fillRef>
+          <a:effectRef idx="0">
+            <a:schemeClr val="dk1"/>
+          </a:effectRef>
+          <a:fontRef idx="minor">
+            <a:schemeClr val="tx1"/>
+          </a:fontRef>
+        </p:style>
+        <p:txBody>
+          <a:bodyPr rtlCol="0" anchor="ctr"/>
+          <a:lstStyle/>
+          <a:p>
+            <a:pPr algn="ctr"/>
+            <a:endParaRPr lang="en-GB"/>
+          </a:p>
+        </p:txBody>
+      </p:sp>
+      <mc:AlternateContent xmlns:mc="http://schemas.openxmlformats.org/markup-compatibility/2006">
+        <mc:Choice xmlns:a14="http://schemas.microsoft.com/office/drawing/2010/main" Requires="a14">
+          <p:sp>
+            <p:nvSpPr>
+              <p:cNvPr id="18" name="Rectángulo 17">
+                <a:extLst>
+                  <a:ext uri="{FF2B5EF4-FFF2-40B4-BE49-F238E27FC236}">
+                    <a16:creationId xmlns:a16="http://schemas.microsoft.com/office/drawing/2014/main" id="{1E343C71-C851-4912-9C9C-17F3E1505565}"/>
+                  </a:ext>
+                </a:extLst>
+              </p:cNvPr>
+              <p:cNvSpPr/>
+              <p:nvPr/>
+            </p:nvSpPr>
+            <p:spPr>
+              <a:xfrm>
+                <a:off x="10105642" y="3427960"/>
+                <a:ext cx="824628" cy="346598"/>
+              </a:xfrm>
+              <a:prstGeom prst="rect">
+                <a:avLst/>
+              </a:prstGeom>
+              <a:solidFill>
+                <a:schemeClr val="accent5">
+                  <a:lumMod val="60000"/>
+                  <a:lumOff val="40000"/>
+                </a:schemeClr>
+              </a:solidFill>
+              <a:ln>
+                <a:solidFill>
+                  <a:schemeClr val="tx1"/>
+                </a:solidFill>
+              </a:ln>
+            </p:spPr>
+            <p:style>
+              <a:lnRef idx="2">
+                <a:schemeClr val="accent1">
+                  <a:shade val="50000"/>
+                </a:schemeClr>
+              </a:lnRef>
+              <a:fillRef idx="1">
+                <a:schemeClr val="accent1"/>
+              </a:fillRef>
+              <a:effectRef idx="0">
+                <a:schemeClr val="accent1"/>
+              </a:effectRef>
+              <a:fontRef idx="minor">
+                <a:schemeClr val="lt1"/>
+              </a:fontRef>
+            </p:style>
+            <p:txBody>
+              <a:bodyPr rtlCol="0" anchor="ctr"/>
+              <a:lstStyle/>
+              <a:p>
+                <a:pPr algn="ctr"/>
+                <a14:m>
+                  <m:oMath xmlns:m="http://schemas.openxmlformats.org/officeDocument/2006/math">
+                    <m:r>
+                      <a:rPr lang="es-MX" sz="2000" b="1" i="1" smtClean="0">
+                        <a:solidFill>
+                          <a:schemeClr val="tx1"/>
+                        </a:solidFill>
+                        <a:latin typeface="Cambria Math" panose="02040503050406030204" pitchFamily="18" charset="0"/>
+                        <a:cs typeface="Arial" panose="020B0604020202020204" pitchFamily="34" charset="0"/>
+                      </a:rPr>
+                      <m:t> </m:t>
+                    </m:r>
+                  </m:oMath>
+                </a14:m>
+                <a:r>
+                  <a:rPr lang="es-MX" sz="2000" b="1" dirty="0">
+                    <a:solidFill>
+                      <a:schemeClr val="tx1"/>
+                    </a:solidFill>
+                    <a:latin typeface="Arial" panose="020B0604020202020204" pitchFamily="34" charset="0"/>
+                    <a:cs typeface="Arial" panose="020B0604020202020204" pitchFamily="34" charset="0"/>
+                  </a:rPr>
+                  <a:t>O(n)</a:t>
+                </a:r>
+              </a:p>
+            </p:txBody>
+          </p:sp>
+        </mc:Choice>
+        <mc:Fallback>
+          <p:sp>
+            <p:nvSpPr>
+              <p:cNvPr id="18" name="Rectángulo 17">
+                <a:extLst>
+                  <a:ext uri="{FF2B5EF4-FFF2-40B4-BE49-F238E27FC236}">
+                    <a16:creationId xmlns:a16="http://schemas.microsoft.com/office/drawing/2014/main" id="{1E343C71-C851-4912-9C9C-17F3E1505565}"/>
+                  </a:ext>
+                </a:extLst>
+              </p:cNvPr>
+              <p:cNvSpPr>
+                <a:spLocks noRot="1" noChangeAspect="1" noMove="1" noResize="1" noEditPoints="1" noAdjustHandles="1" noChangeArrowheads="1" noChangeShapeType="1" noTextEdit="1"/>
+              </p:cNvSpPr>
+              <p:nvPr/>
+            </p:nvSpPr>
+            <p:spPr>
+              <a:xfrm>
+                <a:off x="10105642" y="3427960"/>
+                <a:ext cx="824628" cy="346598"/>
+              </a:xfrm>
+              <a:prstGeom prst="rect">
+                <a:avLst/>
+              </a:prstGeom>
+              <a:blipFill>
+                <a:blip r:embed="rId3"/>
+                <a:stretch>
+                  <a:fillRect t="-11864" r="-2920" b="-37288"/>
+                </a:stretch>
+              </a:blipFill>
+              <a:ln>
+                <a:solidFill>
+                  <a:schemeClr val="tx1"/>
+                </a:solidFill>
+              </a:ln>
+            </p:spPr>
+            <p:txBody>
+              <a:bodyPr/>
+              <a:lstStyle/>
+              <a:p>
+                <a:r>
+                  <a:rPr lang="en-GB">
+                    <a:noFill/>
+                  </a:rPr>
+                  <a:t> </a:t>
+                </a:r>
+              </a:p>
+            </p:txBody>
+          </p:sp>
+        </mc:Fallback>
+      </mc:AlternateContent>
+      <p:cxnSp>
+        <p:nvCxnSpPr>
+          <p:cNvPr id="19" name="Conector recto 18">
+            <a:extLst>
+              <a:ext uri="{FF2B5EF4-FFF2-40B4-BE49-F238E27FC236}">
+                <a16:creationId xmlns:a16="http://schemas.microsoft.com/office/drawing/2014/main" id="{A6FE41A7-7807-4A76-ACB0-DDE1C34B870B}"/>
+              </a:ext>
+            </a:extLst>
+          </p:cNvPr>
+          <p:cNvCxnSpPr>
+            <a:cxnSpLocks/>
+          </p:cNvCxnSpPr>
+          <p:nvPr/>
+        </p:nvCxnSpPr>
+        <p:spPr>
+          <a:xfrm>
+            <a:off x="2828041" y="4549606"/>
+            <a:ext cx="6262796" cy="0"/>
+          </a:xfrm>
+          <a:prstGeom prst="line">
+            <a:avLst/>
+          </a:prstGeom>
+          <a:ln w="38100">
+            <a:solidFill>
+              <a:schemeClr val="tx1"/>
+            </a:solidFill>
+            <a:prstDash val="sysDot"/>
+          </a:ln>
+        </p:spPr>
+        <p:style>
+          <a:lnRef idx="1">
+            <a:schemeClr val="accent1"/>
+          </a:lnRef>
+          <a:fillRef idx="0">
+            <a:schemeClr val="accent1"/>
+          </a:fillRef>
+          <a:effectRef idx="0">
+            <a:schemeClr val="accent1"/>
+          </a:effectRef>
+          <a:fontRef idx="minor">
+            <a:schemeClr val="tx1"/>
+          </a:fontRef>
+        </p:style>
+      </p:cxnSp>
+      <p:sp>
+        <p:nvSpPr>
+          <p:cNvPr id="22" name="Rectángulo 21">
+            <a:extLst>
+              <a:ext uri="{FF2B5EF4-FFF2-40B4-BE49-F238E27FC236}">
+                <a16:creationId xmlns:a16="http://schemas.microsoft.com/office/drawing/2014/main" id="{99907C61-65AF-4125-869B-2BEA6183C59C}"/>
+              </a:ext>
+            </a:extLst>
+          </p:cNvPr>
+          <p:cNvSpPr/>
+          <p:nvPr/>
+        </p:nvSpPr>
+        <p:spPr>
+          <a:xfrm>
+            <a:off x="6904771" y="2134428"/>
             <a:ext cx="689542" cy="343627"/>
           </a:xfrm>
           <a:prstGeom prst="rect">
@@ -3450,12 +3672,78 @@
           </a:p>
         </p:txBody>
       </p:sp>
+      <p:sp>
+        <p:nvSpPr>
+          <p:cNvPr id="23" name="Rectángulo 22">
+            <a:extLst>
+              <a:ext uri="{FF2B5EF4-FFF2-40B4-BE49-F238E27FC236}">
+                <a16:creationId xmlns:a16="http://schemas.microsoft.com/office/drawing/2014/main" id="{367D1D9C-8EE4-473A-A09C-40C1DE3534A7}"/>
+              </a:ext>
+            </a:extLst>
+          </p:cNvPr>
+          <p:cNvSpPr/>
+          <p:nvPr/>
+        </p:nvSpPr>
+        <p:spPr>
+          <a:xfrm>
+            <a:off x="6900419" y="3526243"/>
+            <a:ext cx="689542" cy="343627"/>
+          </a:xfrm>
+          <a:prstGeom prst="rect">
+            <a:avLst/>
+          </a:prstGeom>
+          <a:solidFill>
+            <a:schemeClr val="accent6">
+              <a:lumMod val="60000"/>
+              <a:lumOff val="40000"/>
+            </a:schemeClr>
+          </a:solidFill>
+          <a:ln>
+            <a:solidFill>
+              <a:schemeClr val="tx1"/>
+            </a:solidFill>
+          </a:ln>
+        </p:spPr>
+        <p:style>
+          <a:lnRef idx="2">
+            <a:schemeClr val="accent1">
+              <a:shade val="50000"/>
+            </a:schemeClr>
+          </a:lnRef>
+          <a:fillRef idx="1">
+            <a:schemeClr val="accent1"/>
+          </a:fillRef>
+          <a:effectRef idx="0">
+            <a:schemeClr val="accent1"/>
+          </a:effectRef>
+          <a:fontRef idx="minor">
+            <a:schemeClr val="lt1"/>
+          </a:fontRef>
+        </p:style>
+        <p:txBody>
+          <a:bodyPr rtlCol="0" anchor="ctr"/>
+          <a:lstStyle/>
+          <a:p>
+            <a:pPr algn="ctr"/>
+            <a:r>
+              <a:rPr lang="es-MX" sz="2000" b="1" dirty="0">
+                <a:solidFill>
+                  <a:schemeClr val="tx1"/>
+                </a:solidFill>
+                <a:latin typeface="Arial" panose="020B0604020202020204" pitchFamily="34" charset="0"/>
+                <a:cs typeface="Arial" panose="020B0604020202020204" pitchFamily="34" charset="0"/>
+              </a:rPr>
+              <a:t>O(1)</a:t>
+            </a:r>
+          </a:p>
+        </p:txBody>
+      </p:sp>
       <p:cxnSp>
         <p:nvCxnSpPr>
-          <p:cNvPr id="20" name="Conector recto de flecha 19">
-            <a:extLst>
-              <a:ext uri="{FF2B5EF4-FFF2-40B4-BE49-F238E27FC236}">
-                <a16:creationId xmlns:a16="http://schemas.microsoft.com/office/drawing/2014/main" id="{A796CB65-66AC-4DD0-BDC8-D682DD6F3EAE}"/>
+          <p:cNvPr id="25" name="Conector recto de flecha 24">
+            <a:extLst>
+              <a:ext uri="{FF2B5EF4-FFF2-40B4-BE49-F238E27FC236}">
+                <a16:creationId xmlns:a16="http://schemas.microsoft.com/office/drawing/2014/main" id="{3CB59F64-58E0-4467-87F3-E694854258F1}"/>
               </a:ext>
             </a:extLst>
           </p:cNvPr>
@@ -3466,15 +3754,15 @@
         </p:nvCxnSpPr>
         <p:spPr>
           <a:xfrm>
-            <a:off x="3140765" y="2104817"/>
-            <a:ext cx="2115962" cy="0"/>
+            <a:off x="4603898" y="2306242"/>
+            <a:ext cx="2222383" cy="0"/>
           </a:xfrm>
           <a:prstGeom prst="straightConnector1">
             <a:avLst/>
           </a:prstGeom>
           <a:ln w="38100">
             <a:solidFill>
-              <a:schemeClr val="accent2">
+              <a:schemeClr val="accent6">
                 <a:lumMod val="60000"/>
                 <a:lumOff val="40000"/>
               </a:schemeClr>
@@ -3497,12 +3785,59 @@
           </a:fontRef>
         </p:style>
       </p:cxnSp>
-      <p:sp>
-        <p:nvSpPr>
-          <p:cNvPr id="21" name="Rectángulo 20">
-            <a:extLst>
-              <a:ext uri="{FF2B5EF4-FFF2-40B4-BE49-F238E27FC236}">
-                <a16:creationId xmlns:a16="http://schemas.microsoft.com/office/drawing/2014/main" id="{C873419F-B906-46B3-9C9A-42EFC44C8975}"/>
+      <p:cxnSp>
+        <p:nvCxnSpPr>
+          <p:cNvPr id="29" name="Conector recto de flecha 28">
+            <a:extLst>
+              <a:ext uri="{FF2B5EF4-FFF2-40B4-BE49-F238E27FC236}">
+                <a16:creationId xmlns:a16="http://schemas.microsoft.com/office/drawing/2014/main" id="{9BD859C2-F4C8-477F-AF96-52313A5DE4FB}"/>
+              </a:ext>
+            </a:extLst>
+          </p:cNvPr>
+          <p:cNvCxnSpPr>
+            <a:cxnSpLocks/>
+          </p:cNvCxnSpPr>
+          <p:nvPr/>
+        </p:nvCxnSpPr>
+        <p:spPr>
+          <a:xfrm>
+            <a:off x="6312366" y="3698057"/>
+            <a:ext cx="513915" cy="1"/>
+          </a:xfrm>
+          <a:prstGeom prst="straightConnector1">
+            <a:avLst/>
+          </a:prstGeom>
+          <a:ln w="38100">
+            <a:solidFill>
+              <a:schemeClr val="accent6">
+                <a:lumMod val="60000"/>
+                <a:lumOff val="40000"/>
+              </a:schemeClr>
+            </a:solidFill>
+            <a:tailEnd type="triangle"/>
+          </a:ln>
+        </p:spPr>
+        <p:style>
+          <a:lnRef idx="1">
+            <a:schemeClr val="accent1"/>
+          </a:lnRef>
+          <a:fillRef idx="0">
+            <a:schemeClr val="accent1"/>
+          </a:fillRef>
+          <a:effectRef idx="0">
+            <a:schemeClr val="accent1"/>
+          </a:effectRef>
+          <a:fontRef idx="minor">
+            <a:schemeClr val="tx1"/>
+          </a:fontRef>
+        </p:style>
+      </p:cxnSp>
+      <p:sp>
+        <p:nvSpPr>
+          <p:cNvPr id="33" name="Rectángulo 32">
+            <a:extLst>
+              <a:ext uri="{FF2B5EF4-FFF2-40B4-BE49-F238E27FC236}">
+                <a16:creationId xmlns:a16="http://schemas.microsoft.com/office/drawing/2014/main" id="{EBACB69E-2951-4A91-9B50-6C713A058583}"/>
               </a:ext>
             </a:extLst>
           </p:cNvPr>
@@ -3511,8 +3846,239 @@
         </p:nvSpPr>
         <p:spPr>
           <a:xfrm>
-            <a:off x="5402924" y="1599645"/>
-            <a:ext cx="5804452" cy="606057"/>
+            <a:off x="6900419" y="3958347"/>
+            <a:ext cx="689542" cy="343627"/>
+          </a:xfrm>
+          <a:prstGeom prst="rect">
+            <a:avLst/>
+          </a:prstGeom>
+          <a:solidFill>
+            <a:schemeClr val="accent6">
+              <a:lumMod val="60000"/>
+              <a:lumOff val="40000"/>
+            </a:schemeClr>
+          </a:solidFill>
+          <a:ln>
+            <a:solidFill>
+              <a:schemeClr val="tx1"/>
+            </a:solidFill>
+          </a:ln>
+        </p:spPr>
+        <p:style>
+          <a:lnRef idx="2">
+            <a:schemeClr val="accent1">
+              <a:shade val="50000"/>
+            </a:schemeClr>
+          </a:lnRef>
+          <a:fillRef idx="1">
+            <a:schemeClr val="accent1"/>
+          </a:fillRef>
+          <a:effectRef idx="0">
+            <a:schemeClr val="accent1"/>
+          </a:effectRef>
+          <a:fontRef idx="minor">
+            <a:schemeClr val="lt1"/>
+          </a:fontRef>
+        </p:style>
+        <p:txBody>
+          <a:bodyPr rtlCol="0" anchor="ctr"/>
+          <a:lstStyle/>
+          <a:p>
+            <a:pPr algn="ctr"/>
+            <a:r>
+              <a:rPr lang="es-MX" sz="2000" b="1" dirty="0">
+                <a:solidFill>
+                  <a:schemeClr val="tx1"/>
+                </a:solidFill>
+                <a:latin typeface="Arial" panose="020B0604020202020204" pitchFamily="34" charset="0"/>
+                <a:cs typeface="Arial" panose="020B0604020202020204" pitchFamily="34" charset="0"/>
+              </a:rPr>
+              <a:t>O(1)</a:t>
+            </a:r>
+          </a:p>
+        </p:txBody>
+      </p:sp>
+      <p:cxnSp>
+        <p:nvCxnSpPr>
+          <p:cNvPr id="34" name="Conector recto de flecha 33">
+            <a:extLst>
+              <a:ext uri="{FF2B5EF4-FFF2-40B4-BE49-F238E27FC236}">
+                <a16:creationId xmlns:a16="http://schemas.microsoft.com/office/drawing/2014/main" id="{A745A011-C204-4F0C-85DA-78ABBB615FE9}"/>
+              </a:ext>
+            </a:extLst>
+          </p:cNvPr>
+          <p:cNvCxnSpPr>
+            <a:cxnSpLocks/>
+          </p:cNvCxnSpPr>
+          <p:nvPr/>
+        </p:nvCxnSpPr>
+        <p:spPr>
+          <a:xfrm flipV="1">
+            <a:off x="4859079" y="4130160"/>
+            <a:ext cx="1967202" cy="1"/>
+          </a:xfrm>
+          <a:prstGeom prst="straightConnector1">
+            <a:avLst/>
+          </a:prstGeom>
+          <a:ln w="38100">
+            <a:solidFill>
+              <a:schemeClr val="accent6">
+                <a:lumMod val="60000"/>
+                <a:lumOff val="40000"/>
+              </a:schemeClr>
+            </a:solidFill>
+            <a:tailEnd type="triangle"/>
+          </a:ln>
+        </p:spPr>
+        <p:style>
+          <a:lnRef idx="1">
+            <a:schemeClr val="accent1"/>
+          </a:lnRef>
+          <a:fillRef idx="0">
+            <a:schemeClr val="accent1"/>
+          </a:fillRef>
+          <a:effectRef idx="0">
+            <a:schemeClr val="accent1"/>
+          </a:effectRef>
+          <a:fontRef idx="minor">
+            <a:schemeClr val="tx1"/>
+          </a:fontRef>
+        </p:style>
+      </p:cxnSp>
+      <p:sp>
+        <p:nvSpPr>
+          <p:cNvPr id="43" name="Rectángulo 42">
+            <a:extLst>
+              <a:ext uri="{FF2B5EF4-FFF2-40B4-BE49-F238E27FC236}">
+                <a16:creationId xmlns:a16="http://schemas.microsoft.com/office/drawing/2014/main" id="{54454E89-48B8-4256-BE44-A0F80B6AD061}"/>
+              </a:ext>
+            </a:extLst>
+          </p:cNvPr>
+          <p:cNvSpPr/>
+          <p:nvPr/>
+        </p:nvSpPr>
+        <p:spPr>
+          <a:xfrm>
+            <a:off x="8197551" y="3507476"/>
+            <a:ext cx="689542" cy="343627"/>
+          </a:xfrm>
+          <a:prstGeom prst="rect">
+            <a:avLst/>
+          </a:prstGeom>
+          <a:solidFill>
+            <a:srgbClr val="FFC000"/>
+          </a:solidFill>
+          <a:ln>
+            <a:solidFill>
+              <a:schemeClr val="tx1"/>
+            </a:solidFill>
+          </a:ln>
+        </p:spPr>
+        <p:style>
+          <a:lnRef idx="2">
+            <a:schemeClr val="accent1">
+              <a:shade val="50000"/>
+            </a:schemeClr>
+          </a:lnRef>
+          <a:fillRef idx="1">
+            <a:schemeClr val="accent1"/>
+          </a:fillRef>
+          <a:effectRef idx="0">
+            <a:schemeClr val="accent1"/>
+          </a:effectRef>
+          <a:fontRef idx="minor">
+            <a:schemeClr val="lt1"/>
+          </a:fontRef>
+        </p:style>
+        <p:txBody>
+          <a:bodyPr rtlCol="0" anchor="ctr"/>
+          <a:lstStyle/>
+          <a:p>
+            <a:pPr algn="ctr"/>
+            <a:r>
+              <a:rPr lang="es-MX" sz="2000" b="1" dirty="0">
+                <a:solidFill>
+                  <a:schemeClr val="tx1"/>
+                </a:solidFill>
+                <a:latin typeface="Arial" panose="020B0604020202020204" pitchFamily="34" charset="0"/>
+                <a:cs typeface="Arial" panose="020B0604020202020204" pitchFamily="34" charset="0"/>
+              </a:rPr>
+              <a:t>O(1)</a:t>
+            </a:r>
+          </a:p>
+        </p:txBody>
+      </p:sp>
+      <p:sp>
+        <p:nvSpPr>
+          <p:cNvPr id="44" name="Abrir llave 43">
+            <a:extLst>
+              <a:ext uri="{FF2B5EF4-FFF2-40B4-BE49-F238E27FC236}">
+                <a16:creationId xmlns:a16="http://schemas.microsoft.com/office/drawing/2014/main" id="{F75883EE-EF8B-4094-961E-3DCA3CB32BD2}"/>
+              </a:ext>
+            </a:extLst>
+          </p:cNvPr>
+          <p:cNvSpPr/>
+          <p:nvPr/>
+        </p:nvSpPr>
+        <p:spPr>
+          <a:xfrm rot="10800000">
+            <a:off x="7751463" y="3274842"/>
+            <a:ext cx="190641" cy="855303"/>
+          </a:xfrm>
+          <a:prstGeom prst="leftBrace">
+            <a:avLst>
+              <a:gd name="adj1" fmla="val 70132"/>
+              <a:gd name="adj2" fmla="val 52844"/>
+            </a:avLst>
+          </a:prstGeom>
+          <a:solidFill>
+            <a:schemeClr val="bg1"/>
+          </a:solidFill>
+          <a:ln w="38100">
+            <a:solidFill>
+              <a:schemeClr val="tx1"/>
+            </a:solidFill>
+          </a:ln>
+        </p:spPr>
+        <p:style>
+          <a:lnRef idx="1">
+            <a:schemeClr val="accent1"/>
+          </a:lnRef>
+          <a:fillRef idx="0">
+            <a:schemeClr val="accent1"/>
+          </a:fillRef>
+          <a:effectRef idx="0">
+            <a:schemeClr val="accent1"/>
+          </a:effectRef>
+          <a:fontRef idx="minor">
+            <a:schemeClr val="tx1"/>
+          </a:fontRef>
+        </p:style>
+        <p:txBody>
+          <a:bodyPr rtlCol="0" anchor="ctr"/>
+          <a:lstStyle/>
+          <a:p>
+            <a:pPr algn="ctr"/>
+            <a:endParaRPr lang="es-MX"/>
+          </a:p>
+        </p:txBody>
+      </p:sp>
+      <p:sp>
+        <p:nvSpPr>
+          <p:cNvPr id="45" name="Rectángulo 44">
+            <a:extLst>
+              <a:ext uri="{FF2B5EF4-FFF2-40B4-BE49-F238E27FC236}">
+                <a16:creationId xmlns:a16="http://schemas.microsoft.com/office/drawing/2014/main" id="{5B07B18E-36DD-4496-947F-4A50732F258F}"/>
+              </a:ext>
+            </a:extLst>
+          </p:cNvPr>
+          <p:cNvSpPr/>
+          <p:nvPr/>
+        </p:nvSpPr>
+        <p:spPr>
+          <a:xfrm>
+            <a:off x="5842680" y="63343"/>
+            <a:ext cx="6262796" cy="994583"/>
           </a:xfrm>
           <a:prstGeom prst="rect">
             <a:avLst/>
@@ -3549,70 +4115,6 @@
           <a:bodyPr rtlCol="0" anchor="ctr"/>
           <a:lstStyle/>
           <a:p>
-            <a:pPr algn="ctr"/>
-            <a:r>
-              <a:rPr lang="es-MX" b="1" dirty="0">
-                <a:solidFill>
-                  <a:schemeClr val="tx1"/>
-                </a:solidFill>
-                <a:latin typeface="Arial" panose="020B0604020202020204" pitchFamily="34" charset="0"/>
-                <a:cs typeface="Arial" panose="020B0604020202020204" pitchFamily="34" charset="0"/>
-              </a:rPr>
-              <a:t>Peor caso: El dato no esta en el arreglo y se recorre completo. Se repite n veces</a:t>
-            </a:r>
-          </a:p>
-        </p:txBody>
-      </p:sp>
-      <p:sp>
-        <p:nvSpPr>
-          <p:cNvPr id="23" name="Rectángulo 22">
-            <a:extLst>
-              <a:ext uri="{FF2B5EF4-FFF2-40B4-BE49-F238E27FC236}">
-                <a16:creationId xmlns:a16="http://schemas.microsoft.com/office/drawing/2014/main" id="{4E667415-AF49-4CC9-A0C9-AA091E996FF3}"/>
-              </a:ext>
-            </a:extLst>
-          </p:cNvPr>
-          <p:cNvSpPr/>
-          <p:nvPr/>
-        </p:nvSpPr>
-        <p:spPr>
-          <a:xfrm>
-            <a:off x="6113253" y="3210918"/>
-            <a:ext cx="689542" cy="343627"/>
-          </a:xfrm>
-          <a:prstGeom prst="rect">
-            <a:avLst/>
-          </a:prstGeom>
-          <a:solidFill>
-            <a:srgbClr val="FFC000"/>
-          </a:solidFill>
-          <a:ln>
-            <a:solidFill>
-              <a:schemeClr val="tx1"/>
-            </a:solidFill>
-          </a:ln>
-        </p:spPr>
-        <p:style>
-          <a:lnRef idx="2">
-            <a:schemeClr val="accent1">
-              <a:shade val="50000"/>
-            </a:schemeClr>
-          </a:lnRef>
-          <a:fillRef idx="1">
-            <a:schemeClr val="accent1"/>
-          </a:fillRef>
-          <a:effectRef idx="0">
-            <a:schemeClr val="accent1"/>
-          </a:effectRef>
-          <a:fontRef idx="minor">
-            <a:schemeClr val="lt1"/>
-          </a:fontRef>
-        </p:style>
-        <p:txBody>
-          <a:bodyPr rtlCol="0" anchor="ctr"/>
-          <a:lstStyle/>
-          <a:p>
-            <a:pPr algn="ctr"/>
             <a:r>
               <a:rPr lang="es-MX" sz="2000" b="1" dirty="0">
                 <a:solidFill>
@@ -3621,61 +4123,10 @@
                 <a:latin typeface="Arial" panose="020B0604020202020204" pitchFamily="34" charset="0"/>
                 <a:cs typeface="Arial" panose="020B0604020202020204" pitchFamily="34" charset="0"/>
               </a:rPr>
-              <a:t>O(1)</a:t>
-            </a:r>
-          </a:p>
-        </p:txBody>
-      </p:sp>
-      <p:sp>
-        <p:nvSpPr>
-          <p:cNvPr id="25" name="Rectángulo 24">
-            <a:extLst>
-              <a:ext uri="{FF2B5EF4-FFF2-40B4-BE49-F238E27FC236}">
-                <a16:creationId xmlns:a16="http://schemas.microsoft.com/office/drawing/2014/main" id="{EE567B99-0C15-4CD7-AD23-F838D4DE828D}"/>
-              </a:ext>
-            </a:extLst>
-          </p:cNvPr>
-          <p:cNvSpPr/>
-          <p:nvPr/>
-        </p:nvSpPr>
-        <p:spPr>
-          <a:xfrm>
-            <a:off x="6057200" y="4426817"/>
-            <a:ext cx="689542" cy="343627"/>
-          </a:xfrm>
-          <a:prstGeom prst="rect">
-            <a:avLst/>
-          </a:prstGeom>
-          <a:solidFill>
-            <a:srgbClr val="FFC000"/>
-          </a:solidFill>
-          <a:ln>
-            <a:solidFill>
-              <a:schemeClr val="tx1"/>
-            </a:solidFill>
-          </a:ln>
-        </p:spPr>
-        <p:style>
-          <a:lnRef idx="2">
-            <a:schemeClr val="accent1">
-              <a:shade val="50000"/>
-            </a:schemeClr>
-          </a:lnRef>
-          <a:fillRef idx="1">
-            <a:schemeClr val="accent1"/>
-          </a:fillRef>
-          <a:effectRef idx="0">
-            <a:schemeClr val="accent1"/>
-          </a:effectRef>
-          <a:fontRef idx="minor">
-            <a:schemeClr val="lt1"/>
-          </a:fontRef>
-        </p:style>
-        <p:txBody>
-          <a:bodyPr rtlCol="0" anchor="ctr"/>
-          <a:lstStyle/>
-          <a:p>
-            <a:pPr algn="ctr"/>
+              <a:t>Peor caso: Se repite veces.</a:t>
+            </a:r>
+          </a:p>
+          <a:p>
             <a:r>
               <a:rPr lang="es-MX" sz="2000" b="1" dirty="0">
                 <a:solidFill>
@@ -3684,813 +4135,15 @@
                 <a:latin typeface="Arial" panose="020B0604020202020204" pitchFamily="34" charset="0"/>
                 <a:cs typeface="Arial" panose="020B0604020202020204" pitchFamily="34" charset="0"/>
               </a:rPr>
-              <a:t>O(1)</a:t>
-            </a:r>
-          </a:p>
-        </p:txBody>
-      </p:sp>
-      <p:sp>
-        <p:nvSpPr>
-          <p:cNvPr id="32" name="Abrir llave 31">
-            <a:extLst>
-              <a:ext uri="{FF2B5EF4-FFF2-40B4-BE49-F238E27FC236}">
-                <a16:creationId xmlns:a16="http://schemas.microsoft.com/office/drawing/2014/main" id="{1D8FB2B7-C267-4F07-AADE-39080FF87D52}"/>
-              </a:ext>
-            </a:extLst>
-          </p:cNvPr>
-          <p:cNvSpPr/>
-          <p:nvPr/>
-        </p:nvSpPr>
-        <p:spPr>
-          <a:xfrm rot="10800000">
-            <a:off x="5402925" y="4384332"/>
-            <a:ext cx="333972" cy="465964"/>
-          </a:xfrm>
-          <a:prstGeom prst="leftBrace">
-            <a:avLst>
-              <a:gd name="adj1" fmla="val 70132"/>
-              <a:gd name="adj2" fmla="val 52844"/>
-            </a:avLst>
-          </a:prstGeom>
-          <a:solidFill>
-            <a:schemeClr val="bg1"/>
-          </a:solidFill>
-          <a:ln w="38100">
-            <a:solidFill>
-              <a:schemeClr val="tx1"/>
-            </a:solidFill>
-          </a:ln>
-        </p:spPr>
-        <p:style>
-          <a:lnRef idx="1">
-            <a:schemeClr val="accent1"/>
-          </a:lnRef>
-          <a:fillRef idx="0">
-            <a:schemeClr val="accent1"/>
-          </a:fillRef>
-          <a:effectRef idx="0">
-            <a:schemeClr val="accent1"/>
-          </a:effectRef>
-          <a:fontRef idx="minor">
-            <a:schemeClr val="tx1"/>
-          </a:fontRef>
-        </p:style>
-        <p:txBody>
-          <a:bodyPr rtlCol="0" anchor="ctr"/>
-          <a:lstStyle/>
-          <a:p>
-            <a:pPr algn="ctr"/>
-            <a:endParaRPr lang="es-MX"/>
-          </a:p>
-        </p:txBody>
-      </p:sp>
-      <p:cxnSp>
-        <p:nvCxnSpPr>
-          <p:cNvPr id="33" name="Conector recto 32">
-            <a:extLst>
-              <a:ext uri="{FF2B5EF4-FFF2-40B4-BE49-F238E27FC236}">
-                <a16:creationId xmlns:a16="http://schemas.microsoft.com/office/drawing/2014/main" id="{C8569A24-4EC2-4A7A-A03F-638B7D7324E0}"/>
-              </a:ext>
-            </a:extLst>
-          </p:cNvPr>
-          <p:cNvCxnSpPr>
-            <a:cxnSpLocks/>
-          </p:cNvCxnSpPr>
-          <p:nvPr/>
-        </p:nvCxnSpPr>
-        <p:spPr>
-          <a:xfrm>
-            <a:off x="4430966" y="4858413"/>
-            <a:ext cx="971958" cy="0"/>
-          </a:xfrm>
-          <a:prstGeom prst="line">
-            <a:avLst/>
-          </a:prstGeom>
-          <a:ln w="38100">
-            <a:solidFill>
-              <a:schemeClr val="tx1"/>
-            </a:solidFill>
-            <a:prstDash val="sysDot"/>
-          </a:ln>
-        </p:spPr>
-        <p:style>
-          <a:lnRef idx="1">
-            <a:schemeClr val="accent1"/>
-          </a:lnRef>
-          <a:fillRef idx="0">
-            <a:schemeClr val="accent1"/>
-          </a:fillRef>
-          <a:effectRef idx="0">
-            <a:schemeClr val="accent1"/>
-          </a:effectRef>
-          <a:fontRef idx="minor">
-            <a:schemeClr val="tx1"/>
-          </a:fontRef>
-        </p:style>
-      </p:cxnSp>
-      <p:sp>
-        <p:nvSpPr>
-          <p:cNvPr id="37" name="Rectángulo 36">
-            <a:extLst>
-              <a:ext uri="{FF2B5EF4-FFF2-40B4-BE49-F238E27FC236}">
-                <a16:creationId xmlns:a16="http://schemas.microsoft.com/office/drawing/2014/main" id="{CD164897-0B0B-4014-B3F1-DE56A38AE034}"/>
-              </a:ext>
-            </a:extLst>
-          </p:cNvPr>
-          <p:cNvSpPr/>
-          <p:nvPr/>
-        </p:nvSpPr>
-        <p:spPr>
-          <a:xfrm>
-            <a:off x="6057200" y="5088781"/>
-            <a:ext cx="689542" cy="343627"/>
-          </a:xfrm>
-          <a:prstGeom prst="rect">
-            <a:avLst/>
-          </a:prstGeom>
-          <a:solidFill>
-            <a:srgbClr val="FFC000"/>
-          </a:solidFill>
-          <a:ln>
-            <a:solidFill>
-              <a:schemeClr val="tx1"/>
-            </a:solidFill>
-          </a:ln>
-        </p:spPr>
-        <p:style>
-          <a:lnRef idx="2">
-            <a:schemeClr val="accent1">
-              <a:shade val="50000"/>
-            </a:schemeClr>
-          </a:lnRef>
-          <a:fillRef idx="1">
-            <a:schemeClr val="accent1"/>
-          </a:fillRef>
-          <a:effectRef idx="0">
-            <a:schemeClr val="accent1"/>
-          </a:effectRef>
-          <a:fontRef idx="minor">
-            <a:schemeClr val="lt1"/>
-          </a:fontRef>
-        </p:style>
-        <p:txBody>
-          <a:bodyPr rtlCol="0" anchor="ctr"/>
-          <a:lstStyle/>
-          <a:p>
-            <a:pPr algn="ctr"/>
-            <a:r>
-              <a:rPr lang="es-MX" sz="2000" b="1" dirty="0">
-                <a:solidFill>
-                  <a:schemeClr val="tx1"/>
-                </a:solidFill>
-                <a:latin typeface="Arial" panose="020B0604020202020204" pitchFamily="34" charset="0"/>
-                <a:cs typeface="Arial" panose="020B0604020202020204" pitchFamily="34" charset="0"/>
-              </a:rPr>
-              <a:t>O(1)</a:t>
-            </a:r>
-          </a:p>
-        </p:txBody>
-      </p:sp>
-      <p:sp>
-        <p:nvSpPr>
-          <p:cNvPr id="38" name="Abrir llave 37">
-            <a:extLst>
-              <a:ext uri="{FF2B5EF4-FFF2-40B4-BE49-F238E27FC236}">
-                <a16:creationId xmlns:a16="http://schemas.microsoft.com/office/drawing/2014/main" id="{A13DEAF9-F824-47FC-8F87-304FE40234FD}"/>
-              </a:ext>
-            </a:extLst>
-          </p:cNvPr>
-          <p:cNvSpPr/>
-          <p:nvPr/>
-        </p:nvSpPr>
-        <p:spPr>
-          <a:xfrm rot="10800000">
-            <a:off x="5402925" y="5046296"/>
-            <a:ext cx="333972" cy="465964"/>
-          </a:xfrm>
-          <a:prstGeom prst="leftBrace">
-            <a:avLst>
-              <a:gd name="adj1" fmla="val 70132"/>
-              <a:gd name="adj2" fmla="val 52844"/>
-            </a:avLst>
-          </a:prstGeom>
-          <a:solidFill>
-            <a:schemeClr val="bg1"/>
-          </a:solidFill>
-          <a:ln w="38100">
-            <a:solidFill>
-              <a:schemeClr val="tx1"/>
-            </a:solidFill>
-          </a:ln>
-        </p:spPr>
-        <p:style>
-          <a:lnRef idx="1">
-            <a:schemeClr val="accent1"/>
-          </a:lnRef>
-          <a:fillRef idx="0">
-            <a:schemeClr val="accent1"/>
-          </a:fillRef>
-          <a:effectRef idx="0">
-            <a:schemeClr val="accent1"/>
-          </a:effectRef>
-          <a:fontRef idx="minor">
-            <a:schemeClr val="tx1"/>
-          </a:fontRef>
-        </p:style>
-        <p:txBody>
-          <a:bodyPr rtlCol="0" anchor="ctr"/>
-          <a:lstStyle/>
-          <a:p>
-            <a:pPr algn="ctr"/>
-            <a:endParaRPr lang="es-MX"/>
-          </a:p>
-        </p:txBody>
-      </p:sp>
-      <p:cxnSp>
-        <p:nvCxnSpPr>
-          <p:cNvPr id="39" name="Conector recto 38">
-            <a:extLst>
-              <a:ext uri="{FF2B5EF4-FFF2-40B4-BE49-F238E27FC236}">
-                <a16:creationId xmlns:a16="http://schemas.microsoft.com/office/drawing/2014/main" id="{02904BC3-070D-4D77-8BCF-670AF0F27008}"/>
-              </a:ext>
-            </a:extLst>
-          </p:cNvPr>
-          <p:cNvCxnSpPr>
-            <a:cxnSpLocks/>
-          </p:cNvCxnSpPr>
-          <p:nvPr/>
-        </p:nvCxnSpPr>
-        <p:spPr>
-          <a:xfrm>
-            <a:off x="4430966" y="5520377"/>
-            <a:ext cx="971958" cy="0"/>
-          </a:xfrm>
-          <a:prstGeom prst="line">
-            <a:avLst/>
-          </a:prstGeom>
-          <a:ln w="38100">
-            <a:solidFill>
-              <a:schemeClr val="tx1"/>
-            </a:solidFill>
-            <a:prstDash val="sysDot"/>
-          </a:ln>
-        </p:spPr>
-        <p:style>
-          <a:lnRef idx="1">
-            <a:schemeClr val="accent1"/>
-          </a:lnRef>
-          <a:fillRef idx="0">
-            <a:schemeClr val="accent1"/>
-          </a:fillRef>
-          <a:effectRef idx="0">
-            <a:schemeClr val="accent1"/>
-          </a:effectRef>
-          <a:fontRef idx="minor">
-            <a:schemeClr val="tx1"/>
-          </a:fontRef>
-        </p:style>
-      </p:cxnSp>
-      <p:sp>
-        <p:nvSpPr>
-          <p:cNvPr id="40" name="Abrir llave 39">
-            <a:extLst>
-              <a:ext uri="{FF2B5EF4-FFF2-40B4-BE49-F238E27FC236}">
-                <a16:creationId xmlns:a16="http://schemas.microsoft.com/office/drawing/2014/main" id="{FD6E3053-FE36-48B1-A6DE-0FD4C94AF083}"/>
-              </a:ext>
-            </a:extLst>
-          </p:cNvPr>
-          <p:cNvSpPr/>
-          <p:nvPr/>
-        </p:nvSpPr>
-        <p:spPr>
-          <a:xfrm rot="10800000">
-            <a:off x="5460288" y="2780210"/>
-            <a:ext cx="333972" cy="1525814"/>
-          </a:xfrm>
-          <a:prstGeom prst="leftBrace">
-            <a:avLst>
-              <a:gd name="adj1" fmla="val 70132"/>
-              <a:gd name="adj2" fmla="val 52844"/>
-            </a:avLst>
-          </a:prstGeom>
-          <a:solidFill>
-            <a:schemeClr val="bg1"/>
-          </a:solidFill>
-          <a:ln w="38100">
-            <a:solidFill>
-              <a:schemeClr val="tx1"/>
-            </a:solidFill>
-          </a:ln>
-        </p:spPr>
-        <p:style>
-          <a:lnRef idx="1">
-            <a:schemeClr val="accent1"/>
-          </a:lnRef>
-          <a:fillRef idx="0">
-            <a:schemeClr val="accent1"/>
-          </a:fillRef>
-          <a:effectRef idx="0">
-            <a:schemeClr val="accent1"/>
-          </a:effectRef>
-          <a:fontRef idx="minor">
-            <a:schemeClr val="tx1"/>
-          </a:fontRef>
-        </p:style>
-        <p:txBody>
-          <a:bodyPr rtlCol="0" anchor="ctr"/>
-          <a:lstStyle/>
-          <a:p>
-            <a:pPr algn="ctr"/>
-            <a:endParaRPr lang="es-MX"/>
-          </a:p>
-        </p:txBody>
-      </p:sp>
-      <p:cxnSp>
-        <p:nvCxnSpPr>
-          <p:cNvPr id="41" name="Conector recto 40">
-            <a:extLst>
-              <a:ext uri="{FF2B5EF4-FFF2-40B4-BE49-F238E27FC236}">
-                <a16:creationId xmlns:a16="http://schemas.microsoft.com/office/drawing/2014/main" id="{1D4AE66C-1BA0-46D6-A8EE-52C7D7E372C8}"/>
-              </a:ext>
-            </a:extLst>
-          </p:cNvPr>
-          <p:cNvCxnSpPr>
-            <a:cxnSpLocks/>
-          </p:cNvCxnSpPr>
-          <p:nvPr/>
-        </p:nvCxnSpPr>
-        <p:spPr>
-          <a:xfrm>
-            <a:off x="4448181" y="4292136"/>
-            <a:ext cx="971958" cy="0"/>
-          </a:xfrm>
-          <a:prstGeom prst="line">
-            <a:avLst/>
-          </a:prstGeom>
-          <a:ln w="38100">
-            <a:solidFill>
-              <a:schemeClr val="tx1"/>
-            </a:solidFill>
-            <a:prstDash val="sysDot"/>
-          </a:ln>
-        </p:spPr>
-        <p:style>
-          <a:lnRef idx="1">
-            <a:schemeClr val="accent1"/>
-          </a:lnRef>
-          <a:fillRef idx="0">
-            <a:schemeClr val="accent1"/>
-          </a:fillRef>
-          <a:effectRef idx="0">
-            <a:schemeClr val="accent1"/>
-          </a:effectRef>
-          <a:fontRef idx="minor">
-            <a:schemeClr val="tx1"/>
-          </a:fontRef>
-        </p:style>
-      </p:cxnSp>
-      <p:sp>
-        <p:nvSpPr>
-          <p:cNvPr id="42" name="Abrir llave 41">
-            <a:extLst>
-              <a:ext uri="{FF2B5EF4-FFF2-40B4-BE49-F238E27FC236}">
-                <a16:creationId xmlns:a16="http://schemas.microsoft.com/office/drawing/2014/main" id="{8E3CDD7F-193C-425D-A82F-29E2892CD18B}"/>
-              </a:ext>
-            </a:extLst>
-          </p:cNvPr>
-          <p:cNvSpPr/>
-          <p:nvPr/>
-        </p:nvSpPr>
-        <p:spPr>
-          <a:xfrm rot="10800000">
-            <a:off x="8333228" y="2393584"/>
-            <a:ext cx="333972" cy="3358699"/>
-          </a:xfrm>
-          <a:prstGeom prst="leftBrace">
-            <a:avLst>
-              <a:gd name="adj1" fmla="val 70132"/>
-              <a:gd name="adj2" fmla="val 52844"/>
-            </a:avLst>
-          </a:prstGeom>
-          <a:solidFill>
-            <a:schemeClr val="bg1"/>
-          </a:solidFill>
-          <a:ln w="38100">
-            <a:solidFill>
-              <a:schemeClr val="tx1"/>
-            </a:solidFill>
-          </a:ln>
-        </p:spPr>
-        <p:style>
-          <a:lnRef idx="1">
-            <a:schemeClr val="accent1"/>
-          </a:lnRef>
-          <a:fillRef idx="0">
-            <a:schemeClr val="accent1"/>
-          </a:fillRef>
-          <a:effectRef idx="0">
-            <a:schemeClr val="accent1"/>
-          </a:effectRef>
-          <a:fontRef idx="minor">
-            <a:schemeClr val="tx1"/>
-          </a:fontRef>
-        </p:style>
-        <p:txBody>
-          <a:bodyPr rtlCol="0" anchor="ctr"/>
-          <a:lstStyle/>
-          <a:p>
-            <a:pPr algn="ctr"/>
-            <a:endParaRPr lang="es-MX"/>
-          </a:p>
-        </p:txBody>
-      </p:sp>
-      <p:cxnSp>
-        <p:nvCxnSpPr>
-          <p:cNvPr id="44" name="Conector recto 43">
-            <a:extLst>
-              <a:ext uri="{FF2B5EF4-FFF2-40B4-BE49-F238E27FC236}">
-                <a16:creationId xmlns:a16="http://schemas.microsoft.com/office/drawing/2014/main" id="{DC136E62-364C-4DC5-BA42-2430C49F574C}"/>
-              </a:ext>
-            </a:extLst>
-          </p:cNvPr>
-          <p:cNvCxnSpPr>
-            <a:cxnSpLocks/>
-          </p:cNvCxnSpPr>
-          <p:nvPr/>
-        </p:nvCxnSpPr>
-        <p:spPr>
-          <a:xfrm>
-            <a:off x="3234924" y="5752290"/>
-            <a:ext cx="5098304" cy="0"/>
-          </a:xfrm>
-          <a:prstGeom prst="line">
-            <a:avLst/>
-          </a:prstGeom>
-          <a:ln w="38100">
-            <a:solidFill>
-              <a:schemeClr val="tx1"/>
-            </a:solidFill>
-            <a:prstDash val="sysDot"/>
-          </a:ln>
-        </p:spPr>
-        <p:style>
-          <a:lnRef idx="1">
-            <a:schemeClr val="accent1"/>
-          </a:lnRef>
-          <a:fillRef idx="0">
-            <a:schemeClr val="accent1"/>
-          </a:fillRef>
-          <a:effectRef idx="0">
-            <a:schemeClr val="accent1"/>
-          </a:effectRef>
-          <a:fontRef idx="minor">
-            <a:schemeClr val="tx1"/>
-          </a:fontRef>
-        </p:style>
-      </p:cxnSp>
-      <p:sp>
-        <p:nvSpPr>
-          <p:cNvPr id="46" name="Rectángulo 45">
-            <a:extLst>
-              <a:ext uri="{FF2B5EF4-FFF2-40B4-BE49-F238E27FC236}">
-                <a16:creationId xmlns:a16="http://schemas.microsoft.com/office/drawing/2014/main" id="{4F4F54D5-8029-41FB-A77C-81B3C8059776}"/>
-              </a:ext>
-            </a:extLst>
-          </p:cNvPr>
-          <p:cNvSpPr/>
-          <p:nvPr/>
-        </p:nvSpPr>
-        <p:spPr>
-          <a:xfrm>
-            <a:off x="9020800" y="3781819"/>
-            <a:ext cx="843393" cy="343627"/>
-          </a:xfrm>
-          <a:prstGeom prst="rect">
-            <a:avLst/>
-          </a:prstGeom>
-          <a:solidFill>
-            <a:schemeClr val="accent5">
-              <a:lumMod val="60000"/>
-              <a:lumOff val="40000"/>
-            </a:schemeClr>
-          </a:solidFill>
-          <a:ln>
-            <a:solidFill>
-              <a:schemeClr val="tx1"/>
-            </a:solidFill>
-          </a:ln>
-        </p:spPr>
-        <p:style>
-          <a:lnRef idx="2">
-            <a:schemeClr val="accent1">
-              <a:shade val="50000"/>
-            </a:schemeClr>
-          </a:lnRef>
-          <a:fillRef idx="1">
-            <a:schemeClr val="accent1"/>
-          </a:fillRef>
-          <a:effectRef idx="0">
-            <a:schemeClr val="accent1"/>
-          </a:effectRef>
-          <a:fontRef idx="minor">
-            <a:schemeClr val="lt1"/>
-          </a:fontRef>
-        </p:style>
-        <p:txBody>
-          <a:bodyPr rtlCol="0" anchor="ctr"/>
-          <a:lstStyle/>
-          <a:p>
-            <a:pPr algn="ctr"/>
-            <a:r>
-              <a:rPr lang="es-MX" sz="2000" b="1" dirty="0">
-                <a:solidFill>
-                  <a:schemeClr val="tx1"/>
-                </a:solidFill>
-                <a:latin typeface="Arial" panose="020B0604020202020204" pitchFamily="34" charset="0"/>
-                <a:cs typeface="Arial" panose="020B0604020202020204" pitchFamily="34" charset="0"/>
-              </a:rPr>
-              <a:t>O(n)</a:t>
-            </a:r>
-          </a:p>
-        </p:txBody>
-      </p:sp>
-      <p:cxnSp>
-        <p:nvCxnSpPr>
-          <p:cNvPr id="48" name="Conector recto de flecha 47">
-            <a:extLst>
-              <a:ext uri="{FF2B5EF4-FFF2-40B4-BE49-F238E27FC236}">
-                <a16:creationId xmlns:a16="http://schemas.microsoft.com/office/drawing/2014/main" id="{554D4DB3-8406-4412-BD1D-3E88ABC4B38E}"/>
-              </a:ext>
-            </a:extLst>
-          </p:cNvPr>
-          <p:cNvCxnSpPr>
-            <a:cxnSpLocks/>
-          </p:cNvCxnSpPr>
-          <p:nvPr/>
-        </p:nvCxnSpPr>
-        <p:spPr>
-          <a:xfrm flipV="1">
-            <a:off x="4633571" y="2617040"/>
-            <a:ext cx="1088918" cy="2153"/>
-          </a:xfrm>
-          <a:prstGeom prst="straightConnector1">
-            <a:avLst/>
-          </a:prstGeom>
-          <a:ln w="38100">
-            <a:solidFill>
-              <a:schemeClr val="accent6">
-                <a:lumMod val="60000"/>
-                <a:lumOff val="40000"/>
-              </a:schemeClr>
-            </a:solidFill>
-            <a:tailEnd type="triangle"/>
-          </a:ln>
-        </p:spPr>
-        <p:style>
-          <a:lnRef idx="1">
-            <a:schemeClr val="accent1"/>
-          </a:lnRef>
-          <a:fillRef idx="0">
-            <a:schemeClr val="accent1"/>
-          </a:fillRef>
-          <a:effectRef idx="0">
-            <a:schemeClr val="accent1"/>
-          </a:effectRef>
-          <a:fontRef idx="minor">
-            <a:schemeClr val="tx1"/>
-          </a:fontRef>
-        </p:style>
-      </p:cxnSp>
-      <p:sp>
-        <p:nvSpPr>
-          <p:cNvPr id="50" name="Rectángulo 49">
-            <a:extLst>
-              <a:ext uri="{FF2B5EF4-FFF2-40B4-BE49-F238E27FC236}">
-                <a16:creationId xmlns:a16="http://schemas.microsoft.com/office/drawing/2014/main" id="{C21F0A1A-8BBC-4791-9C46-DAB079519757}"/>
-              </a:ext>
-            </a:extLst>
-          </p:cNvPr>
-          <p:cNvSpPr/>
-          <p:nvPr/>
-        </p:nvSpPr>
-        <p:spPr>
-          <a:xfrm>
-            <a:off x="4558533" y="2737211"/>
-            <a:ext cx="689542" cy="343627"/>
-          </a:xfrm>
-          <a:prstGeom prst="rect">
-            <a:avLst/>
-          </a:prstGeom>
-          <a:solidFill>
-            <a:schemeClr val="accent6">
-              <a:lumMod val="60000"/>
-              <a:lumOff val="40000"/>
-            </a:schemeClr>
-          </a:solidFill>
-          <a:ln>
-            <a:solidFill>
-              <a:schemeClr val="tx1"/>
-            </a:solidFill>
-          </a:ln>
-        </p:spPr>
-        <p:style>
-          <a:lnRef idx="2">
-            <a:schemeClr val="accent1">
-              <a:shade val="50000"/>
-            </a:schemeClr>
-          </a:lnRef>
-          <a:fillRef idx="1">
-            <a:schemeClr val="accent1"/>
-          </a:fillRef>
-          <a:effectRef idx="0">
-            <a:schemeClr val="accent1"/>
-          </a:effectRef>
-          <a:fontRef idx="minor">
-            <a:schemeClr val="lt1"/>
-          </a:fontRef>
-        </p:style>
-        <p:txBody>
-          <a:bodyPr rtlCol="0" anchor="ctr"/>
-          <a:lstStyle/>
-          <a:p>
-            <a:pPr algn="ctr"/>
-            <a:r>
-              <a:rPr lang="es-MX" sz="2000" b="1" dirty="0">
-                <a:solidFill>
-                  <a:schemeClr val="tx1"/>
-                </a:solidFill>
-                <a:latin typeface="Arial" panose="020B0604020202020204" pitchFamily="34" charset="0"/>
-                <a:cs typeface="Arial" panose="020B0604020202020204" pitchFamily="34" charset="0"/>
-              </a:rPr>
-              <a:t>O(1)</a:t>
-            </a:r>
-          </a:p>
-        </p:txBody>
-      </p:sp>
-      <p:cxnSp>
-        <p:nvCxnSpPr>
-          <p:cNvPr id="51" name="Conector recto de flecha 50">
-            <a:extLst>
-              <a:ext uri="{FF2B5EF4-FFF2-40B4-BE49-F238E27FC236}">
-                <a16:creationId xmlns:a16="http://schemas.microsoft.com/office/drawing/2014/main" id="{812B7F13-154A-49DC-947F-86E4070C1EED}"/>
-              </a:ext>
-            </a:extLst>
-          </p:cNvPr>
-          <p:cNvCxnSpPr>
-            <a:cxnSpLocks/>
-          </p:cNvCxnSpPr>
-          <p:nvPr/>
-        </p:nvCxnSpPr>
-        <p:spPr>
-          <a:xfrm flipV="1">
-            <a:off x="4057286" y="2960666"/>
-            <a:ext cx="445023" cy="7368"/>
-          </a:xfrm>
-          <a:prstGeom prst="straightConnector1">
-            <a:avLst/>
-          </a:prstGeom>
-          <a:ln w="38100">
-            <a:solidFill>
-              <a:schemeClr val="accent6">
-                <a:lumMod val="60000"/>
-                <a:lumOff val="40000"/>
-              </a:schemeClr>
-            </a:solidFill>
-            <a:tailEnd type="triangle"/>
-          </a:ln>
-        </p:spPr>
-        <p:style>
-          <a:lnRef idx="1">
-            <a:schemeClr val="accent1"/>
-          </a:lnRef>
-          <a:fillRef idx="0">
-            <a:schemeClr val="accent1"/>
-          </a:fillRef>
-          <a:effectRef idx="0">
-            <a:schemeClr val="accent1"/>
-          </a:effectRef>
-          <a:fontRef idx="minor">
-            <a:schemeClr val="tx1"/>
-          </a:fontRef>
-        </p:style>
-      </p:cxnSp>
-      <p:sp>
-        <p:nvSpPr>
-          <p:cNvPr id="53" name="Rectángulo 52">
-            <a:extLst>
-              <a:ext uri="{FF2B5EF4-FFF2-40B4-BE49-F238E27FC236}">
-                <a16:creationId xmlns:a16="http://schemas.microsoft.com/office/drawing/2014/main" id="{EC8FCC30-0FD0-4B23-8FDE-014BFFDD8F7D}"/>
-              </a:ext>
-            </a:extLst>
-          </p:cNvPr>
-          <p:cNvSpPr/>
-          <p:nvPr/>
-        </p:nvSpPr>
-        <p:spPr>
-          <a:xfrm>
-            <a:off x="4043228" y="3756740"/>
-            <a:ext cx="689542" cy="343627"/>
-          </a:xfrm>
-          <a:prstGeom prst="rect">
-            <a:avLst/>
-          </a:prstGeom>
-          <a:solidFill>
-            <a:schemeClr val="accent6">
-              <a:lumMod val="60000"/>
-              <a:lumOff val="40000"/>
-            </a:schemeClr>
-          </a:solidFill>
-          <a:ln>
-            <a:solidFill>
-              <a:schemeClr val="tx1"/>
-            </a:solidFill>
-          </a:ln>
-        </p:spPr>
-        <p:style>
-          <a:lnRef idx="2">
-            <a:schemeClr val="accent1">
-              <a:shade val="50000"/>
-            </a:schemeClr>
-          </a:lnRef>
-          <a:fillRef idx="1">
-            <a:schemeClr val="accent1"/>
-          </a:fillRef>
-          <a:effectRef idx="0">
-            <a:schemeClr val="accent1"/>
-          </a:effectRef>
-          <a:fontRef idx="minor">
-            <a:schemeClr val="lt1"/>
-          </a:fontRef>
-        </p:style>
-        <p:txBody>
-          <a:bodyPr rtlCol="0" anchor="ctr"/>
-          <a:lstStyle/>
-          <a:p>
-            <a:pPr algn="ctr"/>
-            <a:r>
-              <a:rPr lang="es-MX" sz="2000" b="1" dirty="0">
-                <a:solidFill>
-                  <a:schemeClr val="tx1"/>
-                </a:solidFill>
-                <a:latin typeface="Arial" panose="020B0604020202020204" pitchFamily="34" charset="0"/>
-                <a:cs typeface="Arial" panose="020B0604020202020204" pitchFamily="34" charset="0"/>
-              </a:rPr>
-              <a:t>O(1)</a:t>
-            </a:r>
-          </a:p>
-        </p:txBody>
-      </p:sp>
-      <p:cxnSp>
-        <p:nvCxnSpPr>
-          <p:cNvPr id="54" name="Conector recto de flecha 53">
-            <a:extLst>
-              <a:ext uri="{FF2B5EF4-FFF2-40B4-BE49-F238E27FC236}">
-                <a16:creationId xmlns:a16="http://schemas.microsoft.com/office/drawing/2014/main" id="{A4033724-B9B6-415C-A0C2-CFE101206131}"/>
-              </a:ext>
-            </a:extLst>
-          </p:cNvPr>
-          <p:cNvCxnSpPr>
-            <a:cxnSpLocks/>
-          </p:cNvCxnSpPr>
-          <p:nvPr/>
-        </p:nvCxnSpPr>
-        <p:spPr>
-          <a:xfrm flipV="1">
-            <a:off x="3497303" y="3948229"/>
-            <a:ext cx="445023" cy="7368"/>
-          </a:xfrm>
-          <a:prstGeom prst="straightConnector1">
-            <a:avLst/>
-          </a:prstGeom>
-          <a:ln w="38100">
-            <a:solidFill>
-              <a:schemeClr val="accent6">
-                <a:lumMod val="60000"/>
-                <a:lumOff val="40000"/>
-              </a:schemeClr>
-            </a:solidFill>
-            <a:tailEnd type="triangle"/>
-          </a:ln>
-        </p:spPr>
-        <p:style>
-          <a:lnRef idx="1">
-            <a:schemeClr val="accent1"/>
-          </a:lnRef>
-          <a:fillRef idx="0">
-            <a:schemeClr val="accent1"/>
-          </a:fillRef>
-          <a:effectRef idx="0">
-            <a:schemeClr val="accent1"/>
-          </a:effectRef>
-          <a:fontRef idx="minor">
-            <a:schemeClr val="tx1"/>
-          </a:fontRef>
-        </p:style>
-      </p:cxnSp>
+              <a:t>Dato no se encuentra en el arreglo. </a:t>
+            </a:r>
+          </a:p>
+        </p:txBody>
+      </p:sp>
     </p:spTree>
     <p:extLst>
       <p:ext uri="{BB962C8B-B14F-4D97-AF65-F5344CB8AC3E}">
-        <p14:creationId xmlns:p14="http://schemas.microsoft.com/office/powerpoint/2010/main" val="525795670"/>
+        <p14:creationId xmlns:p14="http://schemas.microsoft.com/office/powerpoint/2010/main" val="1047609721"/>
       </p:ext>
     </p:extLst>
   </p:cSld>
@@ -4519,10 +4172,10 @@
       </p:grpSpPr>
       <p:pic>
         <p:nvPicPr>
-          <p:cNvPr id="2" name="Imagen 1">
-            <a:extLst>
-              <a:ext uri="{FF2B5EF4-FFF2-40B4-BE49-F238E27FC236}">
-                <a16:creationId xmlns:a16="http://schemas.microsoft.com/office/drawing/2014/main" id="{7D92F14E-C349-461A-828F-B8C00C2261EA}"/>
+          <p:cNvPr id="9" name="Imagen 8">
+            <a:extLst>
+              <a:ext uri="{FF2B5EF4-FFF2-40B4-BE49-F238E27FC236}">
+                <a16:creationId xmlns:a16="http://schemas.microsoft.com/office/drawing/2014/main" id="{E0962085-F2E4-4AB2-BC6C-B4844A6641D9}"/>
               </a:ext>
             </a:extLst>
           </p:cNvPr>
@@ -4532,15 +4185,21 @@
           <p:nvPr/>
         </p:nvPicPr>
         <p:blipFill>
-          <a:blip r:embed="rId2"/>
+          <a:blip r:embed="rId2">
+            <a:extLst>
+              <a:ext uri="{28A0092B-C50C-407E-A947-70E740481C1C}">
+                <a14:useLocalDpi xmlns:a14="http://schemas.microsoft.com/office/drawing/2010/main" val="0"/>
+              </a:ext>
+            </a:extLst>
+          </a:blip>
           <a:stretch>
             <a:fillRect/>
           </a:stretch>
         </p:blipFill>
         <p:spPr>
           <a:xfrm>
-            <a:off x="2174390" y="255932"/>
-            <a:ext cx="6026461" cy="6346136"/>
+            <a:off x="197657" y="286419"/>
+            <a:ext cx="9070226" cy="6018261"/>
           </a:xfrm>
           <a:prstGeom prst="rect">
             <a:avLst/>
@@ -4549,10 +4208,10 @@
       </p:pic>
       <p:sp>
         <p:nvSpPr>
-          <p:cNvPr id="3" name="Rectángulo 2">
-            <a:extLst>
-              <a:ext uri="{FF2B5EF4-FFF2-40B4-BE49-F238E27FC236}">
-                <a16:creationId xmlns:a16="http://schemas.microsoft.com/office/drawing/2014/main" id="{6DD73406-CF99-4A0A-93D7-3B946474D18B}"/>
+          <p:cNvPr id="19" name="Rectángulo 18">
+            <a:extLst>
+              <a:ext uri="{FF2B5EF4-FFF2-40B4-BE49-F238E27FC236}">
+                <a16:creationId xmlns:a16="http://schemas.microsoft.com/office/drawing/2014/main" id="{ABEA8F89-BD06-4B68-878E-C5F05F8477B8}"/>
               </a:ext>
             </a:extLst>
           </p:cNvPr>
@@ -4561,7 +4220,7 @@
         </p:nvSpPr>
         <p:spPr>
           <a:xfrm>
-            <a:off x="7511309" y="2062281"/>
+            <a:off x="5778713" y="2393586"/>
             <a:ext cx="689542" cy="343627"/>
           </a:xfrm>
           <a:prstGeom prst="rect">
@@ -4615,10 +4274,10 @@
       </p:sp>
       <p:cxnSp>
         <p:nvCxnSpPr>
-          <p:cNvPr id="4" name="Conector recto de flecha 3">
-            <a:extLst>
-              <a:ext uri="{FF2B5EF4-FFF2-40B4-BE49-F238E27FC236}">
-                <a16:creationId xmlns:a16="http://schemas.microsoft.com/office/drawing/2014/main" id="{3629682C-EA52-4B84-9040-E0F61C304C24}"/>
+          <p:cNvPr id="20" name="Conector recto de flecha 19">
+            <a:extLst>
+              <a:ext uri="{FF2B5EF4-FFF2-40B4-BE49-F238E27FC236}">
+                <a16:creationId xmlns:a16="http://schemas.microsoft.com/office/drawing/2014/main" id="{A796CB65-66AC-4DD0-BDC8-D682DD6F3EAE}"/>
               </a:ext>
             </a:extLst>
           </p:cNvPr>
@@ -4628,8 +4287,772 @@
           <p:nvPr/>
         </p:nvCxnSpPr>
         <p:spPr>
+          <a:xfrm>
+            <a:off x="3140765" y="2104817"/>
+            <a:ext cx="2115962" cy="0"/>
+          </a:xfrm>
+          <a:prstGeom prst="straightConnector1">
+            <a:avLst/>
+          </a:prstGeom>
+          <a:ln w="38100">
+            <a:solidFill>
+              <a:schemeClr val="accent2">
+                <a:lumMod val="60000"/>
+                <a:lumOff val="40000"/>
+              </a:schemeClr>
+            </a:solidFill>
+            <a:tailEnd type="triangle"/>
+          </a:ln>
+        </p:spPr>
+        <p:style>
+          <a:lnRef idx="1">
+            <a:schemeClr val="accent1"/>
+          </a:lnRef>
+          <a:fillRef idx="0">
+            <a:schemeClr val="accent1"/>
+          </a:fillRef>
+          <a:effectRef idx="0">
+            <a:schemeClr val="accent1"/>
+          </a:effectRef>
+          <a:fontRef idx="minor">
+            <a:schemeClr val="tx1"/>
+          </a:fontRef>
+        </p:style>
+      </p:cxnSp>
+      <p:sp>
+        <p:nvSpPr>
+          <p:cNvPr id="21" name="Rectángulo 20">
+            <a:extLst>
+              <a:ext uri="{FF2B5EF4-FFF2-40B4-BE49-F238E27FC236}">
+                <a16:creationId xmlns:a16="http://schemas.microsoft.com/office/drawing/2014/main" id="{C873419F-B906-46B3-9C9A-42EFC44C8975}"/>
+              </a:ext>
+            </a:extLst>
+          </p:cNvPr>
+          <p:cNvSpPr/>
+          <p:nvPr/>
+        </p:nvSpPr>
+        <p:spPr>
+          <a:xfrm>
+            <a:off x="5402924" y="1599645"/>
+            <a:ext cx="5804452" cy="606057"/>
+          </a:xfrm>
+          <a:prstGeom prst="rect">
+            <a:avLst/>
+          </a:prstGeom>
+          <a:solidFill>
+            <a:schemeClr val="accent2">
+              <a:lumMod val="60000"/>
+              <a:lumOff val="40000"/>
+            </a:schemeClr>
+          </a:solidFill>
+          <a:ln>
+            <a:solidFill>
+              <a:schemeClr val="tx1"/>
+            </a:solidFill>
+          </a:ln>
+        </p:spPr>
+        <p:style>
+          <a:lnRef idx="2">
+            <a:schemeClr val="accent1">
+              <a:shade val="50000"/>
+            </a:schemeClr>
+          </a:lnRef>
+          <a:fillRef idx="1">
+            <a:schemeClr val="accent1"/>
+          </a:fillRef>
+          <a:effectRef idx="0">
+            <a:schemeClr val="accent1"/>
+          </a:effectRef>
+          <a:fontRef idx="minor">
+            <a:schemeClr val="lt1"/>
+          </a:fontRef>
+        </p:style>
+        <p:txBody>
+          <a:bodyPr rtlCol="0" anchor="ctr"/>
+          <a:lstStyle/>
+          <a:p>
+            <a:pPr algn="ctr"/>
+            <a:r>
+              <a:rPr lang="es-MX" b="1" dirty="0">
+                <a:solidFill>
+                  <a:schemeClr val="tx1"/>
+                </a:solidFill>
+                <a:latin typeface="Arial" panose="020B0604020202020204" pitchFamily="34" charset="0"/>
+                <a:cs typeface="Arial" panose="020B0604020202020204" pitchFamily="34" charset="0"/>
+              </a:rPr>
+              <a:t>Peor caso: El dato no esta en el arreglo y se recorre completo. Se repite n veces</a:t>
+            </a:r>
+          </a:p>
+        </p:txBody>
+      </p:sp>
+      <p:sp>
+        <p:nvSpPr>
+          <p:cNvPr id="23" name="Rectángulo 22">
+            <a:extLst>
+              <a:ext uri="{FF2B5EF4-FFF2-40B4-BE49-F238E27FC236}">
+                <a16:creationId xmlns:a16="http://schemas.microsoft.com/office/drawing/2014/main" id="{4E667415-AF49-4CC9-A0C9-AA091E996FF3}"/>
+              </a:ext>
+            </a:extLst>
+          </p:cNvPr>
+          <p:cNvSpPr/>
+          <p:nvPr/>
+        </p:nvSpPr>
+        <p:spPr>
+          <a:xfrm>
+            <a:off x="6113253" y="3210918"/>
+            <a:ext cx="689542" cy="343627"/>
+          </a:xfrm>
+          <a:prstGeom prst="rect">
+            <a:avLst/>
+          </a:prstGeom>
+          <a:solidFill>
+            <a:srgbClr val="FFC000"/>
+          </a:solidFill>
+          <a:ln>
+            <a:solidFill>
+              <a:schemeClr val="tx1"/>
+            </a:solidFill>
+          </a:ln>
+        </p:spPr>
+        <p:style>
+          <a:lnRef idx="2">
+            <a:schemeClr val="accent1">
+              <a:shade val="50000"/>
+            </a:schemeClr>
+          </a:lnRef>
+          <a:fillRef idx="1">
+            <a:schemeClr val="accent1"/>
+          </a:fillRef>
+          <a:effectRef idx="0">
+            <a:schemeClr val="accent1"/>
+          </a:effectRef>
+          <a:fontRef idx="minor">
+            <a:schemeClr val="lt1"/>
+          </a:fontRef>
+        </p:style>
+        <p:txBody>
+          <a:bodyPr rtlCol="0" anchor="ctr"/>
+          <a:lstStyle/>
+          <a:p>
+            <a:pPr algn="ctr"/>
+            <a:r>
+              <a:rPr lang="es-MX" sz="2000" b="1" dirty="0">
+                <a:solidFill>
+                  <a:schemeClr val="tx1"/>
+                </a:solidFill>
+                <a:latin typeface="Arial" panose="020B0604020202020204" pitchFamily="34" charset="0"/>
+                <a:cs typeface="Arial" panose="020B0604020202020204" pitchFamily="34" charset="0"/>
+              </a:rPr>
+              <a:t>O(1)</a:t>
+            </a:r>
+          </a:p>
+        </p:txBody>
+      </p:sp>
+      <p:sp>
+        <p:nvSpPr>
+          <p:cNvPr id="25" name="Rectángulo 24">
+            <a:extLst>
+              <a:ext uri="{FF2B5EF4-FFF2-40B4-BE49-F238E27FC236}">
+                <a16:creationId xmlns:a16="http://schemas.microsoft.com/office/drawing/2014/main" id="{EE567B99-0C15-4CD7-AD23-F838D4DE828D}"/>
+              </a:ext>
+            </a:extLst>
+          </p:cNvPr>
+          <p:cNvSpPr/>
+          <p:nvPr/>
+        </p:nvSpPr>
+        <p:spPr>
+          <a:xfrm>
+            <a:off x="6057200" y="4426817"/>
+            <a:ext cx="689542" cy="343627"/>
+          </a:xfrm>
+          <a:prstGeom prst="rect">
+            <a:avLst/>
+          </a:prstGeom>
+          <a:solidFill>
+            <a:srgbClr val="FFC000"/>
+          </a:solidFill>
+          <a:ln>
+            <a:solidFill>
+              <a:schemeClr val="tx1"/>
+            </a:solidFill>
+          </a:ln>
+        </p:spPr>
+        <p:style>
+          <a:lnRef idx="2">
+            <a:schemeClr val="accent1">
+              <a:shade val="50000"/>
+            </a:schemeClr>
+          </a:lnRef>
+          <a:fillRef idx="1">
+            <a:schemeClr val="accent1"/>
+          </a:fillRef>
+          <a:effectRef idx="0">
+            <a:schemeClr val="accent1"/>
+          </a:effectRef>
+          <a:fontRef idx="minor">
+            <a:schemeClr val="lt1"/>
+          </a:fontRef>
+        </p:style>
+        <p:txBody>
+          <a:bodyPr rtlCol="0" anchor="ctr"/>
+          <a:lstStyle/>
+          <a:p>
+            <a:pPr algn="ctr"/>
+            <a:r>
+              <a:rPr lang="es-MX" sz="2000" b="1" dirty="0">
+                <a:solidFill>
+                  <a:schemeClr val="tx1"/>
+                </a:solidFill>
+                <a:latin typeface="Arial" panose="020B0604020202020204" pitchFamily="34" charset="0"/>
+                <a:cs typeface="Arial" panose="020B0604020202020204" pitchFamily="34" charset="0"/>
+              </a:rPr>
+              <a:t>O(1)</a:t>
+            </a:r>
+          </a:p>
+        </p:txBody>
+      </p:sp>
+      <p:sp>
+        <p:nvSpPr>
+          <p:cNvPr id="32" name="Abrir llave 31">
+            <a:extLst>
+              <a:ext uri="{FF2B5EF4-FFF2-40B4-BE49-F238E27FC236}">
+                <a16:creationId xmlns:a16="http://schemas.microsoft.com/office/drawing/2014/main" id="{1D8FB2B7-C267-4F07-AADE-39080FF87D52}"/>
+              </a:ext>
+            </a:extLst>
+          </p:cNvPr>
+          <p:cNvSpPr/>
+          <p:nvPr/>
+        </p:nvSpPr>
+        <p:spPr>
+          <a:xfrm rot="10800000">
+            <a:off x="5402925" y="4384332"/>
+            <a:ext cx="333972" cy="465964"/>
+          </a:xfrm>
+          <a:prstGeom prst="leftBrace">
+            <a:avLst>
+              <a:gd name="adj1" fmla="val 70132"/>
+              <a:gd name="adj2" fmla="val 52844"/>
+            </a:avLst>
+          </a:prstGeom>
+          <a:solidFill>
+            <a:schemeClr val="bg1"/>
+          </a:solidFill>
+          <a:ln w="38100">
+            <a:solidFill>
+              <a:schemeClr val="tx1"/>
+            </a:solidFill>
+          </a:ln>
+        </p:spPr>
+        <p:style>
+          <a:lnRef idx="1">
+            <a:schemeClr val="accent1"/>
+          </a:lnRef>
+          <a:fillRef idx="0">
+            <a:schemeClr val="accent1"/>
+          </a:fillRef>
+          <a:effectRef idx="0">
+            <a:schemeClr val="accent1"/>
+          </a:effectRef>
+          <a:fontRef idx="minor">
+            <a:schemeClr val="tx1"/>
+          </a:fontRef>
+        </p:style>
+        <p:txBody>
+          <a:bodyPr rtlCol="0" anchor="ctr"/>
+          <a:lstStyle/>
+          <a:p>
+            <a:pPr algn="ctr"/>
+            <a:endParaRPr lang="es-MX"/>
+          </a:p>
+        </p:txBody>
+      </p:sp>
+      <p:cxnSp>
+        <p:nvCxnSpPr>
+          <p:cNvPr id="33" name="Conector recto 32">
+            <a:extLst>
+              <a:ext uri="{FF2B5EF4-FFF2-40B4-BE49-F238E27FC236}">
+                <a16:creationId xmlns:a16="http://schemas.microsoft.com/office/drawing/2014/main" id="{C8569A24-4EC2-4A7A-A03F-638B7D7324E0}"/>
+              </a:ext>
+            </a:extLst>
+          </p:cNvPr>
+          <p:cNvCxnSpPr>
+            <a:cxnSpLocks/>
+          </p:cNvCxnSpPr>
+          <p:nvPr/>
+        </p:nvCxnSpPr>
+        <p:spPr>
+          <a:xfrm>
+            <a:off x="4430966" y="4858413"/>
+            <a:ext cx="971958" cy="0"/>
+          </a:xfrm>
+          <a:prstGeom prst="line">
+            <a:avLst/>
+          </a:prstGeom>
+          <a:ln w="38100">
+            <a:solidFill>
+              <a:schemeClr val="tx1"/>
+            </a:solidFill>
+            <a:prstDash val="sysDot"/>
+          </a:ln>
+        </p:spPr>
+        <p:style>
+          <a:lnRef idx="1">
+            <a:schemeClr val="accent1"/>
+          </a:lnRef>
+          <a:fillRef idx="0">
+            <a:schemeClr val="accent1"/>
+          </a:fillRef>
+          <a:effectRef idx="0">
+            <a:schemeClr val="accent1"/>
+          </a:effectRef>
+          <a:fontRef idx="minor">
+            <a:schemeClr val="tx1"/>
+          </a:fontRef>
+        </p:style>
+      </p:cxnSp>
+      <p:sp>
+        <p:nvSpPr>
+          <p:cNvPr id="37" name="Rectángulo 36">
+            <a:extLst>
+              <a:ext uri="{FF2B5EF4-FFF2-40B4-BE49-F238E27FC236}">
+                <a16:creationId xmlns:a16="http://schemas.microsoft.com/office/drawing/2014/main" id="{CD164897-0B0B-4014-B3F1-DE56A38AE034}"/>
+              </a:ext>
+            </a:extLst>
+          </p:cNvPr>
+          <p:cNvSpPr/>
+          <p:nvPr/>
+        </p:nvSpPr>
+        <p:spPr>
+          <a:xfrm>
+            <a:off x="6057200" y="5088781"/>
+            <a:ext cx="689542" cy="343627"/>
+          </a:xfrm>
+          <a:prstGeom prst="rect">
+            <a:avLst/>
+          </a:prstGeom>
+          <a:solidFill>
+            <a:srgbClr val="FFC000"/>
+          </a:solidFill>
+          <a:ln>
+            <a:solidFill>
+              <a:schemeClr val="tx1"/>
+            </a:solidFill>
+          </a:ln>
+        </p:spPr>
+        <p:style>
+          <a:lnRef idx="2">
+            <a:schemeClr val="accent1">
+              <a:shade val="50000"/>
+            </a:schemeClr>
+          </a:lnRef>
+          <a:fillRef idx="1">
+            <a:schemeClr val="accent1"/>
+          </a:fillRef>
+          <a:effectRef idx="0">
+            <a:schemeClr val="accent1"/>
+          </a:effectRef>
+          <a:fontRef idx="minor">
+            <a:schemeClr val="lt1"/>
+          </a:fontRef>
+        </p:style>
+        <p:txBody>
+          <a:bodyPr rtlCol="0" anchor="ctr"/>
+          <a:lstStyle/>
+          <a:p>
+            <a:pPr algn="ctr"/>
+            <a:r>
+              <a:rPr lang="es-MX" sz="2000" b="1" dirty="0">
+                <a:solidFill>
+                  <a:schemeClr val="tx1"/>
+                </a:solidFill>
+                <a:latin typeface="Arial" panose="020B0604020202020204" pitchFamily="34" charset="0"/>
+                <a:cs typeface="Arial" panose="020B0604020202020204" pitchFamily="34" charset="0"/>
+              </a:rPr>
+              <a:t>O(1)</a:t>
+            </a:r>
+          </a:p>
+        </p:txBody>
+      </p:sp>
+      <p:sp>
+        <p:nvSpPr>
+          <p:cNvPr id="38" name="Abrir llave 37">
+            <a:extLst>
+              <a:ext uri="{FF2B5EF4-FFF2-40B4-BE49-F238E27FC236}">
+                <a16:creationId xmlns:a16="http://schemas.microsoft.com/office/drawing/2014/main" id="{A13DEAF9-F824-47FC-8F87-304FE40234FD}"/>
+              </a:ext>
+            </a:extLst>
+          </p:cNvPr>
+          <p:cNvSpPr/>
+          <p:nvPr/>
+        </p:nvSpPr>
+        <p:spPr>
+          <a:xfrm rot="10800000">
+            <a:off x="5402925" y="5046296"/>
+            <a:ext cx="333972" cy="465964"/>
+          </a:xfrm>
+          <a:prstGeom prst="leftBrace">
+            <a:avLst>
+              <a:gd name="adj1" fmla="val 70132"/>
+              <a:gd name="adj2" fmla="val 52844"/>
+            </a:avLst>
+          </a:prstGeom>
+          <a:solidFill>
+            <a:schemeClr val="bg1"/>
+          </a:solidFill>
+          <a:ln w="38100">
+            <a:solidFill>
+              <a:schemeClr val="tx1"/>
+            </a:solidFill>
+          </a:ln>
+        </p:spPr>
+        <p:style>
+          <a:lnRef idx="1">
+            <a:schemeClr val="accent1"/>
+          </a:lnRef>
+          <a:fillRef idx="0">
+            <a:schemeClr val="accent1"/>
+          </a:fillRef>
+          <a:effectRef idx="0">
+            <a:schemeClr val="accent1"/>
+          </a:effectRef>
+          <a:fontRef idx="minor">
+            <a:schemeClr val="tx1"/>
+          </a:fontRef>
+        </p:style>
+        <p:txBody>
+          <a:bodyPr rtlCol="0" anchor="ctr"/>
+          <a:lstStyle/>
+          <a:p>
+            <a:pPr algn="ctr"/>
+            <a:endParaRPr lang="es-MX"/>
+          </a:p>
+        </p:txBody>
+      </p:sp>
+      <p:cxnSp>
+        <p:nvCxnSpPr>
+          <p:cNvPr id="39" name="Conector recto 38">
+            <a:extLst>
+              <a:ext uri="{FF2B5EF4-FFF2-40B4-BE49-F238E27FC236}">
+                <a16:creationId xmlns:a16="http://schemas.microsoft.com/office/drawing/2014/main" id="{02904BC3-070D-4D77-8BCF-670AF0F27008}"/>
+              </a:ext>
+            </a:extLst>
+          </p:cNvPr>
+          <p:cNvCxnSpPr>
+            <a:cxnSpLocks/>
+          </p:cNvCxnSpPr>
+          <p:nvPr/>
+        </p:nvCxnSpPr>
+        <p:spPr>
+          <a:xfrm>
+            <a:off x="4430966" y="5520377"/>
+            <a:ext cx="971958" cy="0"/>
+          </a:xfrm>
+          <a:prstGeom prst="line">
+            <a:avLst/>
+          </a:prstGeom>
+          <a:ln w="38100">
+            <a:solidFill>
+              <a:schemeClr val="tx1"/>
+            </a:solidFill>
+            <a:prstDash val="sysDot"/>
+          </a:ln>
+        </p:spPr>
+        <p:style>
+          <a:lnRef idx="1">
+            <a:schemeClr val="accent1"/>
+          </a:lnRef>
+          <a:fillRef idx="0">
+            <a:schemeClr val="accent1"/>
+          </a:fillRef>
+          <a:effectRef idx="0">
+            <a:schemeClr val="accent1"/>
+          </a:effectRef>
+          <a:fontRef idx="minor">
+            <a:schemeClr val="tx1"/>
+          </a:fontRef>
+        </p:style>
+      </p:cxnSp>
+      <p:sp>
+        <p:nvSpPr>
+          <p:cNvPr id="40" name="Abrir llave 39">
+            <a:extLst>
+              <a:ext uri="{FF2B5EF4-FFF2-40B4-BE49-F238E27FC236}">
+                <a16:creationId xmlns:a16="http://schemas.microsoft.com/office/drawing/2014/main" id="{FD6E3053-FE36-48B1-A6DE-0FD4C94AF083}"/>
+              </a:ext>
+            </a:extLst>
+          </p:cNvPr>
+          <p:cNvSpPr/>
+          <p:nvPr/>
+        </p:nvSpPr>
+        <p:spPr>
+          <a:xfrm rot="10800000">
+            <a:off x="5460288" y="2780210"/>
+            <a:ext cx="333972" cy="1525814"/>
+          </a:xfrm>
+          <a:prstGeom prst="leftBrace">
+            <a:avLst>
+              <a:gd name="adj1" fmla="val 70132"/>
+              <a:gd name="adj2" fmla="val 52844"/>
+            </a:avLst>
+          </a:prstGeom>
+          <a:solidFill>
+            <a:schemeClr val="bg1"/>
+          </a:solidFill>
+          <a:ln w="38100">
+            <a:solidFill>
+              <a:schemeClr val="tx1"/>
+            </a:solidFill>
+          </a:ln>
+        </p:spPr>
+        <p:style>
+          <a:lnRef idx="1">
+            <a:schemeClr val="accent1"/>
+          </a:lnRef>
+          <a:fillRef idx="0">
+            <a:schemeClr val="accent1"/>
+          </a:fillRef>
+          <a:effectRef idx="0">
+            <a:schemeClr val="accent1"/>
+          </a:effectRef>
+          <a:fontRef idx="minor">
+            <a:schemeClr val="tx1"/>
+          </a:fontRef>
+        </p:style>
+        <p:txBody>
+          <a:bodyPr rtlCol="0" anchor="ctr"/>
+          <a:lstStyle/>
+          <a:p>
+            <a:pPr algn="ctr"/>
+            <a:endParaRPr lang="es-MX"/>
+          </a:p>
+        </p:txBody>
+      </p:sp>
+      <p:cxnSp>
+        <p:nvCxnSpPr>
+          <p:cNvPr id="41" name="Conector recto 40">
+            <a:extLst>
+              <a:ext uri="{FF2B5EF4-FFF2-40B4-BE49-F238E27FC236}">
+                <a16:creationId xmlns:a16="http://schemas.microsoft.com/office/drawing/2014/main" id="{1D4AE66C-1BA0-46D6-A8EE-52C7D7E372C8}"/>
+              </a:ext>
+            </a:extLst>
+          </p:cNvPr>
+          <p:cNvCxnSpPr>
+            <a:cxnSpLocks/>
+          </p:cNvCxnSpPr>
+          <p:nvPr/>
+        </p:nvCxnSpPr>
+        <p:spPr>
+          <a:xfrm>
+            <a:off x="4448181" y="4292136"/>
+            <a:ext cx="971958" cy="0"/>
+          </a:xfrm>
+          <a:prstGeom prst="line">
+            <a:avLst/>
+          </a:prstGeom>
+          <a:ln w="38100">
+            <a:solidFill>
+              <a:schemeClr val="tx1"/>
+            </a:solidFill>
+            <a:prstDash val="sysDot"/>
+          </a:ln>
+        </p:spPr>
+        <p:style>
+          <a:lnRef idx="1">
+            <a:schemeClr val="accent1"/>
+          </a:lnRef>
+          <a:fillRef idx="0">
+            <a:schemeClr val="accent1"/>
+          </a:fillRef>
+          <a:effectRef idx="0">
+            <a:schemeClr val="accent1"/>
+          </a:effectRef>
+          <a:fontRef idx="minor">
+            <a:schemeClr val="tx1"/>
+          </a:fontRef>
+        </p:style>
+      </p:cxnSp>
+      <p:sp>
+        <p:nvSpPr>
+          <p:cNvPr id="42" name="Abrir llave 41">
+            <a:extLst>
+              <a:ext uri="{FF2B5EF4-FFF2-40B4-BE49-F238E27FC236}">
+                <a16:creationId xmlns:a16="http://schemas.microsoft.com/office/drawing/2014/main" id="{8E3CDD7F-193C-425D-A82F-29E2892CD18B}"/>
+              </a:ext>
+            </a:extLst>
+          </p:cNvPr>
+          <p:cNvSpPr/>
+          <p:nvPr/>
+        </p:nvSpPr>
+        <p:spPr>
+          <a:xfrm rot="10800000">
+            <a:off x="8333228" y="2393584"/>
+            <a:ext cx="333972" cy="3358699"/>
+          </a:xfrm>
+          <a:prstGeom prst="leftBrace">
+            <a:avLst>
+              <a:gd name="adj1" fmla="val 70132"/>
+              <a:gd name="adj2" fmla="val 52844"/>
+            </a:avLst>
+          </a:prstGeom>
+          <a:solidFill>
+            <a:schemeClr val="bg1"/>
+          </a:solidFill>
+          <a:ln w="38100">
+            <a:solidFill>
+              <a:schemeClr val="tx1"/>
+            </a:solidFill>
+          </a:ln>
+        </p:spPr>
+        <p:style>
+          <a:lnRef idx="1">
+            <a:schemeClr val="accent1"/>
+          </a:lnRef>
+          <a:fillRef idx="0">
+            <a:schemeClr val="accent1"/>
+          </a:fillRef>
+          <a:effectRef idx="0">
+            <a:schemeClr val="accent1"/>
+          </a:effectRef>
+          <a:fontRef idx="minor">
+            <a:schemeClr val="tx1"/>
+          </a:fontRef>
+        </p:style>
+        <p:txBody>
+          <a:bodyPr rtlCol="0" anchor="ctr"/>
+          <a:lstStyle/>
+          <a:p>
+            <a:pPr algn="ctr"/>
+            <a:endParaRPr lang="es-MX"/>
+          </a:p>
+        </p:txBody>
+      </p:sp>
+      <p:cxnSp>
+        <p:nvCxnSpPr>
+          <p:cNvPr id="44" name="Conector recto 43">
+            <a:extLst>
+              <a:ext uri="{FF2B5EF4-FFF2-40B4-BE49-F238E27FC236}">
+                <a16:creationId xmlns:a16="http://schemas.microsoft.com/office/drawing/2014/main" id="{DC136E62-364C-4DC5-BA42-2430C49F574C}"/>
+              </a:ext>
+            </a:extLst>
+          </p:cNvPr>
+          <p:cNvCxnSpPr>
+            <a:cxnSpLocks/>
+          </p:cNvCxnSpPr>
+          <p:nvPr/>
+        </p:nvCxnSpPr>
+        <p:spPr>
+          <a:xfrm>
+            <a:off x="3234924" y="5752290"/>
+            <a:ext cx="5098304" cy="0"/>
+          </a:xfrm>
+          <a:prstGeom prst="line">
+            <a:avLst/>
+          </a:prstGeom>
+          <a:ln w="38100">
+            <a:solidFill>
+              <a:schemeClr val="tx1"/>
+            </a:solidFill>
+            <a:prstDash val="sysDot"/>
+          </a:ln>
+        </p:spPr>
+        <p:style>
+          <a:lnRef idx="1">
+            <a:schemeClr val="accent1"/>
+          </a:lnRef>
+          <a:fillRef idx="0">
+            <a:schemeClr val="accent1"/>
+          </a:fillRef>
+          <a:effectRef idx="0">
+            <a:schemeClr val="accent1"/>
+          </a:effectRef>
+          <a:fontRef idx="minor">
+            <a:schemeClr val="tx1"/>
+          </a:fontRef>
+        </p:style>
+      </p:cxnSp>
+      <p:sp>
+        <p:nvSpPr>
+          <p:cNvPr id="46" name="Rectángulo 45">
+            <a:extLst>
+              <a:ext uri="{FF2B5EF4-FFF2-40B4-BE49-F238E27FC236}">
+                <a16:creationId xmlns:a16="http://schemas.microsoft.com/office/drawing/2014/main" id="{4F4F54D5-8029-41FB-A77C-81B3C8059776}"/>
+              </a:ext>
+            </a:extLst>
+          </p:cNvPr>
+          <p:cNvSpPr/>
+          <p:nvPr/>
+        </p:nvSpPr>
+        <p:spPr>
+          <a:xfrm>
+            <a:off x="9020800" y="3781819"/>
+            <a:ext cx="843393" cy="343627"/>
+          </a:xfrm>
+          <a:prstGeom prst="rect">
+            <a:avLst/>
+          </a:prstGeom>
+          <a:solidFill>
+            <a:schemeClr val="accent5">
+              <a:lumMod val="60000"/>
+              <a:lumOff val="40000"/>
+            </a:schemeClr>
+          </a:solidFill>
+          <a:ln>
+            <a:solidFill>
+              <a:schemeClr val="tx1"/>
+            </a:solidFill>
+          </a:ln>
+        </p:spPr>
+        <p:style>
+          <a:lnRef idx="2">
+            <a:schemeClr val="accent1">
+              <a:shade val="50000"/>
+            </a:schemeClr>
+          </a:lnRef>
+          <a:fillRef idx="1">
+            <a:schemeClr val="accent1"/>
+          </a:fillRef>
+          <a:effectRef idx="0">
+            <a:schemeClr val="accent1"/>
+          </a:effectRef>
+          <a:fontRef idx="minor">
+            <a:schemeClr val="lt1"/>
+          </a:fontRef>
+        </p:style>
+        <p:txBody>
+          <a:bodyPr rtlCol="0" anchor="ctr"/>
+          <a:lstStyle/>
+          <a:p>
+            <a:pPr algn="ctr"/>
+            <a:r>
+              <a:rPr lang="es-MX" sz="2000" b="1" dirty="0">
+                <a:solidFill>
+                  <a:schemeClr val="tx1"/>
+                </a:solidFill>
+                <a:latin typeface="Arial" panose="020B0604020202020204" pitchFamily="34" charset="0"/>
+                <a:cs typeface="Arial" panose="020B0604020202020204" pitchFamily="34" charset="0"/>
+              </a:rPr>
+              <a:t>O(n)</a:t>
+            </a:r>
+          </a:p>
+        </p:txBody>
+      </p:sp>
+      <p:cxnSp>
+        <p:nvCxnSpPr>
+          <p:cNvPr id="48" name="Conector recto de flecha 47">
+            <a:extLst>
+              <a:ext uri="{FF2B5EF4-FFF2-40B4-BE49-F238E27FC236}">
+                <a16:creationId xmlns:a16="http://schemas.microsoft.com/office/drawing/2014/main" id="{554D4DB3-8406-4412-BD1D-3E88ABC4B38E}"/>
+              </a:ext>
+            </a:extLst>
+          </p:cNvPr>
+          <p:cNvCxnSpPr>
+            <a:cxnSpLocks/>
+          </p:cNvCxnSpPr>
+          <p:nvPr/>
+        </p:nvCxnSpPr>
+        <p:spPr>
           <a:xfrm flipV="1">
-            <a:off x="6366167" y="2285735"/>
+            <a:off x="4633571" y="2617040"/>
             <a:ext cx="1088918" cy="2153"/>
           </a:xfrm>
           <a:prstGeom prst="straightConnector1">
@@ -4662,10 +5085,10 @@
       </p:cxnSp>
       <p:sp>
         <p:nvSpPr>
-          <p:cNvPr id="5" name="Rectángulo 4">
-            <a:extLst>
-              <a:ext uri="{FF2B5EF4-FFF2-40B4-BE49-F238E27FC236}">
-                <a16:creationId xmlns:a16="http://schemas.microsoft.com/office/drawing/2014/main" id="{BE46CC72-A2C3-461F-BF41-DD372F82FCFD}"/>
+          <p:cNvPr id="50" name="Rectángulo 49">
+            <a:extLst>
+              <a:ext uri="{FF2B5EF4-FFF2-40B4-BE49-F238E27FC236}">
+                <a16:creationId xmlns:a16="http://schemas.microsoft.com/office/drawing/2014/main" id="{C21F0A1A-8BBC-4791-9C46-DAB079519757}"/>
               </a:ext>
             </a:extLst>
           </p:cNvPr>
@@ -4674,7 +5097,7 @@
         </p:nvSpPr>
         <p:spPr>
           <a:xfrm>
-            <a:off x="6893499" y="2583588"/>
+            <a:off x="4558533" y="2737211"/>
             <a:ext cx="689542" cy="343627"/>
           </a:xfrm>
           <a:prstGeom prst="rect">
@@ -4728,10 +5151,10 @@
       </p:sp>
       <p:cxnSp>
         <p:nvCxnSpPr>
-          <p:cNvPr id="6" name="Conector recto de flecha 5">
-            <a:extLst>
-              <a:ext uri="{FF2B5EF4-FFF2-40B4-BE49-F238E27FC236}">
-                <a16:creationId xmlns:a16="http://schemas.microsoft.com/office/drawing/2014/main" id="{4EEB5A2F-0C25-439E-A223-9D37A45CF047}"/>
+          <p:cNvPr id="51" name="Conector recto de flecha 50">
+            <a:extLst>
+              <a:ext uri="{FF2B5EF4-FFF2-40B4-BE49-F238E27FC236}">
+                <a16:creationId xmlns:a16="http://schemas.microsoft.com/office/drawing/2014/main" id="{812B7F13-154A-49DC-947F-86E4070C1EED}"/>
               </a:ext>
             </a:extLst>
           </p:cNvPr>
@@ -4742,8 +5165,8 @@
         </p:nvCxnSpPr>
         <p:spPr>
           <a:xfrm flipV="1">
-            <a:off x="5676625" y="2755402"/>
-            <a:ext cx="1088918" cy="2153"/>
+            <a:off x="4057286" y="2960666"/>
+            <a:ext cx="445023" cy="7368"/>
           </a:xfrm>
           <a:prstGeom prst="straightConnector1">
             <a:avLst/>
@@ -4775,10 +5198,10 @@
       </p:cxnSp>
       <p:sp>
         <p:nvSpPr>
-          <p:cNvPr id="7" name="Rectángulo 6">
-            <a:extLst>
-              <a:ext uri="{FF2B5EF4-FFF2-40B4-BE49-F238E27FC236}">
-                <a16:creationId xmlns:a16="http://schemas.microsoft.com/office/drawing/2014/main" id="{B5C78E20-F2B1-4547-B62B-9CDB77F3F3E7}"/>
+          <p:cNvPr id="53" name="Rectángulo 52">
+            <a:extLst>
+              <a:ext uri="{FF2B5EF4-FFF2-40B4-BE49-F238E27FC236}">
+                <a16:creationId xmlns:a16="http://schemas.microsoft.com/office/drawing/2014/main" id="{EC8FCC30-0FD0-4B23-8FDE-014BFFDD8F7D}"/>
               </a:ext>
             </a:extLst>
           </p:cNvPr>
@@ -4787,7 +5210,7 @@
         </p:nvSpPr>
         <p:spPr>
           <a:xfrm>
-            <a:off x="5876313" y="2929369"/>
+            <a:off x="4043228" y="3756740"/>
             <a:ext cx="689542" cy="343627"/>
           </a:xfrm>
           <a:prstGeom prst="rect">
@@ -4841,10 +5264,10 @@
       </p:sp>
       <p:cxnSp>
         <p:nvCxnSpPr>
-          <p:cNvPr id="8" name="Conector recto de flecha 7">
-            <a:extLst>
-              <a:ext uri="{FF2B5EF4-FFF2-40B4-BE49-F238E27FC236}">
-                <a16:creationId xmlns:a16="http://schemas.microsoft.com/office/drawing/2014/main" id="{D43C47FA-E55E-4C6C-BF43-5CD52C63F8F2}"/>
+          <p:cNvPr id="54" name="Conector recto de flecha 53">
+            <a:extLst>
+              <a:ext uri="{FF2B5EF4-FFF2-40B4-BE49-F238E27FC236}">
+                <a16:creationId xmlns:a16="http://schemas.microsoft.com/office/drawing/2014/main" id="{A4033724-B9B6-415C-A0C2-CFE101206131}"/>
               </a:ext>
             </a:extLst>
           </p:cNvPr>
@@ -4854,9 +5277,9 @@
           <p:nvPr/>
         </p:nvCxnSpPr>
         <p:spPr>
-          <a:xfrm>
-            <a:off x="5179062" y="3086734"/>
-            <a:ext cx="598886" cy="0"/>
+          <a:xfrm flipV="1">
+            <a:off x="3497303" y="3948229"/>
+            <a:ext cx="445023" cy="7368"/>
           </a:xfrm>
           <a:prstGeom prst="straightConnector1">
             <a:avLst/>
@@ -4886,12 +5309,72 @@
           </a:fontRef>
         </p:style>
       </p:cxnSp>
-      <p:sp>
-        <p:nvSpPr>
-          <p:cNvPr id="17" name="Rectángulo 16">
-            <a:extLst>
-              <a:ext uri="{FF2B5EF4-FFF2-40B4-BE49-F238E27FC236}">
-                <a16:creationId xmlns:a16="http://schemas.microsoft.com/office/drawing/2014/main" id="{EB522F2C-9EDD-41F2-9EC3-C74690DEC6C6}"/>
+    </p:spTree>
+    <p:extLst>
+      <p:ext uri="{BB962C8B-B14F-4D97-AF65-F5344CB8AC3E}">
+        <p14:creationId xmlns:p14="http://schemas.microsoft.com/office/powerpoint/2010/main" val="525795670"/>
+      </p:ext>
+    </p:extLst>
+  </p:cSld>
+  <p:clrMapOvr>
+    <a:masterClrMapping/>
+  </p:clrMapOvr>
+</p:sld>
+</file>
+
+<file path=ppt/slides/slide3.xml><?xml version="1.0" encoding="utf-8"?>
+<p:sld xmlns:a="http://schemas.openxmlformats.org/drawingml/2006/main" xmlns:r="http://schemas.openxmlformats.org/officeDocument/2006/relationships" xmlns:p="http://schemas.openxmlformats.org/presentationml/2006/main">
+  <p:cSld>
+    <p:spTree>
+      <p:nvGrpSpPr>
+        <p:cNvPr id="1" name=""/>
+        <p:cNvGrpSpPr/>
+        <p:nvPr/>
+      </p:nvGrpSpPr>
+      <p:grpSpPr>
+        <a:xfrm>
+          <a:off x="0" y="0"/>
+          <a:ext cx="0" cy="0"/>
+          <a:chOff x="0" y="0"/>
+          <a:chExt cx="0" cy="0"/>
+        </a:xfrm>
+      </p:grpSpPr>
+      <p:pic>
+        <p:nvPicPr>
+          <p:cNvPr id="2" name="Imagen 1">
+            <a:extLst>
+              <a:ext uri="{FF2B5EF4-FFF2-40B4-BE49-F238E27FC236}">
+                <a16:creationId xmlns:a16="http://schemas.microsoft.com/office/drawing/2014/main" id="{7D92F14E-C349-461A-828F-B8C00C2261EA}"/>
+              </a:ext>
+            </a:extLst>
+          </p:cNvPr>
+          <p:cNvPicPr>
+            <a:picLocks noChangeAspect="1"/>
+          </p:cNvPicPr>
+          <p:nvPr/>
+        </p:nvPicPr>
+        <p:blipFill>
+          <a:blip r:embed="rId2"/>
+          <a:stretch>
+            <a:fillRect/>
+          </a:stretch>
+        </p:blipFill>
+        <p:spPr>
+          <a:xfrm>
+            <a:off x="2174390" y="255932"/>
+            <a:ext cx="6026461" cy="6346136"/>
+          </a:xfrm>
+          <a:prstGeom prst="rect">
+            <a:avLst/>
+          </a:prstGeom>
+        </p:spPr>
+      </p:pic>
+      <p:sp>
+        <p:nvSpPr>
+          <p:cNvPr id="3" name="Rectángulo 2">
+            <a:extLst>
+              <a:ext uri="{FF2B5EF4-FFF2-40B4-BE49-F238E27FC236}">
+                <a16:creationId xmlns:a16="http://schemas.microsoft.com/office/drawing/2014/main" id="{6DD73406-CF99-4A0A-93D7-3B946474D18B}"/>
               </a:ext>
             </a:extLst>
           </p:cNvPr>
@@ -4900,7 +5383,7 @@
         </p:nvSpPr>
         <p:spPr>
           <a:xfrm>
-            <a:off x="7583041" y="3412435"/>
+            <a:off x="7511309" y="2062281"/>
             <a:ext cx="689542" cy="343627"/>
           </a:xfrm>
           <a:prstGeom prst="rect">
@@ -4954,6 +5437,345 @@
       </p:sp>
       <p:cxnSp>
         <p:nvCxnSpPr>
+          <p:cNvPr id="4" name="Conector recto de flecha 3">
+            <a:extLst>
+              <a:ext uri="{FF2B5EF4-FFF2-40B4-BE49-F238E27FC236}">
+                <a16:creationId xmlns:a16="http://schemas.microsoft.com/office/drawing/2014/main" id="{3629682C-EA52-4B84-9040-E0F61C304C24}"/>
+              </a:ext>
+            </a:extLst>
+          </p:cNvPr>
+          <p:cNvCxnSpPr>
+            <a:cxnSpLocks/>
+          </p:cNvCxnSpPr>
+          <p:nvPr/>
+        </p:nvCxnSpPr>
+        <p:spPr>
+          <a:xfrm flipV="1">
+            <a:off x="6366167" y="2285735"/>
+            <a:ext cx="1088918" cy="2153"/>
+          </a:xfrm>
+          <a:prstGeom prst="straightConnector1">
+            <a:avLst/>
+          </a:prstGeom>
+          <a:ln w="38100">
+            <a:solidFill>
+              <a:schemeClr val="accent6">
+                <a:lumMod val="60000"/>
+                <a:lumOff val="40000"/>
+              </a:schemeClr>
+            </a:solidFill>
+            <a:tailEnd type="triangle"/>
+          </a:ln>
+        </p:spPr>
+        <p:style>
+          <a:lnRef idx="1">
+            <a:schemeClr val="accent1"/>
+          </a:lnRef>
+          <a:fillRef idx="0">
+            <a:schemeClr val="accent1"/>
+          </a:fillRef>
+          <a:effectRef idx="0">
+            <a:schemeClr val="accent1"/>
+          </a:effectRef>
+          <a:fontRef idx="minor">
+            <a:schemeClr val="tx1"/>
+          </a:fontRef>
+        </p:style>
+      </p:cxnSp>
+      <p:sp>
+        <p:nvSpPr>
+          <p:cNvPr id="5" name="Rectángulo 4">
+            <a:extLst>
+              <a:ext uri="{FF2B5EF4-FFF2-40B4-BE49-F238E27FC236}">
+                <a16:creationId xmlns:a16="http://schemas.microsoft.com/office/drawing/2014/main" id="{BE46CC72-A2C3-461F-BF41-DD372F82FCFD}"/>
+              </a:ext>
+            </a:extLst>
+          </p:cNvPr>
+          <p:cNvSpPr/>
+          <p:nvPr/>
+        </p:nvSpPr>
+        <p:spPr>
+          <a:xfrm>
+            <a:off x="6893499" y="2583588"/>
+            <a:ext cx="689542" cy="343627"/>
+          </a:xfrm>
+          <a:prstGeom prst="rect">
+            <a:avLst/>
+          </a:prstGeom>
+          <a:solidFill>
+            <a:schemeClr val="accent6">
+              <a:lumMod val="60000"/>
+              <a:lumOff val="40000"/>
+            </a:schemeClr>
+          </a:solidFill>
+          <a:ln>
+            <a:solidFill>
+              <a:schemeClr val="tx1"/>
+            </a:solidFill>
+          </a:ln>
+        </p:spPr>
+        <p:style>
+          <a:lnRef idx="2">
+            <a:schemeClr val="accent1">
+              <a:shade val="50000"/>
+            </a:schemeClr>
+          </a:lnRef>
+          <a:fillRef idx="1">
+            <a:schemeClr val="accent1"/>
+          </a:fillRef>
+          <a:effectRef idx="0">
+            <a:schemeClr val="accent1"/>
+          </a:effectRef>
+          <a:fontRef idx="minor">
+            <a:schemeClr val="lt1"/>
+          </a:fontRef>
+        </p:style>
+        <p:txBody>
+          <a:bodyPr rtlCol="0" anchor="ctr"/>
+          <a:lstStyle/>
+          <a:p>
+            <a:pPr algn="ctr"/>
+            <a:r>
+              <a:rPr lang="es-MX" sz="2000" b="1" dirty="0">
+                <a:solidFill>
+                  <a:schemeClr val="tx1"/>
+                </a:solidFill>
+                <a:latin typeface="Arial" panose="020B0604020202020204" pitchFamily="34" charset="0"/>
+                <a:cs typeface="Arial" panose="020B0604020202020204" pitchFamily="34" charset="0"/>
+              </a:rPr>
+              <a:t>O(1)</a:t>
+            </a:r>
+          </a:p>
+        </p:txBody>
+      </p:sp>
+      <p:cxnSp>
+        <p:nvCxnSpPr>
+          <p:cNvPr id="6" name="Conector recto de flecha 5">
+            <a:extLst>
+              <a:ext uri="{FF2B5EF4-FFF2-40B4-BE49-F238E27FC236}">
+                <a16:creationId xmlns:a16="http://schemas.microsoft.com/office/drawing/2014/main" id="{4EEB5A2F-0C25-439E-A223-9D37A45CF047}"/>
+              </a:ext>
+            </a:extLst>
+          </p:cNvPr>
+          <p:cNvCxnSpPr>
+            <a:cxnSpLocks/>
+          </p:cNvCxnSpPr>
+          <p:nvPr/>
+        </p:nvCxnSpPr>
+        <p:spPr>
+          <a:xfrm flipV="1">
+            <a:off x="5676625" y="2755402"/>
+            <a:ext cx="1088918" cy="2153"/>
+          </a:xfrm>
+          <a:prstGeom prst="straightConnector1">
+            <a:avLst/>
+          </a:prstGeom>
+          <a:ln w="38100">
+            <a:solidFill>
+              <a:schemeClr val="accent6">
+                <a:lumMod val="60000"/>
+                <a:lumOff val="40000"/>
+              </a:schemeClr>
+            </a:solidFill>
+            <a:tailEnd type="triangle"/>
+          </a:ln>
+        </p:spPr>
+        <p:style>
+          <a:lnRef idx="1">
+            <a:schemeClr val="accent1"/>
+          </a:lnRef>
+          <a:fillRef idx="0">
+            <a:schemeClr val="accent1"/>
+          </a:fillRef>
+          <a:effectRef idx="0">
+            <a:schemeClr val="accent1"/>
+          </a:effectRef>
+          <a:fontRef idx="minor">
+            <a:schemeClr val="tx1"/>
+          </a:fontRef>
+        </p:style>
+      </p:cxnSp>
+      <p:sp>
+        <p:nvSpPr>
+          <p:cNvPr id="7" name="Rectángulo 6">
+            <a:extLst>
+              <a:ext uri="{FF2B5EF4-FFF2-40B4-BE49-F238E27FC236}">
+                <a16:creationId xmlns:a16="http://schemas.microsoft.com/office/drawing/2014/main" id="{B5C78E20-F2B1-4547-B62B-9CDB77F3F3E7}"/>
+              </a:ext>
+            </a:extLst>
+          </p:cNvPr>
+          <p:cNvSpPr/>
+          <p:nvPr/>
+        </p:nvSpPr>
+        <p:spPr>
+          <a:xfrm>
+            <a:off x="5876313" y="2929369"/>
+            <a:ext cx="689542" cy="343627"/>
+          </a:xfrm>
+          <a:prstGeom prst="rect">
+            <a:avLst/>
+          </a:prstGeom>
+          <a:solidFill>
+            <a:schemeClr val="accent6">
+              <a:lumMod val="60000"/>
+              <a:lumOff val="40000"/>
+            </a:schemeClr>
+          </a:solidFill>
+          <a:ln>
+            <a:solidFill>
+              <a:schemeClr val="tx1"/>
+            </a:solidFill>
+          </a:ln>
+        </p:spPr>
+        <p:style>
+          <a:lnRef idx="2">
+            <a:schemeClr val="accent1">
+              <a:shade val="50000"/>
+            </a:schemeClr>
+          </a:lnRef>
+          <a:fillRef idx="1">
+            <a:schemeClr val="accent1"/>
+          </a:fillRef>
+          <a:effectRef idx="0">
+            <a:schemeClr val="accent1"/>
+          </a:effectRef>
+          <a:fontRef idx="minor">
+            <a:schemeClr val="lt1"/>
+          </a:fontRef>
+        </p:style>
+        <p:txBody>
+          <a:bodyPr rtlCol="0" anchor="ctr"/>
+          <a:lstStyle/>
+          <a:p>
+            <a:pPr algn="ctr"/>
+            <a:r>
+              <a:rPr lang="es-MX" sz="2000" b="1" dirty="0">
+                <a:solidFill>
+                  <a:schemeClr val="tx1"/>
+                </a:solidFill>
+                <a:latin typeface="Arial" panose="020B0604020202020204" pitchFamily="34" charset="0"/>
+                <a:cs typeface="Arial" panose="020B0604020202020204" pitchFamily="34" charset="0"/>
+              </a:rPr>
+              <a:t>O(1)</a:t>
+            </a:r>
+          </a:p>
+        </p:txBody>
+      </p:sp>
+      <p:cxnSp>
+        <p:nvCxnSpPr>
+          <p:cNvPr id="8" name="Conector recto de flecha 7">
+            <a:extLst>
+              <a:ext uri="{FF2B5EF4-FFF2-40B4-BE49-F238E27FC236}">
+                <a16:creationId xmlns:a16="http://schemas.microsoft.com/office/drawing/2014/main" id="{D43C47FA-E55E-4C6C-BF43-5CD52C63F8F2}"/>
+              </a:ext>
+            </a:extLst>
+          </p:cNvPr>
+          <p:cNvCxnSpPr>
+            <a:cxnSpLocks/>
+          </p:cNvCxnSpPr>
+          <p:nvPr/>
+        </p:nvCxnSpPr>
+        <p:spPr>
+          <a:xfrm>
+            <a:off x="5179062" y="3086734"/>
+            <a:ext cx="598886" cy="0"/>
+          </a:xfrm>
+          <a:prstGeom prst="straightConnector1">
+            <a:avLst/>
+          </a:prstGeom>
+          <a:ln w="38100">
+            <a:solidFill>
+              <a:schemeClr val="accent6">
+                <a:lumMod val="60000"/>
+                <a:lumOff val="40000"/>
+              </a:schemeClr>
+            </a:solidFill>
+            <a:tailEnd type="triangle"/>
+          </a:ln>
+        </p:spPr>
+        <p:style>
+          <a:lnRef idx="1">
+            <a:schemeClr val="accent1"/>
+          </a:lnRef>
+          <a:fillRef idx="0">
+            <a:schemeClr val="accent1"/>
+          </a:fillRef>
+          <a:effectRef idx="0">
+            <a:schemeClr val="accent1"/>
+          </a:effectRef>
+          <a:fontRef idx="minor">
+            <a:schemeClr val="tx1"/>
+          </a:fontRef>
+        </p:style>
+      </p:cxnSp>
+      <p:sp>
+        <p:nvSpPr>
+          <p:cNvPr id="17" name="Rectángulo 16">
+            <a:extLst>
+              <a:ext uri="{FF2B5EF4-FFF2-40B4-BE49-F238E27FC236}">
+                <a16:creationId xmlns:a16="http://schemas.microsoft.com/office/drawing/2014/main" id="{EB522F2C-9EDD-41F2-9EC3-C74690DEC6C6}"/>
+              </a:ext>
+            </a:extLst>
+          </p:cNvPr>
+          <p:cNvSpPr/>
+          <p:nvPr/>
+        </p:nvSpPr>
+        <p:spPr>
+          <a:xfrm>
+            <a:off x="7583041" y="3412435"/>
+            <a:ext cx="689542" cy="343627"/>
+          </a:xfrm>
+          <a:prstGeom prst="rect">
+            <a:avLst/>
+          </a:prstGeom>
+          <a:solidFill>
+            <a:schemeClr val="accent6">
+              <a:lumMod val="60000"/>
+              <a:lumOff val="40000"/>
+            </a:schemeClr>
+          </a:solidFill>
+          <a:ln>
+            <a:solidFill>
+              <a:schemeClr val="tx1"/>
+            </a:solidFill>
+          </a:ln>
+        </p:spPr>
+        <p:style>
+          <a:lnRef idx="2">
+            <a:schemeClr val="accent1">
+              <a:shade val="50000"/>
+            </a:schemeClr>
+          </a:lnRef>
+          <a:fillRef idx="1">
+            <a:schemeClr val="accent1"/>
+          </a:fillRef>
+          <a:effectRef idx="0">
+            <a:schemeClr val="accent1"/>
+          </a:effectRef>
+          <a:fontRef idx="minor">
+            <a:schemeClr val="lt1"/>
+          </a:fontRef>
+        </p:style>
+        <p:txBody>
+          <a:bodyPr rtlCol="0" anchor="ctr"/>
+          <a:lstStyle/>
+          <a:p>
+            <a:pPr algn="ctr"/>
+            <a:r>
+              <a:rPr lang="es-MX" sz="2000" b="1" dirty="0">
+                <a:solidFill>
+                  <a:schemeClr val="tx1"/>
+                </a:solidFill>
+                <a:latin typeface="Arial" panose="020B0604020202020204" pitchFamily="34" charset="0"/>
+                <a:cs typeface="Arial" panose="020B0604020202020204" pitchFamily="34" charset="0"/>
+              </a:rPr>
+              <a:t>O(1)</a:t>
+            </a:r>
+          </a:p>
+        </p:txBody>
+      </p:sp>
+      <p:cxnSp>
+        <p:nvCxnSpPr>
           <p:cNvPr id="18" name="Conector recto de flecha 17">
             <a:extLst>
               <a:ext uri="{FF2B5EF4-FFF2-40B4-BE49-F238E27FC236}">
@@ -5513,8 +6335,8 @@
           </a:fontRef>
         </p:style>
       </p:cxnSp>
-      <mc:AlternateContent xmlns:mc="http://schemas.openxmlformats.org/markup-compatibility/2006">
-        <mc:Choice xmlns:a14="http://schemas.microsoft.com/office/drawing/2010/main" Requires="a14">
+      <mc:AlternateContent xmlns:mc="http://schemas.openxmlformats.org/markup-compatibility/2006" xmlns:a14="http://schemas.microsoft.com/office/drawing/2010/main">
+        <mc:Choice Requires="a14">
           <p:sp>
             <p:nvSpPr>
               <p:cNvPr id="30" name="Rectángulo 29">
@@ -5676,7 +6498,7 @@
             </p:txBody>
           </p:sp>
         </mc:Choice>
-        <mc:Fallback>
+        <mc:Fallback xmlns="">
           <p:sp>
             <p:nvSpPr>
               <p:cNvPr id="30" name="Rectángulo 29">

</xml_diff>

<commit_message>
Reporte e Img cotas
</commit_message>
<xml_diff>
--- a/Practica2/AnalisisCotas.pptx
+++ b/Practica2/AnalisisCotas.pptx
@@ -263,7 +263,7 @@
           <a:p>
             <a:fld id="{246AA5FD-5524-4AD4-879F-D4B47144AFA8}" type="datetimeFigureOut">
               <a:rPr lang="es-MX" smtClean="0"/>
-              <a:t>01/10/2018</a:t>
+              <a:t>08/10/2018</a:t>
             </a:fld>
             <a:endParaRPr lang="es-MX"/>
           </a:p>
@@ -463,7 +463,7 @@
           <a:p>
             <a:fld id="{246AA5FD-5524-4AD4-879F-D4B47144AFA8}" type="datetimeFigureOut">
               <a:rPr lang="es-MX" smtClean="0"/>
-              <a:t>01/10/2018</a:t>
+              <a:t>08/10/2018</a:t>
             </a:fld>
             <a:endParaRPr lang="es-MX"/>
           </a:p>
@@ -673,7 +673,7 @@
           <a:p>
             <a:fld id="{246AA5FD-5524-4AD4-879F-D4B47144AFA8}" type="datetimeFigureOut">
               <a:rPr lang="es-MX" smtClean="0"/>
-              <a:t>01/10/2018</a:t>
+              <a:t>08/10/2018</a:t>
             </a:fld>
             <a:endParaRPr lang="es-MX"/>
           </a:p>
@@ -873,7 +873,7 @@
           <a:p>
             <a:fld id="{246AA5FD-5524-4AD4-879F-D4B47144AFA8}" type="datetimeFigureOut">
               <a:rPr lang="es-MX" smtClean="0"/>
-              <a:t>01/10/2018</a:t>
+              <a:t>08/10/2018</a:t>
             </a:fld>
             <a:endParaRPr lang="es-MX"/>
           </a:p>
@@ -1149,7 +1149,7 @@
           <a:p>
             <a:fld id="{246AA5FD-5524-4AD4-879F-D4B47144AFA8}" type="datetimeFigureOut">
               <a:rPr lang="es-MX" smtClean="0"/>
-              <a:t>01/10/2018</a:t>
+              <a:t>08/10/2018</a:t>
             </a:fld>
             <a:endParaRPr lang="es-MX"/>
           </a:p>
@@ -1417,7 +1417,7 @@
           <a:p>
             <a:fld id="{246AA5FD-5524-4AD4-879F-D4B47144AFA8}" type="datetimeFigureOut">
               <a:rPr lang="es-MX" smtClean="0"/>
-              <a:t>01/10/2018</a:t>
+              <a:t>08/10/2018</a:t>
             </a:fld>
             <a:endParaRPr lang="es-MX"/>
           </a:p>
@@ -1832,7 +1832,7 @@
           <a:p>
             <a:fld id="{246AA5FD-5524-4AD4-879F-D4B47144AFA8}" type="datetimeFigureOut">
               <a:rPr lang="es-MX" smtClean="0"/>
-              <a:t>01/10/2018</a:t>
+              <a:t>08/10/2018</a:t>
             </a:fld>
             <a:endParaRPr lang="es-MX"/>
           </a:p>
@@ -1974,7 +1974,7 @@
           <a:p>
             <a:fld id="{246AA5FD-5524-4AD4-879F-D4B47144AFA8}" type="datetimeFigureOut">
               <a:rPr lang="es-MX" smtClean="0"/>
-              <a:t>01/10/2018</a:t>
+              <a:t>08/10/2018</a:t>
             </a:fld>
             <a:endParaRPr lang="es-MX"/>
           </a:p>
@@ -2087,7 +2087,7 @@
           <a:p>
             <a:fld id="{246AA5FD-5524-4AD4-879F-D4B47144AFA8}" type="datetimeFigureOut">
               <a:rPr lang="es-MX" smtClean="0"/>
-              <a:t>01/10/2018</a:t>
+              <a:t>08/10/2018</a:t>
             </a:fld>
             <a:endParaRPr lang="es-MX"/>
           </a:p>
@@ -2400,7 +2400,7 @@
           <a:p>
             <a:fld id="{246AA5FD-5524-4AD4-879F-D4B47144AFA8}" type="datetimeFigureOut">
               <a:rPr lang="es-MX" smtClean="0"/>
-              <a:t>01/10/2018</a:t>
+              <a:t>08/10/2018</a:t>
             </a:fld>
             <a:endParaRPr lang="es-MX"/>
           </a:p>
@@ -2689,7 +2689,7 @@
           <a:p>
             <a:fld id="{246AA5FD-5524-4AD4-879F-D4B47144AFA8}" type="datetimeFigureOut">
               <a:rPr lang="es-MX" smtClean="0"/>
-              <a:t>01/10/2018</a:t>
+              <a:t>08/10/2018</a:t>
             </a:fld>
             <a:endParaRPr lang="es-MX"/>
           </a:p>
@@ -2932,7 +2932,7 @@
           <a:p>
             <a:fld id="{246AA5FD-5524-4AD4-879F-D4B47144AFA8}" type="datetimeFigureOut">
               <a:rPr lang="es-MX" smtClean="0"/>
-              <a:t>01/10/2018</a:t>
+              <a:t>08/10/2018</a:t>
             </a:fld>
             <a:endParaRPr lang="es-MX"/>
           </a:p>
@@ -4077,8 +4077,8 @@
         </p:nvSpPr>
         <p:spPr>
           <a:xfrm>
-            <a:off x="5842680" y="63343"/>
-            <a:ext cx="6262796" cy="994583"/>
+            <a:off x="6900419" y="778871"/>
+            <a:ext cx="4600033" cy="994583"/>
           </a:xfrm>
           <a:prstGeom prst="rect">
             <a:avLst/>
@@ -4319,8 +4319,8 @@
           </a:fontRef>
         </p:style>
       </p:cxnSp>
-      <mc:AlternateContent xmlns:mc="http://schemas.openxmlformats.org/markup-compatibility/2006">
-        <mc:Choice xmlns:a14="http://schemas.microsoft.com/office/drawing/2010/main" Requires="a14">
+      <mc:AlternateContent xmlns:mc="http://schemas.openxmlformats.org/markup-compatibility/2006" xmlns:a14="http://schemas.microsoft.com/office/drawing/2010/main">
+        <mc:Choice Requires="a14">
           <p:sp>
             <p:nvSpPr>
               <p:cNvPr id="21" name="Rectángulo 20">
@@ -4469,7 +4469,7 @@
             </p:txBody>
           </p:sp>
         </mc:Choice>
-        <mc:Fallback>
+        <mc:Fallback xmlns="">
           <p:sp>
             <p:nvSpPr>
               <p:cNvPr id="21" name="Rectángulo 20">
@@ -5104,8 +5104,8 @@
           </a:fontRef>
         </p:style>
       </p:cxnSp>
-      <mc:AlternateContent xmlns:mc="http://schemas.openxmlformats.org/markup-compatibility/2006">
-        <mc:Choice xmlns:a14="http://schemas.microsoft.com/office/drawing/2010/main" Requires="a14">
+      <mc:AlternateContent xmlns:mc="http://schemas.openxmlformats.org/markup-compatibility/2006" xmlns:a14="http://schemas.microsoft.com/office/drawing/2010/main">
+        <mc:Choice Requires="a14">
           <p:sp>
             <p:nvSpPr>
               <p:cNvPr id="46" name="Rectángulo 45">
@@ -5254,7 +5254,7 @@
             </p:txBody>
           </p:sp>
         </mc:Choice>
-        <mc:Fallback>
+        <mc:Fallback xmlns="">
           <p:sp>
             <p:nvSpPr>
               <p:cNvPr id="46" name="Rectángulo 45">

</xml_diff>

<commit_message>
Analisis binaria y graficas comparacion
</commit_message>
<xml_diff>
--- a/Practica2/AnalisisCotas.pptx
+++ b/Practica2/AnalisisCotas.pptx
@@ -10,6 +10,7 @@
     <p:sldId id="271" r:id="rId4"/>
     <p:sldId id="273" r:id="rId5"/>
     <p:sldId id="274" r:id="rId6"/>
+    <p:sldId id="275" r:id="rId7"/>
   </p:sldIdLst>
   <p:sldSz cx="12192000" cy="6858000"/>
   <p:notesSz cx="6858000" cy="9144000"/>
@@ -7299,8 +7300,8 @@
           </a:p>
         </p:txBody>
       </p:sp>
-      <mc:AlternateContent xmlns:mc="http://schemas.openxmlformats.org/markup-compatibility/2006">
-        <mc:Choice xmlns:a14="http://schemas.microsoft.com/office/drawing/2010/main" Requires="a14">
+      <mc:AlternateContent xmlns:mc="http://schemas.openxmlformats.org/markup-compatibility/2006" xmlns:a14="http://schemas.microsoft.com/office/drawing/2010/main">
+        <mc:Choice Requires="a14">
           <p:sp>
             <p:nvSpPr>
               <p:cNvPr id="20" name="Rectángulo 19">
@@ -7406,7 +7407,7 @@
             </p:txBody>
           </p:sp>
         </mc:Choice>
-        <mc:Fallback>
+        <mc:Fallback xmlns="">
           <p:sp>
             <p:nvSpPr>
               <p:cNvPr id="20" name="Rectángulo 19">
@@ -7456,8 +7457,8 @@
           </p:sp>
         </mc:Fallback>
       </mc:AlternateContent>
-      <mc:AlternateContent xmlns:mc="http://schemas.openxmlformats.org/markup-compatibility/2006">
-        <mc:Choice xmlns:a14="http://schemas.microsoft.com/office/drawing/2010/main" Requires="a14">
+      <mc:AlternateContent xmlns:mc="http://schemas.openxmlformats.org/markup-compatibility/2006" xmlns:a14="http://schemas.microsoft.com/office/drawing/2010/main">
+        <mc:Choice Requires="a14">
           <p:sp>
             <p:nvSpPr>
               <p:cNvPr id="22" name="Rectángulo 21">
@@ -7702,7 +7703,7 @@
             </p:txBody>
           </p:sp>
         </mc:Choice>
-        <mc:Fallback>
+        <mc:Fallback xmlns="">
           <p:sp>
             <p:nvSpPr>
               <p:cNvPr id="22" name="Rectángulo 21">
@@ -7752,8 +7753,8 @@
           </p:sp>
         </mc:Fallback>
       </mc:AlternateContent>
-      <mc:AlternateContent xmlns:mc="http://schemas.openxmlformats.org/markup-compatibility/2006">
-        <mc:Choice xmlns:a14="http://schemas.microsoft.com/office/drawing/2010/main" Requires="a14">
+      <mc:AlternateContent xmlns:mc="http://schemas.openxmlformats.org/markup-compatibility/2006" xmlns:a14="http://schemas.microsoft.com/office/drawing/2010/main">
+        <mc:Choice Requires="a14">
           <p:sp>
             <p:nvSpPr>
               <p:cNvPr id="23" name="Rectángulo 22">
@@ -7974,7 +7975,7 @@
             </p:txBody>
           </p:sp>
         </mc:Choice>
-        <mc:Fallback>
+        <mc:Fallback xmlns="">
           <p:sp>
             <p:nvSpPr>
               <p:cNvPr id="23" name="Rectángulo 22">
@@ -8146,6 +8147,1934 @@
     <p:extLst>
       <p:ext uri="{BB962C8B-B14F-4D97-AF65-F5344CB8AC3E}">
         <p14:creationId xmlns:p14="http://schemas.microsoft.com/office/powerpoint/2010/main" val="3300512743"/>
+      </p:ext>
+    </p:extLst>
+  </p:cSld>
+  <p:clrMapOvr>
+    <a:masterClrMapping/>
+  </p:clrMapOvr>
+</p:sld>
+</file>
+
+<file path=ppt/slides/slide6.xml><?xml version="1.0" encoding="utf-8"?>
+<p:sld xmlns:a="http://schemas.openxmlformats.org/drawingml/2006/main" xmlns:r="http://schemas.openxmlformats.org/officeDocument/2006/relationships" xmlns:p="http://schemas.openxmlformats.org/presentationml/2006/main">
+  <p:cSld>
+    <p:spTree>
+      <p:nvGrpSpPr>
+        <p:cNvPr id="1" name=""/>
+        <p:cNvGrpSpPr/>
+        <p:nvPr/>
+      </p:nvGrpSpPr>
+      <p:grpSpPr>
+        <a:xfrm>
+          <a:off x="0" y="0"/>
+          <a:ext cx="0" cy="0"/>
+          <a:chOff x="0" y="0"/>
+          <a:chExt cx="0" cy="0"/>
+        </a:xfrm>
+      </p:grpSpPr>
+      <p:pic>
+        <p:nvPicPr>
+          <p:cNvPr id="2" name="Imagen 1">
+            <a:extLst>
+              <a:ext uri="{FF2B5EF4-FFF2-40B4-BE49-F238E27FC236}">
+                <a16:creationId xmlns:a16="http://schemas.microsoft.com/office/drawing/2014/main" id="{7047534E-74DF-47FD-A077-5DE36313DAE1}"/>
+              </a:ext>
+            </a:extLst>
+          </p:cNvPr>
+          <p:cNvPicPr>
+            <a:picLocks noChangeAspect="1"/>
+          </p:cNvPicPr>
+          <p:nvPr/>
+        </p:nvPicPr>
+        <p:blipFill>
+          <a:blip r:embed="rId2">
+            <a:extLst>
+              <a:ext uri="{28A0092B-C50C-407E-A947-70E740481C1C}">
+                <a14:useLocalDpi xmlns:a14="http://schemas.microsoft.com/office/drawing/2010/main" val="0"/>
+              </a:ext>
+            </a:extLst>
+          </a:blip>
+          <a:stretch>
+            <a:fillRect/>
+          </a:stretch>
+        </p:blipFill>
+        <p:spPr>
+          <a:xfrm>
+            <a:off x="197657" y="286419"/>
+            <a:ext cx="9070226" cy="6018261"/>
+          </a:xfrm>
+          <a:prstGeom prst="rect">
+            <a:avLst/>
+          </a:prstGeom>
+        </p:spPr>
+      </p:pic>
+      <p:sp>
+        <p:nvSpPr>
+          <p:cNvPr id="3" name="Rectángulo 2">
+            <a:extLst>
+              <a:ext uri="{FF2B5EF4-FFF2-40B4-BE49-F238E27FC236}">
+                <a16:creationId xmlns:a16="http://schemas.microsoft.com/office/drawing/2014/main" id="{C551B6B9-2008-4007-A675-AFEA92183C49}"/>
+              </a:ext>
+            </a:extLst>
+          </p:cNvPr>
+          <p:cNvSpPr/>
+          <p:nvPr/>
+        </p:nvSpPr>
+        <p:spPr>
+          <a:xfrm>
+            <a:off x="5751229" y="2433342"/>
+            <a:ext cx="344771" cy="343627"/>
+          </a:xfrm>
+          <a:prstGeom prst="rect">
+            <a:avLst/>
+          </a:prstGeom>
+          <a:solidFill>
+            <a:schemeClr val="accent6">
+              <a:lumMod val="60000"/>
+              <a:lumOff val="40000"/>
+            </a:schemeClr>
+          </a:solidFill>
+          <a:ln>
+            <a:solidFill>
+              <a:schemeClr val="tx1"/>
+            </a:solidFill>
+          </a:ln>
+        </p:spPr>
+        <p:style>
+          <a:lnRef idx="2">
+            <a:schemeClr val="accent1">
+              <a:shade val="50000"/>
+            </a:schemeClr>
+          </a:lnRef>
+          <a:fillRef idx="1">
+            <a:schemeClr val="accent1"/>
+          </a:fillRef>
+          <a:effectRef idx="0">
+            <a:schemeClr val="accent1"/>
+          </a:effectRef>
+          <a:fontRef idx="minor">
+            <a:schemeClr val="lt1"/>
+          </a:fontRef>
+        </p:style>
+        <p:txBody>
+          <a:bodyPr rtlCol="0" anchor="ctr"/>
+          <a:lstStyle/>
+          <a:p>
+            <a:pPr algn="ctr"/>
+            <a:r>
+              <a:rPr lang="es-MX" sz="2000" b="1" dirty="0">
+                <a:solidFill>
+                  <a:schemeClr val="tx1"/>
+                </a:solidFill>
+                <a:latin typeface="Arial" panose="020B0604020202020204" pitchFamily="34" charset="0"/>
+                <a:cs typeface="Arial" panose="020B0604020202020204" pitchFamily="34" charset="0"/>
+              </a:rPr>
+              <a:t>1</a:t>
+            </a:r>
+          </a:p>
+        </p:txBody>
+      </p:sp>
+      <p:cxnSp>
+        <p:nvCxnSpPr>
+          <p:cNvPr id="4" name="Conector recto de flecha 3">
+            <a:extLst>
+              <a:ext uri="{FF2B5EF4-FFF2-40B4-BE49-F238E27FC236}">
+                <a16:creationId xmlns:a16="http://schemas.microsoft.com/office/drawing/2014/main" id="{0779C60C-A09F-4BD9-86F3-27F74618BB2C}"/>
+              </a:ext>
+            </a:extLst>
+          </p:cNvPr>
+          <p:cNvCxnSpPr>
+            <a:cxnSpLocks/>
+          </p:cNvCxnSpPr>
+          <p:nvPr/>
+        </p:nvCxnSpPr>
+        <p:spPr>
+          <a:xfrm flipV="1">
+            <a:off x="4606087" y="2656796"/>
+            <a:ext cx="1088918" cy="2153"/>
+          </a:xfrm>
+          <a:prstGeom prst="straightConnector1">
+            <a:avLst/>
+          </a:prstGeom>
+          <a:ln w="38100">
+            <a:solidFill>
+              <a:schemeClr val="accent6">
+                <a:lumMod val="60000"/>
+                <a:lumOff val="40000"/>
+              </a:schemeClr>
+            </a:solidFill>
+            <a:tailEnd type="triangle"/>
+          </a:ln>
+        </p:spPr>
+        <p:style>
+          <a:lnRef idx="1">
+            <a:schemeClr val="accent1"/>
+          </a:lnRef>
+          <a:fillRef idx="0">
+            <a:schemeClr val="accent1"/>
+          </a:fillRef>
+          <a:effectRef idx="0">
+            <a:schemeClr val="accent1"/>
+          </a:effectRef>
+          <a:fontRef idx="minor">
+            <a:schemeClr val="tx1"/>
+          </a:fontRef>
+        </p:style>
+      </p:cxnSp>
+      <p:sp>
+        <p:nvSpPr>
+          <p:cNvPr id="5" name="Rectángulo 4">
+            <a:extLst>
+              <a:ext uri="{FF2B5EF4-FFF2-40B4-BE49-F238E27FC236}">
+                <a16:creationId xmlns:a16="http://schemas.microsoft.com/office/drawing/2014/main" id="{D7119500-6A9A-4ED1-B226-56B169D30AB6}"/>
+              </a:ext>
+            </a:extLst>
+          </p:cNvPr>
+          <p:cNvSpPr/>
+          <p:nvPr/>
+        </p:nvSpPr>
+        <p:spPr>
+          <a:xfrm>
+            <a:off x="5108499" y="2776969"/>
+            <a:ext cx="344771" cy="343627"/>
+          </a:xfrm>
+          <a:prstGeom prst="rect">
+            <a:avLst/>
+          </a:prstGeom>
+          <a:solidFill>
+            <a:schemeClr val="accent6">
+              <a:lumMod val="60000"/>
+              <a:lumOff val="40000"/>
+            </a:schemeClr>
+          </a:solidFill>
+          <a:ln>
+            <a:solidFill>
+              <a:schemeClr val="tx1"/>
+            </a:solidFill>
+          </a:ln>
+        </p:spPr>
+        <p:style>
+          <a:lnRef idx="2">
+            <a:schemeClr val="accent1">
+              <a:shade val="50000"/>
+            </a:schemeClr>
+          </a:lnRef>
+          <a:fillRef idx="1">
+            <a:schemeClr val="accent1"/>
+          </a:fillRef>
+          <a:effectRef idx="0">
+            <a:schemeClr val="accent1"/>
+          </a:effectRef>
+          <a:fontRef idx="minor">
+            <a:schemeClr val="lt1"/>
+          </a:fontRef>
+        </p:style>
+        <p:txBody>
+          <a:bodyPr rtlCol="0" anchor="ctr"/>
+          <a:lstStyle/>
+          <a:p>
+            <a:pPr algn="ctr"/>
+            <a:r>
+              <a:rPr lang="es-MX" sz="2000" b="1" dirty="0">
+                <a:solidFill>
+                  <a:schemeClr val="tx1"/>
+                </a:solidFill>
+                <a:latin typeface="Arial" panose="020B0604020202020204" pitchFamily="34" charset="0"/>
+                <a:cs typeface="Arial" panose="020B0604020202020204" pitchFamily="34" charset="0"/>
+              </a:rPr>
+              <a:t>1</a:t>
+            </a:r>
+          </a:p>
+        </p:txBody>
+      </p:sp>
+      <p:cxnSp>
+        <p:nvCxnSpPr>
+          <p:cNvPr id="6" name="Conector recto de flecha 5">
+            <a:extLst>
+              <a:ext uri="{FF2B5EF4-FFF2-40B4-BE49-F238E27FC236}">
+                <a16:creationId xmlns:a16="http://schemas.microsoft.com/office/drawing/2014/main" id="{1B26BDBA-0525-40E8-8AB1-9E4F85A75FDF}"/>
+              </a:ext>
+            </a:extLst>
+          </p:cNvPr>
+          <p:cNvCxnSpPr>
+            <a:cxnSpLocks/>
+          </p:cNvCxnSpPr>
+          <p:nvPr/>
+        </p:nvCxnSpPr>
+        <p:spPr>
+          <a:xfrm flipV="1">
+            <a:off x="3963357" y="3000423"/>
+            <a:ext cx="1088918" cy="2153"/>
+          </a:xfrm>
+          <a:prstGeom prst="straightConnector1">
+            <a:avLst/>
+          </a:prstGeom>
+          <a:ln w="38100">
+            <a:solidFill>
+              <a:schemeClr val="accent6">
+                <a:lumMod val="60000"/>
+                <a:lumOff val="40000"/>
+              </a:schemeClr>
+            </a:solidFill>
+            <a:tailEnd type="triangle"/>
+          </a:ln>
+        </p:spPr>
+        <p:style>
+          <a:lnRef idx="1">
+            <a:schemeClr val="accent1"/>
+          </a:lnRef>
+          <a:fillRef idx="0">
+            <a:schemeClr val="accent1"/>
+          </a:fillRef>
+          <a:effectRef idx="0">
+            <a:schemeClr val="accent1"/>
+          </a:effectRef>
+          <a:fontRef idx="minor">
+            <a:schemeClr val="tx1"/>
+          </a:fontRef>
+        </p:style>
+      </p:cxnSp>
+      <p:sp>
+        <p:nvSpPr>
+          <p:cNvPr id="11" name="Rectángulo 10">
+            <a:extLst>
+              <a:ext uri="{FF2B5EF4-FFF2-40B4-BE49-F238E27FC236}">
+                <a16:creationId xmlns:a16="http://schemas.microsoft.com/office/drawing/2014/main" id="{6AAC68D6-91D2-4443-B962-7A5D752CFC2A}"/>
+              </a:ext>
+            </a:extLst>
+          </p:cNvPr>
+          <p:cNvSpPr/>
+          <p:nvPr/>
+        </p:nvSpPr>
+        <p:spPr>
+          <a:xfrm>
+            <a:off x="5807453" y="4256207"/>
+            <a:ext cx="344771" cy="343627"/>
+          </a:xfrm>
+          <a:prstGeom prst="rect">
+            <a:avLst/>
+          </a:prstGeom>
+          <a:solidFill>
+            <a:schemeClr val="accent6">
+              <a:lumMod val="60000"/>
+              <a:lumOff val="40000"/>
+            </a:schemeClr>
+          </a:solidFill>
+          <a:ln>
+            <a:solidFill>
+              <a:schemeClr val="tx1"/>
+            </a:solidFill>
+          </a:ln>
+        </p:spPr>
+        <p:style>
+          <a:lnRef idx="2">
+            <a:schemeClr val="accent1">
+              <a:shade val="50000"/>
+            </a:schemeClr>
+          </a:lnRef>
+          <a:fillRef idx="1">
+            <a:schemeClr val="accent1"/>
+          </a:fillRef>
+          <a:effectRef idx="0">
+            <a:schemeClr val="accent1"/>
+          </a:effectRef>
+          <a:fontRef idx="minor">
+            <a:schemeClr val="lt1"/>
+          </a:fontRef>
+        </p:style>
+        <p:txBody>
+          <a:bodyPr rtlCol="0" anchor="ctr"/>
+          <a:lstStyle/>
+          <a:p>
+            <a:pPr algn="ctr"/>
+            <a:r>
+              <a:rPr lang="es-MX" sz="2000" b="1" dirty="0">
+                <a:solidFill>
+                  <a:schemeClr val="tx1"/>
+                </a:solidFill>
+                <a:latin typeface="Arial" panose="020B0604020202020204" pitchFamily="34" charset="0"/>
+                <a:cs typeface="Arial" panose="020B0604020202020204" pitchFamily="34" charset="0"/>
+              </a:rPr>
+              <a:t>1</a:t>
+            </a:r>
+          </a:p>
+        </p:txBody>
+      </p:sp>
+      <p:cxnSp>
+        <p:nvCxnSpPr>
+          <p:cNvPr id="12" name="Conector recto de flecha 11">
+            <a:extLst>
+              <a:ext uri="{FF2B5EF4-FFF2-40B4-BE49-F238E27FC236}">
+                <a16:creationId xmlns:a16="http://schemas.microsoft.com/office/drawing/2014/main" id="{BF3E1CCC-676D-4837-80AD-815A5B7541CB}"/>
+              </a:ext>
+            </a:extLst>
+          </p:cNvPr>
+          <p:cNvCxnSpPr>
+            <a:cxnSpLocks/>
+          </p:cNvCxnSpPr>
+          <p:nvPr/>
+        </p:nvCxnSpPr>
+        <p:spPr>
+          <a:xfrm flipV="1">
+            <a:off x="4662311" y="4479661"/>
+            <a:ext cx="1088918" cy="2153"/>
+          </a:xfrm>
+          <a:prstGeom prst="straightConnector1">
+            <a:avLst/>
+          </a:prstGeom>
+          <a:ln w="38100">
+            <a:solidFill>
+              <a:schemeClr val="accent6">
+                <a:lumMod val="60000"/>
+                <a:lumOff val="40000"/>
+              </a:schemeClr>
+            </a:solidFill>
+            <a:tailEnd type="triangle"/>
+          </a:ln>
+        </p:spPr>
+        <p:style>
+          <a:lnRef idx="1">
+            <a:schemeClr val="accent1"/>
+          </a:lnRef>
+          <a:fillRef idx="0">
+            <a:schemeClr val="accent1"/>
+          </a:fillRef>
+          <a:effectRef idx="0">
+            <a:schemeClr val="accent1"/>
+          </a:effectRef>
+          <a:fontRef idx="minor">
+            <a:schemeClr val="tx1"/>
+          </a:fontRef>
+        </p:style>
+      </p:cxnSp>
+      <p:sp>
+        <p:nvSpPr>
+          <p:cNvPr id="13" name="Rectángulo 12">
+            <a:extLst>
+              <a:ext uri="{FF2B5EF4-FFF2-40B4-BE49-F238E27FC236}">
+                <a16:creationId xmlns:a16="http://schemas.microsoft.com/office/drawing/2014/main" id="{40F3940B-A041-4395-B5EF-BEE41E81890B}"/>
+              </a:ext>
+            </a:extLst>
+          </p:cNvPr>
+          <p:cNvSpPr/>
+          <p:nvPr/>
+        </p:nvSpPr>
+        <p:spPr>
+          <a:xfrm>
+            <a:off x="4975977" y="4578441"/>
+            <a:ext cx="344771" cy="343627"/>
+          </a:xfrm>
+          <a:prstGeom prst="rect">
+            <a:avLst/>
+          </a:prstGeom>
+          <a:solidFill>
+            <a:schemeClr val="accent6">
+              <a:lumMod val="60000"/>
+              <a:lumOff val="40000"/>
+            </a:schemeClr>
+          </a:solidFill>
+          <a:ln>
+            <a:solidFill>
+              <a:schemeClr val="tx1"/>
+            </a:solidFill>
+          </a:ln>
+        </p:spPr>
+        <p:style>
+          <a:lnRef idx="2">
+            <a:schemeClr val="accent1">
+              <a:shade val="50000"/>
+            </a:schemeClr>
+          </a:lnRef>
+          <a:fillRef idx="1">
+            <a:schemeClr val="accent1"/>
+          </a:fillRef>
+          <a:effectRef idx="0">
+            <a:schemeClr val="accent1"/>
+          </a:effectRef>
+          <a:fontRef idx="minor">
+            <a:schemeClr val="lt1"/>
+          </a:fontRef>
+        </p:style>
+        <p:txBody>
+          <a:bodyPr rtlCol="0" anchor="ctr"/>
+          <a:lstStyle/>
+          <a:p>
+            <a:pPr algn="ctr"/>
+            <a:r>
+              <a:rPr lang="es-MX" sz="2000" b="1" dirty="0">
+                <a:solidFill>
+                  <a:schemeClr val="tx1"/>
+                </a:solidFill>
+                <a:latin typeface="Arial" panose="020B0604020202020204" pitchFamily="34" charset="0"/>
+                <a:cs typeface="Arial" panose="020B0604020202020204" pitchFamily="34" charset="0"/>
+              </a:rPr>
+              <a:t>1</a:t>
+            </a:r>
+          </a:p>
+        </p:txBody>
+      </p:sp>
+      <p:cxnSp>
+        <p:nvCxnSpPr>
+          <p:cNvPr id="14" name="Conector recto de flecha 13">
+            <a:extLst>
+              <a:ext uri="{FF2B5EF4-FFF2-40B4-BE49-F238E27FC236}">
+                <a16:creationId xmlns:a16="http://schemas.microsoft.com/office/drawing/2014/main" id="{DA61BA47-6677-42D7-BECB-701D9270925F}"/>
+              </a:ext>
+            </a:extLst>
+          </p:cNvPr>
+          <p:cNvCxnSpPr>
+            <a:cxnSpLocks/>
+          </p:cNvCxnSpPr>
+          <p:nvPr/>
+        </p:nvCxnSpPr>
+        <p:spPr>
+          <a:xfrm flipV="1">
+            <a:off x="3830835" y="4801895"/>
+            <a:ext cx="1088918" cy="2153"/>
+          </a:xfrm>
+          <a:prstGeom prst="straightConnector1">
+            <a:avLst/>
+          </a:prstGeom>
+          <a:ln w="38100">
+            <a:solidFill>
+              <a:schemeClr val="accent6">
+                <a:lumMod val="60000"/>
+                <a:lumOff val="40000"/>
+              </a:schemeClr>
+            </a:solidFill>
+            <a:tailEnd type="triangle"/>
+          </a:ln>
+        </p:spPr>
+        <p:style>
+          <a:lnRef idx="1">
+            <a:schemeClr val="accent1"/>
+          </a:lnRef>
+          <a:fillRef idx="0">
+            <a:schemeClr val="accent1"/>
+          </a:fillRef>
+          <a:effectRef idx="0">
+            <a:schemeClr val="accent1"/>
+          </a:effectRef>
+          <a:fontRef idx="minor">
+            <a:schemeClr val="tx1"/>
+          </a:fontRef>
+        </p:style>
+      </p:cxnSp>
+      <p:sp>
+        <p:nvSpPr>
+          <p:cNvPr id="15" name="Rectángulo 14">
+            <a:extLst>
+              <a:ext uri="{FF2B5EF4-FFF2-40B4-BE49-F238E27FC236}">
+                <a16:creationId xmlns:a16="http://schemas.microsoft.com/office/drawing/2014/main" id="{29128499-A86A-4590-AC1A-0B272A0E32EC}"/>
+              </a:ext>
+            </a:extLst>
+          </p:cNvPr>
+          <p:cNvSpPr/>
+          <p:nvPr/>
+        </p:nvSpPr>
+        <p:spPr>
+          <a:xfrm>
+            <a:off x="5032201" y="5135563"/>
+            <a:ext cx="344771" cy="343627"/>
+          </a:xfrm>
+          <a:prstGeom prst="rect">
+            <a:avLst/>
+          </a:prstGeom>
+          <a:solidFill>
+            <a:schemeClr val="accent6">
+              <a:lumMod val="60000"/>
+              <a:lumOff val="40000"/>
+            </a:schemeClr>
+          </a:solidFill>
+          <a:ln>
+            <a:solidFill>
+              <a:schemeClr val="tx1"/>
+            </a:solidFill>
+          </a:ln>
+        </p:spPr>
+        <p:style>
+          <a:lnRef idx="2">
+            <a:schemeClr val="accent1">
+              <a:shade val="50000"/>
+            </a:schemeClr>
+          </a:lnRef>
+          <a:fillRef idx="1">
+            <a:schemeClr val="accent1"/>
+          </a:fillRef>
+          <a:effectRef idx="0">
+            <a:schemeClr val="accent1"/>
+          </a:effectRef>
+          <a:fontRef idx="minor">
+            <a:schemeClr val="lt1"/>
+          </a:fontRef>
+        </p:style>
+        <p:txBody>
+          <a:bodyPr rtlCol="0" anchor="ctr"/>
+          <a:lstStyle/>
+          <a:p>
+            <a:pPr algn="ctr"/>
+            <a:r>
+              <a:rPr lang="es-MX" sz="2000" b="1" dirty="0">
+                <a:solidFill>
+                  <a:schemeClr val="tx1"/>
+                </a:solidFill>
+                <a:latin typeface="Arial" panose="020B0604020202020204" pitchFamily="34" charset="0"/>
+                <a:cs typeface="Arial" panose="020B0604020202020204" pitchFamily="34" charset="0"/>
+              </a:rPr>
+              <a:t>1</a:t>
+            </a:r>
+          </a:p>
+        </p:txBody>
+      </p:sp>
+      <p:cxnSp>
+        <p:nvCxnSpPr>
+          <p:cNvPr id="16" name="Conector recto de flecha 15">
+            <a:extLst>
+              <a:ext uri="{FF2B5EF4-FFF2-40B4-BE49-F238E27FC236}">
+                <a16:creationId xmlns:a16="http://schemas.microsoft.com/office/drawing/2014/main" id="{B6FA3C7F-1A39-4A27-8B3A-6630458CEE16}"/>
+              </a:ext>
+            </a:extLst>
+          </p:cNvPr>
+          <p:cNvCxnSpPr>
+            <a:cxnSpLocks/>
+          </p:cNvCxnSpPr>
+          <p:nvPr/>
+        </p:nvCxnSpPr>
+        <p:spPr>
+          <a:xfrm flipV="1">
+            <a:off x="3887059" y="5359017"/>
+            <a:ext cx="1088918" cy="2153"/>
+          </a:xfrm>
+          <a:prstGeom prst="straightConnector1">
+            <a:avLst/>
+          </a:prstGeom>
+          <a:ln w="38100">
+            <a:solidFill>
+              <a:schemeClr val="accent6">
+                <a:lumMod val="60000"/>
+                <a:lumOff val="40000"/>
+              </a:schemeClr>
+            </a:solidFill>
+            <a:tailEnd type="triangle"/>
+          </a:ln>
+        </p:spPr>
+        <p:style>
+          <a:lnRef idx="1">
+            <a:schemeClr val="accent1"/>
+          </a:lnRef>
+          <a:fillRef idx="0">
+            <a:schemeClr val="accent1"/>
+          </a:fillRef>
+          <a:effectRef idx="0">
+            <a:schemeClr val="accent1"/>
+          </a:effectRef>
+          <a:fontRef idx="minor">
+            <a:schemeClr val="tx1"/>
+          </a:fontRef>
+        </p:style>
+      </p:cxnSp>
+      <mc:AlternateContent xmlns:mc="http://schemas.openxmlformats.org/markup-compatibility/2006">
+        <mc:Choice xmlns:a14="http://schemas.microsoft.com/office/drawing/2010/main" Requires="a14">
+          <p:sp>
+            <p:nvSpPr>
+              <p:cNvPr id="17" name="Rectángulo 16">
+                <a:extLst>
+                  <a:ext uri="{FF2B5EF4-FFF2-40B4-BE49-F238E27FC236}">
+                    <a16:creationId xmlns:a16="http://schemas.microsoft.com/office/drawing/2014/main" id="{07FC98BE-5E45-420C-97CF-68D1AA0A3A19}"/>
+                  </a:ext>
+                </a:extLst>
+              </p:cNvPr>
+              <p:cNvSpPr/>
+              <p:nvPr/>
+            </p:nvSpPr>
+            <p:spPr>
+              <a:xfrm>
+                <a:off x="4228186" y="1916615"/>
+                <a:ext cx="1088918" cy="343627"/>
+              </a:xfrm>
+              <a:prstGeom prst="rect">
+                <a:avLst/>
+              </a:prstGeom>
+              <a:solidFill>
+                <a:schemeClr val="accent6">
+                  <a:lumMod val="60000"/>
+                  <a:lumOff val="40000"/>
+                </a:schemeClr>
+              </a:solidFill>
+              <a:ln>
+                <a:solidFill>
+                  <a:schemeClr val="tx1"/>
+                </a:solidFill>
+              </a:ln>
+            </p:spPr>
+            <p:style>
+              <a:lnRef idx="2">
+                <a:schemeClr val="accent1">
+                  <a:shade val="50000"/>
+                </a:schemeClr>
+              </a:lnRef>
+              <a:fillRef idx="1">
+                <a:schemeClr val="accent1"/>
+              </a:fillRef>
+              <a:effectRef idx="0">
+                <a:schemeClr val="accent1"/>
+              </a:effectRef>
+              <a:fontRef idx="minor">
+                <a:schemeClr val="lt1"/>
+              </a:fontRef>
+            </p:style>
+            <p:txBody>
+              <a:bodyPr rtlCol="0" anchor="ctr"/>
+              <a:lstStyle/>
+              <a:p>
+                <a:pPr algn="ctr"/>
+                <a14:m>
+                  <m:oMathPara xmlns:m="http://schemas.openxmlformats.org/officeDocument/2006/math">
+                    <m:oMathParaPr>
+                      <m:jc m:val="centerGroup"/>
+                    </m:oMathParaPr>
+                    <m:oMath xmlns:m="http://schemas.openxmlformats.org/officeDocument/2006/math">
+                      <m:func>
+                        <m:funcPr>
+                          <m:ctrlPr>
+                            <a:rPr lang="es-MX" sz="2000" b="1" i="1">
+                              <a:solidFill>
+                                <a:schemeClr val="tx1"/>
+                              </a:solidFill>
+                              <a:latin typeface="Cambria Math" panose="02040503050406030204" pitchFamily="18" charset="0"/>
+                              <a:cs typeface="Arial" panose="020B0604020202020204" pitchFamily="34" charset="0"/>
+                            </a:rPr>
+                          </m:ctrlPr>
+                        </m:funcPr>
+                        <m:fName>
+                          <m:sSub>
+                            <m:sSubPr>
+                              <m:ctrlPr>
+                                <a:rPr lang="es-MX" sz="2000" b="1" i="1">
+                                  <a:solidFill>
+                                    <a:schemeClr val="tx1"/>
+                                  </a:solidFill>
+                                  <a:latin typeface="Cambria Math" panose="02040503050406030204" pitchFamily="18" charset="0"/>
+                                  <a:cs typeface="Arial" panose="020B0604020202020204" pitchFamily="34" charset="0"/>
+                                </a:rPr>
+                              </m:ctrlPr>
+                            </m:sSubPr>
+                            <m:e>
+                              <m:r>
+                                <m:rPr>
+                                  <m:sty m:val="p"/>
+                                </m:rPr>
+                                <a:rPr lang="es-MX" sz="2000">
+                                  <a:solidFill>
+                                    <a:schemeClr val="tx1"/>
+                                  </a:solidFill>
+                                  <a:latin typeface="Cambria Math" panose="02040503050406030204" pitchFamily="18" charset="0"/>
+                                  <a:cs typeface="Arial" panose="020B0604020202020204" pitchFamily="34" charset="0"/>
+                                </a:rPr>
+                                <m:t>log</m:t>
+                              </m:r>
+                            </m:e>
+                            <m:sub>
+                              <m:r>
+                                <a:rPr lang="es-MX" sz="2000" b="1" i="1">
+                                  <a:solidFill>
+                                    <a:schemeClr val="tx1"/>
+                                  </a:solidFill>
+                                  <a:latin typeface="Cambria Math" panose="02040503050406030204" pitchFamily="18" charset="0"/>
+                                  <a:cs typeface="Arial" panose="020B0604020202020204" pitchFamily="34" charset="0"/>
+                                </a:rPr>
+                                <m:t>𝟐</m:t>
+                              </m:r>
+                            </m:sub>
+                          </m:sSub>
+                        </m:fName>
+                        <m:e>
+                          <m:r>
+                            <a:rPr lang="es-MX" sz="2000" b="1" i="1">
+                              <a:solidFill>
+                                <a:schemeClr val="tx1"/>
+                              </a:solidFill>
+                              <a:latin typeface="Cambria Math" panose="02040503050406030204" pitchFamily="18" charset="0"/>
+                              <a:cs typeface="Arial" panose="020B0604020202020204" pitchFamily="34" charset="0"/>
+                            </a:rPr>
+                            <m:t>𝒏</m:t>
+                          </m:r>
+                        </m:e>
+                      </m:func>
+                    </m:oMath>
+                  </m:oMathPara>
+                </a14:m>
+                <a:endParaRPr lang="es-MX" sz="2000" b="1" dirty="0">
+                  <a:solidFill>
+                    <a:schemeClr val="tx1"/>
+                  </a:solidFill>
+                  <a:latin typeface="Arial" panose="020B0604020202020204" pitchFamily="34" charset="0"/>
+                  <a:cs typeface="Arial" panose="020B0604020202020204" pitchFamily="34" charset="0"/>
+                </a:endParaRPr>
+              </a:p>
+            </p:txBody>
+          </p:sp>
+        </mc:Choice>
+        <mc:Fallback>
+          <p:sp>
+            <p:nvSpPr>
+              <p:cNvPr id="17" name="Rectángulo 16">
+                <a:extLst>
+                  <a:ext uri="{FF2B5EF4-FFF2-40B4-BE49-F238E27FC236}">
+                    <a16:creationId xmlns:a16="http://schemas.microsoft.com/office/drawing/2014/main" id="{07FC98BE-5E45-420C-97CF-68D1AA0A3A19}"/>
+                  </a:ext>
+                </a:extLst>
+              </p:cNvPr>
+              <p:cNvSpPr>
+                <a:spLocks noRot="1" noChangeAspect="1" noMove="1" noResize="1" noEditPoints="1" noAdjustHandles="1" noChangeArrowheads="1" noChangeShapeType="1" noTextEdit="1"/>
+              </p:cNvSpPr>
+              <p:nvPr/>
+            </p:nvSpPr>
+            <p:spPr>
+              <a:xfrm>
+                <a:off x="4228186" y="1916615"/>
+                <a:ext cx="1088918" cy="343627"/>
+              </a:xfrm>
+              <a:prstGeom prst="rect">
+                <a:avLst/>
+              </a:prstGeom>
+              <a:blipFill>
+                <a:blip r:embed="rId3"/>
+                <a:stretch>
+                  <a:fillRect b="-25424"/>
+                </a:stretch>
+              </a:blipFill>
+              <a:ln>
+                <a:solidFill>
+                  <a:schemeClr val="tx1"/>
+                </a:solidFill>
+              </a:ln>
+            </p:spPr>
+            <p:txBody>
+              <a:bodyPr/>
+              <a:lstStyle/>
+              <a:p>
+                <a:r>
+                  <a:rPr lang="es-MX">
+                    <a:noFill/>
+                  </a:rPr>
+                  <a:t> </a:t>
+                </a:r>
+              </a:p>
+            </p:txBody>
+          </p:sp>
+        </mc:Fallback>
+      </mc:AlternateContent>
+      <p:cxnSp>
+        <p:nvCxnSpPr>
+          <p:cNvPr id="18" name="Conector recto de flecha 17">
+            <a:extLst>
+              <a:ext uri="{FF2B5EF4-FFF2-40B4-BE49-F238E27FC236}">
+                <a16:creationId xmlns:a16="http://schemas.microsoft.com/office/drawing/2014/main" id="{25C7DB8D-5878-41AA-94BA-23152968C481}"/>
+              </a:ext>
+            </a:extLst>
+          </p:cNvPr>
+          <p:cNvCxnSpPr>
+            <a:cxnSpLocks/>
+          </p:cNvCxnSpPr>
+          <p:nvPr/>
+        </p:nvCxnSpPr>
+        <p:spPr>
+          <a:xfrm flipV="1">
+            <a:off x="3083044" y="2140069"/>
+            <a:ext cx="1088918" cy="2153"/>
+          </a:xfrm>
+          <a:prstGeom prst="straightConnector1">
+            <a:avLst/>
+          </a:prstGeom>
+          <a:ln w="38100">
+            <a:solidFill>
+              <a:schemeClr val="accent6">
+                <a:lumMod val="60000"/>
+                <a:lumOff val="40000"/>
+              </a:schemeClr>
+            </a:solidFill>
+            <a:tailEnd type="triangle"/>
+          </a:ln>
+        </p:spPr>
+        <p:style>
+          <a:lnRef idx="1">
+            <a:schemeClr val="accent1"/>
+          </a:lnRef>
+          <a:fillRef idx="0">
+            <a:schemeClr val="accent1"/>
+          </a:fillRef>
+          <a:effectRef idx="0">
+            <a:schemeClr val="accent1"/>
+          </a:effectRef>
+          <a:fontRef idx="minor">
+            <a:schemeClr val="tx1"/>
+          </a:fontRef>
+        </p:style>
+      </p:cxnSp>
+      <p:sp>
+        <p:nvSpPr>
+          <p:cNvPr id="27" name="Rectángulo 26">
+            <a:extLst>
+              <a:ext uri="{FF2B5EF4-FFF2-40B4-BE49-F238E27FC236}">
+                <a16:creationId xmlns:a16="http://schemas.microsoft.com/office/drawing/2014/main" id="{CA35D350-1737-40E8-92B0-1E77D51DD2E2}"/>
+              </a:ext>
+            </a:extLst>
+          </p:cNvPr>
+          <p:cNvSpPr/>
+          <p:nvPr/>
+        </p:nvSpPr>
+        <p:spPr>
+          <a:xfrm>
+            <a:off x="273673" y="1916614"/>
+            <a:ext cx="344771" cy="4029948"/>
+          </a:xfrm>
+          <a:prstGeom prst="rect">
+            <a:avLst/>
+          </a:prstGeom>
+          <a:solidFill>
+            <a:srgbClr val="78A896"/>
+          </a:solidFill>
+          <a:ln>
+            <a:solidFill>
+              <a:schemeClr val="tx1"/>
+            </a:solidFill>
+          </a:ln>
+        </p:spPr>
+        <p:style>
+          <a:lnRef idx="2">
+            <a:schemeClr val="accent1">
+              <a:shade val="50000"/>
+            </a:schemeClr>
+          </a:lnRef>
+          <a:fillRef idx="1">
+            <a:schemeClr val="accent1"/>
+          </a:fillRef>
+          <a:effectRef idx="0">
+            <a:schemeClr val="accent1"/>
+          </a:effectRef>
+          <a:fontRef idx="minor">
+            <a:schemeClr val="lt1"/>
+          </a:fontRef>
+        </p:style>
+        <p:txBody>
+          <a:bodyPr rtlCol="0" anchor="ctr"/>
+          <a:lstStyle/>
+          <a:p>
+            <a:pPr algn="ctr"/>
+            <a:endParaRPr lang="es-MX" sz="2000" b="1" dirty="0">
+              <a:solidFill>
+                <a:schemeClr val="tx1"/>
+              </a:solidFill>
+              <a:latin typeface="Arial" panose="020B0604020202020204" pitchFamily="34" charset="0"/>
+              <a:cs typeface="Arial" panose="020B0604020202020204" pitchFamily="34" charset="0"/>
+            </a:endParaRPr>
+          </a:p>
+        </p:txBody>
+      </p:sp>
+      <p:sp>
+        <p:nvSpPr>
+          <p:cNvPr id="29" name="Rectángulo 28">
+            <a:extLst>
+              <a:ext uri="{FF2B5EF4-FFF2-40B4-BE49-F238E27FC236}">
+                <a16:creationId xmlns:a16="http://schemas.microsoft.com/office/drawing/2014/main" id="{C7689840-64FD-4414-B18E-356FE0B62522}"/>
+              </a:ext>
+            </a:extLst>
+          </p:cNvPr>
+          <p:cNvSpPr/>
+          <p:nvPr/>
+        </p:nvSpPr>
+        <p:spPr>
+          <a:xfrm>
+            <a:off x="6979331" y="248802"/>
+            <a:ext cx="4196112" cy="1496933"/>
+          </a:xfrm>
+          <a:prstGeom prst="rect">
+            <a:avLst/>
+          </a:prstGeom>
+          <a:solidFill>
+            <a:srgbClr val="DEB4D6"/>
+          </a:solidFill>
+          <a:ln>
+            <a:solidFill>
+              <a:schemeClr val="tx1"/>
+            </a:solidFill>
+          </a:ln>
+        </p:spPr>
+        <p:style>
+          <a:lnRef idx="2">
+            <a:schemeClr val="accent1">
+              <a:shade val="50000"/>
+            </a:schemeClr>
+          </a:lnRef>
+          <a:fillRef idx="1">
+            <a:schemeClr val="accent1"/>
+          </a:fillRef>
+          <a:effectRef idx="0">
+            <a:schemeClr val="accent1"/>
+          </a:effectRef>
+          <a:fontRef idx="minor">
+            <a:schemeClr val="lt1"/>
+          </a:fontRef>
+        </p:style>
+        <p:txBody>
+          <a:bodyPr rtlCol="0" anchor="ctr"/>
+          <a:lstStyle/>
+          <a:p>
+            <a:pPr algn="ctr"/>
+            <a:r>
+              <a:rPr lang="es-MX" sz="1600" b="1" dirty="0">
+                <a:solidFill>
+                  <a:schemeClr val="tx1"/>
+                </a:solidFill>
+                <a:latin typeface="Century Gothic" panose="020B0502020202020204" pitchFamily="34" charset="0"/>
+                <a:cs typeface="Arial" panose="020B0604020202020204" pitchFamily="34" charset="0"/>
+              </a:rPr>
+              <a:t>MEJOR CASO:</a:t>
+            </a:r>
+          </a:p>
+          <a:p>
+            <a:pPr algn="ctr"/>
+            <a:r>
+              <a:rPr lang="es-MX" sz="1600" b="1" dirty="0">
+                <a:solidFill>
+                  <a:schemeClr val="tx1"/>
+                </a:solidFill>
+                <a:latin typeface="Century Gothic" panose="020B0502020202020204" pitchFamily="34" charset="0"/>
+                <a:cs typeface="Arial" panose="020B0604020202020204" pitchFamily="34" charset="0"/>
+              </a:rPr>
+              <a:t>Sucede cuando el numero esta justo en la mitad del arreglo. I1</a:t>
+            </a:r>
+            <a:br>
+              <a:rPr lang="es-MX" sz="1600" b="1" dirty="0">
+                <a:solidFill>
+                  <a:schemeClr val="tx1"/>
+                </a:solidFill>
+                <a:latin typeface="Century Gothic" panose="020B0502020202020204" pitchFamily="34" charset="0"/>
+                <a:cs typeface="Arial" panose="020B0604020202020204" pitchFamily="34" charset="0"/>
+              </a:rPr>
+            </a:br>
+            <a:r>
+              <a:rPr lang="es-MX" sz="1600" b="1" dirty="0">
+                <a:solidFill>
+                  <a:schemeClr val="tx1"/>
+                </a:solidFill>
+                <a:latin typeface="Century Gothic" panose="020B0502020202020204" pitchFamily="34" charset="0"/>
+                <a:cs typeface="Arial" panose="020B0604020202020204" pitchFamily="34" charset="0"/>
+              </a:rPr>
+              <a:t>f(t) = 3</a:t>
+            </a:r>
+            <a:br>
+              <a:rPr lang="es-MX" sz="1600" b="1" dirty="0">
+                <a:solidFill>
+                  <a:schemeClr val="tx1"/>
+                </a:solidFill>
+                <a:latin typeface="Century Gothic" panose="020B0502020202020204" pitchFamily="34" charset="0"/>
+                <a:cs typeface="Arial" panose="020B0604020202020204" pitchFamily="34" charset="0"/>
+              </a:rPr>
+            </a:br>
+            <a:r>
+              <a:rPr lang="es-MX" sz="1600" b="1" dirty="0">
+                <a:solidFill>
+                  <a:schemeClr val="tx1"/>
+                </a:solidFill>
+                <a:latin typeface="Century Gothic" panose="020B0502020202020204" pitchFamily="34" charset="0"/>
+                <a:cs typeface="Arial" panose="020B0604020202020204" pitchFamily="34" charset="0"/>
+              </a:rPr>
+              <a:t>Dos comparaciones y una asignación.</a:t>
+            </a:r>
+          </a:p>
+        </p:txBody>
+      </p:sp>
+      <mc:AlternateContent xmlns:mc="http://schemas.openxmlformats.org/markup-compatibility/2006">
+        <mc:Choice xmlns:a14="http://schemas.microsoft.com/office/drawing/2010/main" Requires="a14">
+          <p:sp>
+            <p:nvSpPr>
+              <p:cNvPr id="30" name="Rectángulo 29">
+                <a:extLst>
+                  <a:ext uri="{FF2B5EF4-FFF2-40B4-BE49-F238E27FC236}">
+                    <a16:creationId xmlns:a16="http://schemas.microsoft.com/office/drawing/2014/main" id="{2F557B7F-2A3F-4C9E-91C1-9B465BFB9556}"/>
+                  </a:ext>
+                </a:extLst>
+              </p:cNvPr>
+              <p:cNvSpPr/>
+              <p:nvPr/>
+            </p:nvSpPr>
+            <p:spPr>
+              <a:xfrm>
+                <a:off x="7000318" y="4642253"/>
+                <a:ext cx="4295986" cy="1496933"/>
+              </a:xfrm>
+              <a:prstGeom prst="rect">
+                <a:avLst/>
+              </a:prstGeom>
+              <a:solidFill>
+                <a:srgbClr val="78A896"/>
+              </a:solidFill>
+              <a:ln>
+                <a:solidFill>
+                  <a:schemeClr val="tx1"/>
+                </a:solidFill>
+              </a:ln>
+            </p:spPr>
+            <p:style>
+              <a:lnRef idx="2">
+                <a:schemeClr val="accent1">
+                  <a:shade val="50000"/>
+                </a:schemeClr>
+              </a:lnRef>
+              <a:fillRef idx="1">
+                <a:schemeClr val="accent1"/>
+              </a:fillRef>
+              <a:effectRef idx="0">
+                <a:schemeClr val="accent1"/>
+              </a:effectRef>
+              <a:fontRef idx="minor">
+                <a:schemeClr val="lt1"/>
+              </a:fontRef>
+            </p:style>
+            <p:txBody>
+              <a:bodyPr rtlCol="0" anchor="ctr"/>
+              <a:lstStyle/>
+              <a:p>
+                <a:pPr algn="ctr"/>
+                <a:r>
+                  <a:rPr lang="es-MX" sz="1600" b="1" dirty="0">
+                    <a:solidFill>
+                      <a:schemeClr val="tx1"/>
+                    </a:solidFill>
+                    <a:latin typeface="Century Gothic" panose="020B0502020202020204" pitchFamily="34" charset="0"/>
+                    <a:cs typeface="Arial" panose="020B0604020202020204" pitchFamily="34" charset="0"/>
+                  </a:rPr>
+                  <a:t>PEOR CASO:</a:t>
+                </a:r>
+              </a:p>
+              <a:p>
+                <a:pPr algn="ctr"/>
+                <a:r>
+                  <a:rPr lang="es-MX" sz="1600" b="1" dirty="0">
+                    <a:solidFill>
+                      <a:schemeClr val="tx1"/>
+                    </a:solidFill>
+                    <a:latin typeface="Century Gothic" panose="020B0502020202020204" pitchFamily="34" charset="0"/>
+                    <a:cs typeface="Arial" panose="020B0604020202020204" pitchFamily="34" charset="0"/>
+                  </a:rPr>
+                  <a:t>Sucede cuando el número no se encuentra o está en la última posición. I3</a:t>
+                </a:r>
+              </a:p>
+              <a:p>
+                <a:pPr algn="ctr"/>
+                <a:r>
+                  <a:rPr lang="es-MX" sz="1600" b="1" dirty="0">
+                    <a:solidFill>
+                      <a:schemeClr val="tx1"/>
+                    </a:solidFill>
+                    <a:latin typeface="Century Gothic" panose="020B0502020202020204" pitchFamily="34" charset="0"/>
+                    <a:cs typeface="Arial" panose="020B0604020202020204" pitchFamily="34" charset="0"/>
+                  </a:rPr>
+                  <a:t>f(t) = </a:t>
+                </a:r>
+                <a14:m>
+                  <m:oMath xmlns:m="http://schemas.openxmlformats.org/officeDocument/2006/math">
+                    <m:func>
+                      <m:funcPr>
+                        <m:ctrlPr>
+                          <a:rPr lang="es-MX" sz="1600" b="1" i="1">
+                            <a:solidFill>
+                              <a:schemeClr val="tx1"/>
+                            </a:solidFill>
+                            <a:latin typeface="Cambria Math" panose="02040503050406030204" pitchFamily="18" charset="0"/>
+                            <a:cs typeface="Arial" panose="020B0604020202020204" pitchFamily="34" charset="0"/>
+                          </a:rPr>
+                        </m:ctrlPr>
+                      </m:funcPr>
+                      <m:fName>
+                        <m:sSub>
+                          <m:sSubPr>
+                            <m:ctrlPr>
+                              <a:rPr lang="es-MX" sz="1600" b="1" i="1">
+                                <a:solidFill>
+                                  <a:schemeClr val="tx1"/>
+                                </a:solidFill>
+                                <a:latin typeface="Cambria Math" panose="02040503050406030204" pitchFamily="18" charset="0"/>
+                                <a:cs typeface="Arial" panose="020B0604020202020204" pitchFamily="34" charset="0"/>
+                              </a:rPr>
+                            </m:ctrlPr>
+                          </m:sSubPr>
+                          <m:e>
+                            <m:r>
+                              <a:rPr lang="es-MX" sz="1600" b="0" i="0" smtClean="0">
+                                <a:solidFill>
+                                  <a:schemeClr val="tx1"/>
+                                </a:solidFill>
+                                <a:latin typeface="Cambria Math" panose="02040503050406030204" pitchFamily="18" charset="0"/>
+                                <a:cs typeface="Arial" panose="020B0604020202020204" pitchFamily="34" charset="0"/>
+                              </a:rPr>
+                              <m:t>5</m:t>
+                            </m:r>
+                            <m:r>
+                              <m:rPr>
+                                <m:sty m:val="p"/>
+                              </m:rPr>
+                              <a:rPr lang="es-MX" sz="1600">
+                                <a:solidFill>
+                                  <a:schemeClr val="tx1"/>
+                                </a:solidFill>
+                                <a:latin typeface="Cambria Math" panose="02040503050406030204" pitchFamily="18" charset="0"/>
+                                <a:cs typeface="Arial" panose="020B0604020202020204" pitchFamily="34" charset="0"/>
+                              </a:rPr>
+                              <m:t>log</m:t>
+                            </m:r>
+                          </m:e>
+                          <m:sub>
+                            <m:r>
+                              <a:rPr lang="es-MX" sz="1600" b="1" i="1">
+                                <a:solidFill>
+                                  <a:schemeClr val="tx1"/>
+                                </a:solidFill>
+                                <a:latin typeface="Cambria Math" panose="02040503050406030204" pitchFamily="18" charset="0"/>
+                                <a:cs typeface="Arial" panose="020B0604020202020204" pitchFamily="34" charset="0"/>
+                              </a:rPr>
+                              <m:t>𝟐</m:t>
+                            </m:r>
+                          </m:sub>
+                        </m:sSub>
+                      </m:fName>
+                      <m:e>
+                        <m:r>
+                          <a:rPr lang="es-MX" sz="1600" b="1" i="1">
+                            <a:solidFill>
+                              <a:schemeClr val="tx1"/>
+                            </a:solidFill>
+                            <a:latin typeface="Cambria Math" panose="02040503050406030204" pitchFamily="18" charset="0"/>
+                            <a:cs typeface="Arial" panose="020B0604020202020204" pitchFamily="34" charset="0"/>
+                          </a:rPr>
+                          <m:t>𝒏</m:t>
+                        </m:r>
+                      </m:e>
+                    </m:func>
+                  </m:oMath>
+                </a14:m>
+                <a:endParaRPr lang="es-MX" sz="2400" b="1" dirty="0">
+                  <a:solidFill>
+                    <a:schemeClr val="tx1"/>
+                  </a:solidFill>
+                  <a:latin typeface="Century Gothic" panose="020B0502020202020204" pitchFamily="34" charset="0"/>
+                  <a:cs typeface="Arial" panose="020B0604020202020204" pitchFamily="34" charset="0"/>
+                </a:endParaRPr>
+              </a:p>
+            </p:txBody>
+          </p:sp>
+        </mc:Choice>
+        <mc:Fallback>
+          <p:sp>
+            <p:nvSpPr>
+              <p:cNvPr id="30" name="Rectángulo 29">
+                <a:extLst>
+                  <a:ext uri="{FF2B5EF4-FFF2-40B4-BE49-F238E27FC236}">
+                    <a16:creationId xmlns:a16="http://schemas.microsoft.com/office/drawing/2014/main" id="{2F557B7F-2A3F-4C9E-91C1-9B465BFB9556}"/>
+                  </a:ext>
+                </a:extLst>
+              </p:cNvPr>
+              <p:cNvSpPr>
+                <a:spLocks noRot="1" noChangeAspect="1" noMove="1" noResize="1" noEditPoints="1" noAdjustHandles="1" noChangeArrowheads="1" noChangeShapeType="1" noTextEdit="1"/>
+              </p:cNvSpPr>
+              <p:nvPr/>
+            </p:nvSpPr>
+            <p:spPr>
+              <a:xfrm>
+                <a:off x="7000318" y="4642253"/>
+                <a:ext cx="4295986" cy="1496933"/>
+              </a:xfrm>
+              <a:prstGeom prst="rect">
+                <a:avLst/>
+              </a:prstGeom>
+              <a:blipFill>
+                <a:blip r:embed="rId4"/>
+                <a:stretch>
+                  <a:fillRect/>
+                </a:stretch>
+              </a:blipFill>
+              <a:ln>
+                <a:solidFill>
+                  <a:schemeClr val="tx1"/>
+                </a:solidFill>
+              </a:ln>
+            </p:spPr>
+            <p:txBody>
+              <a:bodyPr/>
+              <a:lstStyle/>
+              <a:p>
+                <a:r>
+                  <a:rPr lang="es-MX">
+                    <a:noFill/>
+                  </a:rPr>
+                  <a:t> </a:t>
+                </a:r>
+              </a:p>
+            </p:txBody>
+          </p:sp>
+        </mc:Fallback>
+      </mc:AlternateContent>
+      <mc:AlternateContent xmlns:mc="http://schemas.openxmlformats.org/markup-compatibility/2006">
+        <mc:Choice xmlns:a14="http://schemas.microsoft.com/office/drawing/2010/main" Requires="a14">
+          <p:sp>
+            <p:nvSpPr>
+              <p:cNvPr id="31" name="Rectángulo 30">
+                <a:extLst>
+                  <a:ext uri="{FF2B5EF4-FFF2-40B4-BE49-F238E27FC236}">
+                    <a16:creationId xmlns:a16="http://schemas.microsoft.com/office/drawing/2014/main" id="{A4B806D1-B288-4B9A-BEE6-9118BEFC3F75}"/>
+                  </a:ext>
+                </a:extLst>
+              </p:cNvPr>
+              <p:cNvSpPr/>
+              <p:nvPr/>
+            </p:nvSpPr>
+            <p:spPr>
+              <a:xfrm>
+                <a:off x="6992583" y="2075641"/>
+                <a:ext cx="4316973" cy="2237115"/>
+              </a:xfrm>
+              <a:prstGeom prst="rect">
+                <a:avLst/>
+              </a:prstGeom>
+              <a:solidFill>
+                <a:schemeClr val="accent5">
+                  <a:lumMod val="20000"/>
+                  <a:lumOff val="80000"/>
+                </a:schemeClr>
+              </a:solidFill>
+              <a:ln>
+                <a:solidFill>
+                  <a:schemeClr val="tx1"/>
+                </a:solidFill>
+              </a:ln>
+            </p:spPr>
+            <p:style>
+              <a:lnRef idx="2">
+                <a:schemeClr val="accent1">
+                  <a:shade val="50000"/>
+                </a:schemeClr>
+              </a:lnRef>
+              <a:fillRef idx="1">
+                <a:schemeClr val="accent1"/>
+              </a:fillRef>
+              <a:effectRef idx="0">
+                <a:schemeClr val="accent1"/>
+              </a:effectRef>
+              <a:fontRef idx="minor">
+                <a:schemeClr val="lt1"/>
+              </a:fontRef>
+            </p:style>
+            <p:txBody>
+              <a:bodyPr rtlCol="0" anchor="ctr"/>
+              <a:lstStyle/>
+              <a:p>
+                <a:pPr algn="ctr"/>
+                <a:r>
+                  <a:rPr lang="es-MX" sz="1600" b="1" dirty="0">
+                    <a:solidFill>
+                      <a:schemeClr val="tx1"/>
+                    </a:solidFill>
+                    <a:latin typeface="Century Gothic" panose="020B0502020202020204" pitchFamily="34" charset="0"/>
+                    <a:cs typeface="Arial" panose="020B0604020202020204" pitchFamily="34" charset="0"/>
+                  </a:rPr>
+                  <a:t>CASO MEDIO: </a:t>
+                </a:r>
+              </a:p>
+              <a:p>
+                <a:pPr algn="ctr"/>
+                <a:r>
+                  <a:rPr lang="es-MX" sz="1600" b="1" dirty="0">
+                    <a:solidFill>
+                      <a:schemeClr val="tx1"/>
+                    </a:solidFill>
+                    <a:latin typeface="Century Gothic" panose="020B0502020202020204" pitchFamily="34" charset="0"/>
+                    <a:cs typeface="Arial" panose="020B0604020202020204" pitchFamily="34" charset="0"/>
+                  </a:rPr>
+                  <a:t>Sucede cuando el número esta en alguna posición diferente a la mitad del arreglo.</a:t>
+                </a:r>
+                <a:br>
+                  <a:rPr lang="es-MX" sz="1600" b="1" dirty="0">
+                    <a:solidFill>
+                      <a:schemeClr val="tx1"/>
+                    </a:solidFill>
+                    <a:latin typeface="Century Gothic" panose="020B0502020202020204" pitchFamily="34" charset="0"/>
+                    <a:cs typeface="Arial" panose="020B0604020202020204" pitchFamily="34" charset="0"/>
+                  </a:rPr>
+                </a:br>
+                <a:r>
+                  <a:rPr lang="es-MX" sz="1600" b="1" dirty="0">
+                    <a:solidFill>
+                      <a:schemeClr val="tx1"/>
+                    </a:solidFill>
+                    <a:latin typeface="Century Gothic" panose="020B0502020202020204" pitchFamily="34" charset="0"/>
+                    <a:cs typeface="Arial" panose="020B0604020202020204" pitchFamily="34" charset="0"/>
+                  </a:rPr>
+                  <a:t>f(t) = (</a:t>
+                </a:r>
+                <a14:m>
+                  <m:oMath xmlns:m="http://schemas.openxmlformats.org/officeDocument/2006/math">
+                    <m:func>
+                      <m:funcPr>
+                        <m:ctrlPr>
+                          <a:rPr lang="es-MX" sz="1600" b="1" i="1">
+                            <a:solidFill>
+                              <a:schemeClr val="tx1"/>
+                            </a:solidFill>
+                            <a:latin typeface="Cambria Math" panose="02040503050406030204" pitchFamily="18" charset="0"/>
+                            <a:cs typeface="Arial" panose="020B0604020202020204" pitchFamily="34" charset="0"/>
+                          </a:rPr>
+                        </m:ctrlPr>
+                      </m:funcPr>
+                      <m:fName>
+                        <m:sSub>
+                          <m:sSubPr>
+                            <m:ctrlPr>
+                              <a:rPr lang="es-MX" sz="1600" b="1" i="1">
+                                <a:solidFill>
+                                  <a:schemeClr val="tx1"/>
+                                </a:solidFill>
+                                <a:latin typeface="Cambria Math" panose="02040503050406030204" pitchFamily="18" charset="0"/>
+                                <a:cs typeface="Arial" panose="020B0604020202020204" pitchFamily="34" charset="0"/>
+                              </a:rPr>
+                            </m:ctrlPr>
+                          </m:sSubPr>
+                          <m:e>
+                            <m:r>
+                              <a:rPr lang="es-MX" sz="1600" b="0" i="0" smtClean="0">
+                                <a:solidFill>
+                                  <a:schemeClr val="tx1"/>
+                                </a:solidFill>
+                                <a:latin typeface="Cambria Math" panose="02040503050406030204" pitchFamily="18" charset="0"/>
+                                <a:cs typeface="Arial" panose="020B0604020202020204" pitchFamily="34" charset="0"/>
+                              </a:rPr>
+                              <m:t>3+5</m:t>
+                            </m:r>
+                            <m:r>
+                              <m:rPr>
+                                <m:sty m:val="p"/>
+                              </m:rPr>
+                              <a:rPr lang="es-MX" sz="1600">
+                                <a:solidFill>
+                                  <a:schemeClr val="tx1"/>
+                                </a:solidFill>
+                                <a:latin typeface="Cambria Math" panose="02040503050406030204" pitchFamily="18" charset="0"/>
+                                <a:cs typeface="Arial" panose="020B0604020202020204" pitchFamily="34" charset="0"/>
+                              </a:rPr>
+                              <m:t>log</m:t>
+                            </m:r>
+                          </m:e>
+                          <m:sub>
+                            <m:r>
+                              <a:rPr lang="es-MX" sz="1600" b="1" i="1">
+                                <a:solidFill>
+                                  <a:schemeClr val="tx1"/>
+                                </a:solidFill>
+                                <a:latin typeface="Cambria Math" panose="02040503050406030204" pitchFamily="18" charset="0"/>
+                                <a:cs typeface="Arial" panose="020B0604020202020204" pitchFamily="34" charset="0"/>
+                              </a:rPr>
+                              <m:t>𝟐</m:t>
+                            </m:r>
+                          </m:sub>
+                        </m:sSub>
+                      </m:fName>
+                      <m:e>
+                        <m:r>
+                          <a:rPr lang="es-MX" sz="1600" b="1" i="1">
+                            <a:solidFill>
+                              <a:schemeClr val="tx1"/>
+                            </a:solidFill>
+                            <a:latin typeface="Cambria Math" panose="02040503050406030204" pitchFamily="18" charset="0"/>
+                            <a:cs typeface="Arial" panose="020B0604020202020204" pitchFamily="34" charset="0"/>
+                          </a:rPr>
+                          <m:t>𝒏</m:t>
+                        </m:r>
+                      </m:e>
+                    </m:func>
+                    <m:r>
+                      <a:rPr lang="es-MX" sz="1600" b="1" i="1" smtClean="0">
+                        <a:solidFill>
+                          <a:schemeClr val="tx1"/>
+                        </a:solidFill>
+                        <a:latin typeface="Cambria Math" panose="02040503050406030204" pitchFamily="18" charset="0"/>
+                        <a:cs typeface="Arial" panose="020B0604020202020204" pitchFamily="34" charset="0"/>
+                      </a:rPr>
+                      <m:t>+</m:t>
+                    </m:r>
+                    <m:func>
+                      <m:funcPr>
+                        <m:ctrlPr>
+                          <a:rPr lang="es-MX" sz="1600" b="1" i="1">
+                            <a:solidFill>
+                              <a:schemeClr val="tx1"/>
+                            </a:solidFill>
+                            <a:latin typeface="Cambria Math" panose="02040503050406030204" pitchFamily="18" charset="0"/>
+                            <a:cs typeface="Arial" panose="020B0604020202020204" pitchFamily="34" charset="0"/>
+                          </a:rPr>
+                        </m:ctrlPr>
+                      </m:funcPr>
+                      <m:fName>
+                        <m:sSub>
+                          <m:sSubPr>
+                            <m:ctrlPr>
+                              <a:rPr lang="es-MX" sz="1600" b="1" i="1">
+                                <a:solidFill>
+                                  <a:schemeClr val="tx1"/>
+                                </a:solidFill>
+                                <a:latin typeface="Cambria Math" panose="02040503050406030204" pitchFamily="18" charset="0"/>
+                                <a:cs typeface="Arial" panose="020B0604020202020204" pitchFamily="34" charset="0"/>
+                              </a:rPr>
+                            </m:ctrlPr>
+                          </m:sSubPr>
+                          <m:e>
+                            <m:r>
+                              <a:rPr lang="es-MX" sz="1600">
+                                <a:solidFill>
+                                  <a:schemeClr val="tx1"/>
+                                </a:solidFill>
+                                <a:latin typeface="Cambria Math" panose="02040503050406030204" pitchFamily="18" charset="0"/>
+                                <a:cs typeface="Arial" panose="020B0604020202020204" pitchFamily="34" charset="0"/>
+                              </a:rPr>
+                              <m:t>5</m:t>
+                            </m:r>
+                            <m:r>
+                              <m:rPr>
+                                <m:sty m:val="p"/>
+                              </m:rPr>
+                              <a:rPr lang="es-MX" sz="1600">
+                                <a:solidFill>
+                                  <a:schemeClr val="tx1"/>
+                                </a:solidFill>
+                                <a:latin typeface="Cambria Math" panose="02040503050406030204" pitchFamily="18" charset="0"/>
+                                <a:cs typeface="Arial" panose="020B0604020202020204" pitchFamily="34" charset="0"/>
+                              </a:rPr>
+                              <m:t>log</m:t>
+                            </m:r>
+                          </m:e>
+                          <m:sub>
+                            <m:r>
+                              <a:rPr lang="es-MX" sz="1600" b="1" i="1">
+                                <a:solidFill>
+                                  <a:schemeClr val="tx1"/>
+                                </a:solidFill>
+                                <a:latin typeface="Cambria Math" panose="02040503050406030204" pitchFamily="18" charset="0"/>
+                                <a:cs typeface="Arial" panose="020B0604020202020204" pitchFamily="34" charset="0"/>
+                              </a:rPr>
+                              <m:t>𝟐</m:t>
+                            </m:r>
+                          </m:sub>
+                        </m:sSub>
+                      </m:fName>
+                      <m:e>
+                        <m:r>
+                          <a:rPr lang="es-MX" sz="1600" b="1" i="1">
+                            <a:solidFill>
+                              <a:schemeClr val="tx1"/>
+                            </a:solidFill>
+                            <a:latin typeface="Cambria Math" panose="02040503050406030204" pitchFamily="18" charset="0"/>
+                            <a:cs typeface="Arial" panose="020B0604020202020204" pitchFamily="34" charset="0"/>
+                          </a:rPr>
+                          <m:t>𝒏</m:t>
+                        </m:r>
+                      </m:e>
+                    </m:func>
+                  </m:oMath>
+                </a14:m>
+                <a:r>
+                  <a:rPr lang="es-MX" sz="1600" b="1" dirty="0">
+                    <a:solidFill>
+                      <a:schemeClr val="tx1"/>
+                    </a:solidFill>
+                    <a:latin typeface="Century Gothic" panose="020B0502020202020204" pitchFamily="34" charset="0"/>
+                    <a:cs typeface="Arial" panose="020B0604020202020204" pitchFamily="34" charset="0"/>
+                  </a:rPr>
+                  <a:t>) / 3</a:t>
+                </a:r>
+              </a:p>
+              <a:p>
+                <a:pPr algn="ctr"/>
+                <a:r>
+                  <a:rPr lang="es-MX" sz="1600" b="1" dirty="0">
+                    <a:solidFill>
+                      <a:schemeClr val="tx1"/>
+                    </a:solidFill>
+                    <a:latin typeface="Century Gothic" panose="020B0502020202020204" pitchFamily="34" charset="0"/>
+                    <a:cs typeface="Arial" panose="020B0604020202020204" pitchFamily="34" charset="0"/>
+                  </a:rPr>
+                  <a:t>Hay 3 instancias: está en el centro, en el segmente izquierdo o en el segmento derecho.</a:t>
+                </a:r>
+              </a:p>
+            </p:txBody>
+          </p:sp>
+        </mc:Choice>
+        <mc:Fallback>
+          <p:sp>
+            <p:nvSpPr>
+              <p:cNvPr id="31" name="Rectángulo 30">
+                <a:extLst>
+                  <a:ext uri="{FF2B5EF4-FFF2-40B4-BE49-F238E27FC236}">
+                    <a16:creationId xmlns:a16="http://schemas.microsoft.com/office/drawing/2014/main" id="{A4B806D1-B288-4B9A-BEE6-9118BEFC3F75}"/>
+                  </a:ext>
+                </a:extLst>
+              </p:cNvPr>
+              <p:cNvSpPr>
+                <a:spLocks noRot="1" noChangeAspect="1" noMove="1" noResize="1" noEditPoints="1" noAdjustHandles="1" noChangeArrowheads="1" noChangeShapeType="1" noTextEdit="1"/>
+              </p:cNvSpPr>
+              <p:nvPr/>
+            </p:nvSpPr>
+            <p:spPr>
+              <a:xfrm>
+                <a:off x="6992583" y="2075641"/>
+                <a:ext cx="4316973" cy="2237115"/>
+              </a:xfrm>
+              <a:prstGeom prst="rect">
+                <a:avLst/>
+              </a:prstGeom>
+              <a:blipFill>
+                <a:blip r:embed="rId5"/>
+                <a:stretch>
+                  <a:fillRect r="-141"/>
+                </a:stretch>
+              </a:blipFill>
+              <a:ln>
+                <a:solidFill>
+                  <a:schemeClr val="tx1"/>
+                </a:solidFill>
+              </a:ln>
+            </p:spPr>
+            <p:txBody>
+              <a:bodyPr/>
+              <a:lstStyle/>
+              <a:p>
+                <a:r>
+                  <a:rPr lang="es-MX">
+                    <a:noFill/>
+                  </a:rPr>
+                  <a:t> </a:t>
+                </a:r>
+              </a:p>
+            </p:txBody>
+          </p:sp>
+        </mc:Fallback>
+      </mc:AlternateContent>
+      <p:sp>
+        <p:nvSpPr>
+          <p:cNvPr id="28" name="Rectángulo 27">
+            <a:extLst>
+              <a:ext uri="{FF2B5EF4-FFF2-40B4-BE49-F238E27FC236}">
+                <a16:creationId xmlns:a16="http://schemas.microsoft.com/office/drawing/2014/main" id="{4DC3484F-EECA-4130-B28F-AB3FB4A25C06}"/>
+              </a:ext>
+            </a:extLst>
+          </p:cNvPr>
+          <p:cNvSpPr/>
+          <p:nvPr/>
+        </p:nvSpPr>
+        <p:spPr>
+          <a:xfrm>
+            <a:off x="151451" y="1916616"/>
+            <a:ext cx="344771" cy="3504476"/>
+          </a:xfrm>
+          <a:prstGeom prst="rect">
+            <a:avLst/>
+          </a:prstGeom>
+          <a:solidFill>
+            <a:schemeClr val="accent1">
+              <a:lumMod val="20000"/>
+              <a:lumOff val="80000"/>
+            </a:schemeClr>
+          </a:solidFill>
+          <a:ln>
+            <a:solidFill>
+              <a:schemeClr val="tx1"/>
+            </a:solidFill>
+          </a:ln>
+        </p:spPr>
+        <p:style>
+          <a:lnRef idx="2">
+            <a:schemeClr val="accent1">
+              <a:shade val="50000"/>
+            </a:schemeClr>
+          </a:lnRef>
+          <a:fillRef idx="1">
+            <a:schemeClr val="accent1"/>
+          </a:fillRef>
+          <a:effectRef idx="0">
+            <a:schemeClr val="accent1"/>
+          </a:effectRef>
+          <a:fontRef idx="minor">
+            <a:schemeClr val="lt1"/>
+          </a:fontRef>
+        </p:style>
+        <p:txBody>
+          <a:bodyPr rtlCol="0" anchor="ctr"/>
+          <a:lstStyle/>
+          <a:p>
+            <a:pPr algn="ctr"/>
+            <a:endParaRPr lang="es-MX" sz="2000" b="1" dirty="0">
+              <a:solidFill>
+                <a:schemeClr val="tx1"/>
+              </a:solidFill>
+              <a:latin typeface="Arial" panose="020B0604020202020204" pitchFamily="34" charset="0"/>
+              <a:cs typeface="Arial" panose="020B0604020202020204" pitchFamily="34" charset="0"/>
+            </a:endParaRPr>
+          </a:p>
+        </p:txBody>
+      </p:sp>
+      <p:sp>
+        <p:nvSpPr>
+          <p:cNvPr id="26" name="Rectángulo 25">
+            <a:extLst>
+              <a:ext uri="{FF2B5EF4-FFF2-40B4-BE49-F238E27FC236}">
+                <a16:creationId xmlns:a16="http://schemas.microsoft.com/office/drawing/2014/main" id="{9D1DD95B-DE6D-4E80-979C-B40C42035A74}"/>
+              </a:ext>
+            </a:extLst>
+          </p:cNvPr>
+          <p:cNvSpPr/>
+          <p:nvPr/>
+        </p:nvSpPr>
+        <p:spPr>
+          <a:xfrm>
+            <a:off x="285816" y="1916614"/>
+            <a:ext cx="344771" cy="1083807"/>
+          </a:xfrm>
+          <a:prstGeom prst="rect">
+            <a:avLst/>
+          </a:prstGeom>
+          <a:solidFill>
+            <a:srgbClr val="DEB4D6"/>
+          </a:solidFill>
+          <a:ln>
+            <a:solidFill>
+              <a:schemeClr val="tx1"/>
+            </a:solidFill>
+          </a:ln>
+        </p:spPr>
+        <p:style>
+          <a:lnRef idx="2">
+            <a:schemeClr val="accent1">
+              <a:shade val="50000"/>
+            </a:schemeClr>
+          </a:lnRef>
+          <a:fillRef idx="1">
+            <a:schemeClr val="accent1"/>
+          </a:fillRef>
+          <a:effectRef idx="0">
+            <a:schemeClr val="accent1"/>
+          </a:effectRef>
+          <a:fontRef idx="minor">
+            <a:schemeClr val="lt1"/>
+          </a:fontRef>
+        </p:style>
+        <p:txBody>
+          <a:bodyPr rtlCol="0" anchor="ctr"/>
+          <a:lstStyle/>
+          <a:p>
+            <a:pPr algn="ctr"/>
+            <a:endParaRPr lang="es-MX" sz="2000" b="1" dirty="0">
+              <a:solidFill>
+                <a:schemeClr val="tx1"/>
+              </a:solidFill>
+              <a:latin typeface="Arial" panose="020B0604020202020204" pitchFamily="34" charset="0"/>
+              <a:cs typeface="Arial" panose="020B0604020202020204" pitchFamily="34" charset="0"/>
+            </a:endParaRPr>
+          </a:p>
+        </p:txBody>
+      </p:sp>
+      <p:sp>
+        <p:nvSpPr>
+          <p:cNvPr id="33" name="Rectángulo 32">
+            <a:extLst>
+              <a:ext uri="{FF2B5EF4-FFF2-40B4-BE49-F238E27FC236}">
+                <a16:creationId xmlns:a16="http://schemas.microsoft.com/office/drawing/2014/main" id="{CF3D186E-F043-455A-83D6-8614F2CBEB60}"/>
+              </a:ext>
+            </a:extLst>
+          </p:cNvPr>
+          <p:cNvSpPr/>
+          <p:nvPr/>
+        </p:nvSpPr>
+        <p:spPr>
+          <a:xfrm>
+            <a:off x="2535266" y="3055575"/>
+            <a:ext cx="777701" cy="277245"/>
+          </a:xfrm>
+          <a:prstGeom prst="rect">
+            <a:avLst/>
+          </a:prstGeom>
+          <a:solidFill>
+            <a:srgbClr val="FFC000"/>
+          </a:solidFill>
+          <a:ln>
+            <a:solidFill>
+              <a:schemeClr val="tx1"/>
+            </a:solidFill>
+          </a:ln>
+        </p:spPr>
+        <p:style>
+          <a:lnRef idx="2">
+            <a:schemeClr val="accent1">
+              <a:shade val="50000"/>
+            </a:schemeClr>
+          </a:lnRef>
+          <a:fillRef idx="1">
+            <a:schemeClr val="accent1"/>
+          </a:fillRef>
+          <a:effectRef idx="0">
+            <a:schemeClr val="accent1"/>
+          </a:effectRef>
+          <a:fontRef idx="minor">
+            <a:schemeClr val="lt1"/>
+          </a:fontRef>
+        </p:style>
+        <p:txBody>
+          <a:bodyPr rtlCol="0" anchor="ctr"/>
+          <a:lstStyle/>
+          <a:p>
+            <a:pPr algn="ctr"/>
+            <a:r>
+              <a:rPr lang="es-MX" sz="2000" b="1" dirty="0">
+                <a:solidFill>
+                  <a:schemeClr val="tx1"/>
+                </a:solidFill>
+                <a:latin typeface="Times New Roman" panose="02020603050405020304" pitchFamily="18" charset="0"/>
+                <a:cs typeface="Times New Roman" panose="02020603050405020304" pitchFamily="18" charset="0"/>
+              </a:rPr>
+              <a:t>I1</a:t>
+            </a:r>
+          </a:p>
+        </p:txBody>
+      </p:sp>
+      <p:sp>
+        <p:nvSpPr>
+          <p:cNvPr id="34" name="Rectángulo 33">
+            <a:extLst>
+              <a:ext uri="{FF2B5EF4-FFF2-40B4-BE49-F238E27FC236}">
+                <a16:creationId xmlns:a16="http://schemas.microsoft.com/office/drawing/2014/main" id="{F63774A7-BAF7-4C44-9728-419F6D9DE131}"/>
+              </a:ext>
+            </a:extLst>
+          </p:cNvPr>
+          <p:cNvSpPr/>
+          <p:nvPr/>
+        </p:nvSpPr>
+        <p:spPr>
+          <a:xfrm>
+            <a:off x="5453270" y="4684665"/>
+            <a:ext cx="777701" cy="277245"/>
+          </a:xfrm>
+          <a:prstGeom prst="rect">
+            <a:avLst/>
+          </a:prstGeom>
+          <a:solidFill>
+            <a:srgbClr val="FFC000"/>
+          </a:solidFill>
+          <a:ln>
+            <a:solidFill>
+              <a:schemeClr val="tx1"/>
+            </a:solidFill>
+          </a:ln>
+        </p:spPr>
+        <p:style>
+          <a:lnRef idx="2">
+            <a:schemeClr val="accent1">
+              <a:shade val="50000"/>
+            </a:schemeClr>
+          </a:lnRef>
+          <a:fillRef idx="1">
+            <a:schemeClr val="accent1"/>
+          </a:fillRef>
+          <a:effectRef idx="0">
+            <a:schemeClr val="accent1"/>
+          </a:effectRef>
+          <a:fontRef idx="minor">
+            <a:schemeClr val="lt1"/>
+          </a:fontRef>
+        </p:style>
+        <p:txBody>
+          <a:bodyPr rtlCol="0" anchor="ctr"/>
+          <a:lstStyle/>
+          <a:p>
+            <a:pPr algn="ctr"/>
+            <a:r>
+              <a:rPr lang="es-MX" sz="2000" b="1" dirty="0">
+                <a:solidFill>
+                  <a:schemeClr val="tx1"/>
+                </a:solidFill>
+                <a:latin typeface="Times New Roman" panose="02020603050405020304" pitchFamily="18" charset="0"/>
+                <a:cs typeface="Times New Roman" panose="02020603050405020304" pitchFamily="18" charset="0"/>
+              </a:rPr>
+              <a:t>I2</a:t>
+            </a:r>
+          </a:p>
+        </p:txBody>
+      </p:sp>
+      <p:sp>
+        <p:nvSpPr>
+          <p:cNvPr id="35" name="Rectángulo 34">
+            <a:extLst>
+              <a:ext uri="{FF2B5EF4-FFF2-40B4-BE49-F238E27FC236}">
+                <a16:creationId xmlns:a16="http://schemas.microsoft.com/office/drawing/2014/main" id="{A512DFD7-C379-4141-9CEF-79DE63C1231B}"/>
+              </a:ext>
+            </a:extLst>
+          </p:cNvPr>
+          <p:cNvSpPr/>
+          <p:nvPr/>
+        </p:nvSpPr>
+        <p:spPr>
+          <a:xfrm>
+            <a:off x="3124641" y="5470145"/>
+            <a:ext cx="777701" cy="277245"/>
+          </a:xfrm>
+          <a:prstGeom prst="rect">
+            <a:avLst/>
+          </a:prstGeom>
+          <a:solidFill>
+            <a:srgbClr val="FFC000"/>
+          </a:solidFill>
+          <a:ln>
+            <a:solidFill>
+              <a:schemeClr val="tx1"/>
+            </a:solidFill>
+          </a:ln>
+        </p:spPr>
+        <p:style>
+          <a:lnRef idx="2">
+            <a:schemeClr val="accent1">
+              <a:shade val="50000"/>
+            </a:schemeClr>
+          </a:lnRef>
+          <a:fillRef idx="1">
+            <a:schemeClr val="accent1"/>
+          </a:fillRef>
+          <a:effectRef idx="0">
+            <a:schemeClr val="accent1"/>
+          </a:effectRef>
+          <a:fontRef idx="minor">
+            <a:schemeClr val="lt1"/>
+          </a:fontRef>
+        </p:style>
+        <p:txBody>
+          <a:bodyPr rtlCol="0" anchor="ctr"/>
+          <a:lstStyle/>
+          <a:p>
+            <a:pPr algn="ctr"/>
+            <a:r>
+              <a:rPr lang="es-MX" sz="2000" b="1" dirty="0">
+                <a:solidFill>
+                  <a:schemeClr val="tx1"/>
+                </a:solidFill>
+                <a:latin typeface="Times New Roman" panose="02020603050405020304" pitchFamily="18" charset="0"/>
+                <a:cs typeface="Times New Roman" panose="02020603050405020304" pitchFamily="18" charset="0"/>
+              </a:rPr>
+              <a:t>I3</a:t>
+            </a:r>
+          </a:p>
+        </p:txBody>
+      </p:sp>
+    </p:spTree>
+    <p:extLst>
+      <p:ext uri="{BB962C8B-B14F-4D97-AF65-F5344CB8AC3E}">
+        <p14:creationId xmlns:p14="http://schemas.microsoft.com/office/powerpoint/2010/main" val="2025327831"/>
       </p:ext>
     </p:extLst>
   </p:cSld>

</xml_diff>